<commit_message>
Updated Presentation - Kumash
</commit_message>
<xml_diff>
--- a/Rough work/Project Presentation.pptx
+++ b/Rough work/Project Presentation.pptx
@@ -8523,6 +8523,23 @@
               <a:rPr lang="en-US" dirty="0"/>
               <a:t>HTML, CSS, JavaScript</a:t>
             </a:r>
+          </a:p>
+          <a:p>
+            <a:pPr lvl="1" indent="-342900">
+              <a:spcBef>
+                <a:spcPts val="0"/>
+              </a:spcBef>
+              <a:buSzPts val="1800"/>
+              <a:buChar char="●"/>
+            </a:pPr>
+            <a:r>
+              <a:rPr lang="en-US" dirty="0"/>
+              <a:t>Google Charts - </a:t>
+            </a:r>
+            <a:r>
+              <a:rPr lang="en-US" dirty="0" err="1"/>
+              <a:t>Treemaps</a:t>
+            </a:r>
             <a:endParaRPr dirty="0"/>
           </a:p>
           <a:p>
@@ -8576,20 +8593,8 @@
               <a:buChar char="●"/>
             </a:pPr>
             <a:r>
-              <a:rPr lang="en-US" dirty="0" err="1"/>
-              <a:t>Kumash</a:t>
-            </a:r>
-            <a:r>
               <a:rPr lang="en-US" dirty="0"/>
-              <a:t> – Styling CSS JavaScript </a:t>
-            </a:r>
-            <a:r>
-              <a:rPr lang="en-US" dirty="0" err="1"/>
-              <a:t>refactorting</a:t>
-            </a:r>
-            <a:r>
-              <a:rPr lang="en-US" dirty="0"/>
-              <a:t>, and plus features</a:t>
+              <a:t>Kumash – Styling CSS, Market Cap Visualizations and some refactoring.</a:t>
             </a:r>
             <a:endParaRPr dirty="0"/>
           </a:p>
@@ -8663,23 +8668,6 @@
             <a:r>
               <a:rPr lang="en" dirty="0"/>
               <a:t>Market Cap value was not returning with usable data</a:t>
-            </a:r>
-          </a:p>
-          <a:p>
-            <a:pPr lvl="1" indent="-342900">
-              <a:spcBef>
-                <a:spcPts val="0"/>
-              </a:spcBef>
-              <a:buSzPts val="1800"/>
-              <a:buChar char="●"/>
-            </a:pPr>
-            <a:r>
-              <a:rPr lang="en-CA" dirty="0"/>
-              <a:t>E</a:t>
-            </a:r>
-            <a:r>
-              <a:rPr lang="en" dirty="0"/>
-              <a:t>rror Message not appearing </a:t>
             </a:r>
           </a:p>
         </p:txBody>
@@ -8711,6 +8699,143 @@
       </p:grpSpPr>
       <p:sp>
         <p:nvSpPr>
+          <p:cNvPr id="3" name="Text Placeholder 2">
+            <a:extLst>
+              <a:ext uri="{FF2B5EF4-FFF2-40B4-BE49-F238E27FC236}">
+                <a16:creationId xmlns:a16="http://schemas.microsoft.com/office/drawing/2014/main" id="{7DDAC4E4-AC90-4C79-A9C3-52BACBD2C6D8}"/>
+              </a:ext>
+            </a:extLst>
+          </p:cNvPr>
+          <p:cNvSpPr>
+            <a:spLocks noGrp="1"/>
+          </p:cNvSpPr>
+          <p:nvPr>
+            <p:ph type="body" idx="1"/>
+          </p:nvPr>
+        </p:nvSpPr>
+        <p:spPr/>
+        <p:txBody>
+          <a:bodyPr/>
+          <a:lstStyle/>
+          <a:p>
+            <a:pPr lvl="1" indent="-342900">
+              <a:spcBef>
+                <a:spcPts val="0"/>
+              </a:spcBef>
+              <a:buSzPts val="1800"/>
+              <a:buChar char="●"/>
+            </a:pPr>
+            <a:r>
+              <a:rPr lang="en-US" dirty="0"/>
+              <a:t>API Array</a:t>
+            </a:r>
+          </a:p>
+          <a:p>
+            <a:pPr lvl="2" indent="-342900">
+              <a:spcBef>
+                <a:spcPts val="0"/>
+              </a:spcBef>
+              <a:buSzPts val="1800"/>
+              <a:buChar char="●"/>
+            </a:pPr>
+            <a:r>
+              <a:rPr lang="en-US" dirty="0"/>
+              <a:t>Refer to readme issues section</a:t>
+            </a:r>
+          </a:p>
+          <a:p>
+            <a:pPr lvl="1" indent="-342900">
+              <a:spcBef>
+                <a:spcPts val="0"/>
+              </a:spcBef>
+              <a:buSzPts val="1800"/>
+              <a:buChar char="●"/>
+            </a:pPr>
+            <a:r>
+              <a:rPr lang="en-US" dirty="0"/>
+              <a:t>Market Cap fix</a:t>
+            </a:r>
+          </a:p>
+          <a:p>
+            <a:pPr lvl="2" indent="-342900">
+              <a:spcBef>
+                <a:spcPts val="0"/>
+              </a:spcBef>
+              <a:buSzPts val="1800"/>
+              <a:buChar char="●"/>
+            </a:pPr>
+            <a:r>
+              <a:rPr lang="en-US" dirty="0"/>
+              <a:t>Needed to be a return object in the if statement</a:t>
+            </a:r>
+          </a:p>
+          <a:p>
+            <a:pPr lvl="2" indent="-342900">
+              <a:spcBef>
+                <a:spcPts val="0"/>
+              </a:spcBef>
+              <a:buSzPts val="1800"/>
+              <a:buChar char="●"/>
+            </a:pPr>
+            <a:r>
+              <a:rPr lang="en-US" dirty="0"/>
+              <a:t>Adding multiple points of returns adds a references point and lets us have a point to call the data so it doesn’t get lost. </a:t>
+            </a:r>
+          </a:p>
+          <a:p>
+            <a:pPr lvl="1" indent="-342900">
+              <a:spcBef>
+                <a:spcPts val="0"/>
+              </a:spcBef>
+              <a:buSzPts val="1800"/>
+              <a:buChar char="●"/>
+            </a:pPr>
+            <a:r>
+              <a:rPr lang="en-US" dirty="0"/>
+              <a:t>Ended up having 2 fixes for error messages:</a:t>
+            </a:r>
+          </a:p>
+          <a:p>
+            <a:pPr lvl="2" indent="-342900">
+              <a:spcBef>
+                <a:spcPts val="0"/>
+              </a:spcBef>
+              <a:buSzPts val="1800"/>
+              <a:buChar char="●"/>
+            </a:pPr>
+            <a:r>
+              <a:rPr lang="en-US" dirty="0"/>
+              <a:t>Asghar/Steven – toyed with modal idea but Asghar eventually found through the magic of google a catch function fix. </a:t>
+            </a:r>
+          </a:p>
+          <a:p>
+            <a:pPr lvl="2" indent="-342900">
+              <a:spcBef>
+                <a:spcPts val="0"/>
+              </a:spcBef>
+              <a:buSzPts val="1800"/>
+              <a:buChar char="●"/>
+            </a:pPr>
+            <a:r>
+              <a:rPr lang="en-US" dirty="0"/>
+              <a:t>Kumash also had a fix which the group ended up incorporating in, which was to merge the original two fetch functions into one and then initiated the fix in there</a:t>
+            </a:r>
+            <a:endParaRPr lang="en-US" sz="1250" dirty="0"/>
+          </a:p>
+          <a:p>
+            <a:pPr lvl="2" indent="-342900">
+              <a:spcBef>
+                <a:spcPts val="0"/>
+              </a:spcBef>
+              <a:buSzPts val="1800"/>
+              <a:buChar char="●"/>
+            </a:pPr>
+            <a:endParaRPr lang="en-US" dirty="0"/>
+          </a:p>
+        </p:txBody>
+      </p:sp>
+      <p:sp>
+        <p:nvSpPr>
           <p:cNvPr id="2" name="Title 1">
             <a:extLst>
               <a:ext uri="{FF2B5EF4-FFF2-40B4-BE49-F238E27FC236}">
@@ -8740,154 +8865,6 @@
               <a:t>Success/Fixes</a:t>
             </a:r>
             <a:endParaRPr lang="en-CA" b="1" u="sng" dirty="0"/>
-          </a:p>
-        </p:txBody>
-      </p:sp>
-      <p:sp>
-        <p:nvSpPr>
-          <p:cNvPr id="3" name="Text Placeholder 2">
-            <a:extLst>
-              <a:ext uri="{FF2B5EF4-FFF2-40B4-BE49-F238E27FC236}">
-                <a16:creationId xmlns:a16="http://schemas.microsoft.com/office/drawing/2014/main" id="{7DDAC4E4-AC90-4C79-A9C3-52BACBD2C6D8}"/>
-              </a:ext>
-            </a:extLst>
-          </p:cNvPr>
-          <p:cNvSpPr>
-            <a:spLocks noGrp="1"/>
-          </p:cNvSpPr>
-          <p:nvPr>
-            <p:ph type="body" idx="1"/>
-          </p:nvPr>
-        </p:nvSpPr>
-        <p:spPr/>
-        <p:txBody>
-          <a:bodyPr/>
-          <a:lstStyle/>
-          <a:p>
-            <a:pPr lvl="1" indent="-342900">
-              <a:spcBef>
-                <a:spcPts val="0"/>
-              </a:spcBef>
-              <a:buSzPts val="1800"/>
-              <a:buChar char="●"/>
-            </a:pPr>
-            <a:r>
-              <a:rPr lang="en-US" dirty="0"/>
-              <a:t>API Array</a:t>
-            </a:r>
-          </a:p>
-          <a:p>
-            <a:pPr lvl="2" indent="-342900">
-              <a:spcBef>
-                <a:spcPts val="0"/>
-              </a:spcBef>
-              <a:buSzPts val="1800"/>
-              <a:buChar char="●"/>
-            </a:pPr>
-            <a:r>
-              <a:rPr lang="en-US" dirty="0"/>
-              <a:t>Refer to readme issues section</a:t>
-            </a:r>
-          </a:p>
-          <a:p>
-            <a:pPr lvl="1" indent="-342900">
-              <a:spcBef>
-                <a:spcPts val="0"/>
-              </a:spcBef>
-              <a:buSzPts val="1800"/>
-              <a:buChar char="●"/>
-            </a:pPr>
-            <a:r>
-              <a:rPr lang="en-US" dirty="0"/>
-              <a:t>Market Cap fix</a:t>
-            </a:r>
-          </a:p>
-          <a:p>
-            <a:pPr lvl="2" indent="-342900">
-              <a:spcBef>
-                <a:spcPts val="0"/>
-              </a:spcBef>
-              <a:buSzPts val="1800"/>
-              <a:buChar char="●"/>
-            </a:pPr>
-            <a:r>
-              <a:rPr lang="en-US" dirty="0"/>
-              <a:t>Needed to be a return object in the if statement</a:t>
-            </a:r>
-          </a:p>
-          <a:p>
-            <a:pPr lvl="2" indent="-342900">
-              <a:spcBef>
-                <a:spcPts val="0"/>
-              </a:spcBef>
-              <a:buSzPts val="1800"/>
-              <a:buChar char="●"/>
-            </a:pPr>
-            <a:r>
-              <a:rPr lang="en-US" dirty="0"/>
-              <a:t>Adding multiple points of returns adds a </a:t>
-            </a:r>
-            <a:r>
-              <a:rPr lang="en-US" dirty="0" err="1"/>
-              <a:t>referenes</a:t>
-            </a:r>
-            <a:r>
-              <a:rPr lang="en-US" dirty="0"/>
-              <a:t> point and lets us have a point to call the data so it doesn’t get lost. </a:t>
-            </a:r>
-          </a:p>
-          <a:p>
-            <a:pPr lvl="1" indent="-342900">
-              <a:spcBef>
-                <a:spcPts val="0"/>
-              </a:spcBef>
-              <a:buSzPts val="1800"/>
-              <a:buChar char="●"/>
-            </a:pPr>
-            <a:r>
-              <a:rPr lang="en-US" dirty="0"/>
-              <a:t>Ended up having 2 fixes for error messages:</a:t>
-            </a:r>
-          </a:p>
-          <a:p>
-            <a:pPr lvl="2" indent="-342900">
-              <a:spcBef>
-                <a:spcPts val="0"/>
-              </a:spcBef>
-              <a:buSzPts val="1800"/>
-              <a:buChar char="●"/>
-            </a:pPr>
-            <a:r>
-              <a:rPr lang="en-US" dirty="0"/>
-              <a:t>Asghar/Steven – toyed with modal idea but Asghar eventually found through the magic of google a catch function fix. </a:t>
-            </a:r>
-          </a:p>
-          <a:p>
-            <a:pPr lvl="2" indent="-342900">
-              <a:spcBef>
-                <a:spcPts val="0"/>
-              </a:spcBef>
-              <a:buSzPts val="1800"/>
-              <a:buChar char="●"/>
-            </a:pPr>
-            <a:r>
-              <a:rPr lang="en-US" dirty="0" err="1"/>
-              <a:t>Kumash</a:t>
-            </a:r>
-            <a:r>
-              <a:rPr lang="en-US" dirty="0"/>
-              <a:t> also had a fix which the group ended up incorporating in, which was to merge the original two fetch functions into one and then initiated the fix in there</a:t>
-            </a:r>
-          </a:p>
-          <a:p>
-            <a:pPr lvl="2" indent="-342900">
-              <a:spcBef>
-                <a:spcPts val="0"/>
-              </a:spcBef>
-              <a:buSzPts val="1800"/>
-              <a:buChar char="●"/>
-            </a:pPr>
-            <a:endParaRPr lang="en-US" dirty="0"/>
           </a:p>
         </p:txBody>
       </p:sp>
@@ -9068,13 +9045,18 @@
               </a:spcAft>
             </a:pPr>
             <a:r>
-              <a:rPr lang="en-US" u="sng" dirty="0" err="1"/>
+              <a:rPr lang="en-US" u="sng" dirty="0"/>
               <a:t>Kumash</a:t>
             </a:r>
             <a:r>
               <a:rPr lang="en-US" dirty="0"/>
-              <a:t> – </a:t>
-            </a:r>
+              <a:t> – With less restrictions on API calls, the website could serve as a dashboard getting and updating various customized statistics in real time. The </a:t>
+            </a:r>
+            <a:r>
+              <a:rPr lang="en-US" dirty="0" err="1"/>
+              <a:t>treemap</a:t>
+            </a:r>
+            <a:endParaRPr lang="en-US" dirty="0"/>
           </a:p>
           <a:p>
             <a:pPr marL="285750" indent="-285750">
@@ -9088,13 +9070,8 @@
             </a:r>
             <a:r>
               <a:rPr lang="en-US" dirty="0"/>
-              <a:t> – as a portfolio viewer for your personal portfolio with no frills and room for additions if needed. No need for web broker simply add your portfolio info and show your </a:t>
-            </a:r>
-            <a:r>
-              <a:rPr lang="en-US"/>
-              <a:t>portfolio value</a:t>
-            </a:r>
-            <a:endParaRPr lang="en-US" dirty="0"/>
+              <a:t> – as a portfolio viewer for your personal portfolio with no frills and room for additions if needed. No need for web broker simply add your portfolio info and show your portfolio value</a:t>
+            </a:r>
           </a:p>
           <a:p>
             <a:pPr marL="285750" indent="-285750">

</xml_diff>

<commit_message>
updated presentation and README
</commit_message>
<xml_diff>
--- a/Rough work/Project Presentation.pptx
+++ b/Rough work/Project Presentation.pptx
@@ -122,23 +122,46 @@
 </p:presentation>
 </file>
 
+<file path=ppt/revisionInfo.xml><?xml version="1.0" encoding="utf-8"?>
+<p1510:revInfo xmlns:a="http://schemas.openxmlformats.org/drawingml/2006/main" xmlns:r="http://schemas.openxmlformats.org/officeDocument/2006/relationships" xmlns:p1510="http://schemas.microsoft.com/office/powerpoint/2015/10/main">
+  <p1510:revLst>
+    <p1510:client id="{DD9045EB-A58C-41D3-8E8B-23E208FC4E8F}" v="62" dt="2020-10-22T18:49:09.788"/>
+  </p1510:revLst>
+</p1510:revInfo>
+</file>
+
 <file path=ppt/changesInfos/changesInfo1.xml><?xml version="1.0" encoding="utf-8"?>
 <pc:chgInfo xmlns:a="http://schemas.openxmlformats.org/drawingml/2006/main" xmlns:r="http://schemas.openxmlformats.org/officeDocument/2006/relationships" xmlns:ac="http://schemas.microsoft.com/office/drawing/2013/main/command" xmlns:pc="http://schemas.microsoft.com/office/powerpoint/2013/main/command">
   <pc:docChgLst>
     <pc:chgData name="steven Traboulay" userId="962ebeb59d1ac312" providerId="LiveId" clId="{DD9045EB-A58C-41D3-8E8B-23E208FC4E8F}"/>
     <pc:docChg chg="undo custSel modSld">
-      <pc:chgData name="steven Traboulay" userId="962ebeb59d1ac312" providerId="LiveId" clId="{DD9045EB-A58C-41D3-8E8B-23E208FC4E8F}" dt="2020-10-21T23:29:10.201" v="1154" actId="20577"/>
+      <pc:chgData name="steven Traboulay" userId="962ebeb59d1ac312" providerId="LiveId" clId="{DD9045EB-A58C-41D3-8E8B-23E208FC4E8F}" dt="2020-10-22T18:49:09.788" v="1330"/>
       <pc:docMkLst>
         <pc:docMk/>
       </pc:docMkLst>
-      <pc:sldChg chg="modSp mod">
-        <pc:chgData name="steven Traboulay" userId="962ebeb59d1ac312" providerId="LiveId" clId="{DD9045EB-A58C-41D3-8E8B-23E208FC4E8F}" dt="2020-10-21T23:26:01.562" v="959" actId="20577"/>
+      <pc:sldChg chg="modSp mod modAnim">
+        <pc:chgData name="steven Traboulay" userId="962ebeb59d1ac312" providerId="LiveId" clId="{DD9045EB-A58C-41D3-8E8B-23E208FC4E8F}" dt="2020-10-22T18:25:54.481" v="1208"/>
+        <pc:sldMkLst>
+          <pc:docMk/>
+          <pc:sldMk cId="0" sldId="256"/>
+        </pc:sldMkLst>
+        <pc:spChg chg="mod">
+          <ac:chgData name="steven Traboulay" userId="962ebeb59d1ac312" providerId="LiveId" clId="{DD9045EB-A58C-41D3-8E8B-23E208FC4E8F}" dt="2020-10-22T18:25:33.127" v="1206" actId="115"/>
+          <ac:spMkLst>
+            <pc:docMk/>
+            <pc:sldMk cId="0" sldId="256"/>
+            <ac:spMk id="55" creationId="{00000000-0000-0000-0000-000000000000}"/>
+          </ac:spMkLst>
+        </pc:spChg>
+      </pc:sldChg>
+      <pc:sldChg chg="modSp mod modAnim">
+        <pc:chgData name="steven Traboulay" userId="962ebeb59d1ac312" providerId="LiveId" clId="{DD9045EB-A58C-41D3-8E8B-23E208FC4E8F}" dt="2020-10-22T18:27:06.408" v="1233"/>
         <pc:sldMkLst>
           <pc:docMk/>
           <pc:sldMk cId="0" sldId="257"/>
         </pc:sldMkLst>
         <pc:spChg chg="mod">
-          <ac:chgData name="steven Traboulay" userId="962ebeb59d1ac312" providerId="LiveId" clId="{DD9045EB-A58C-41D3-8E8B-23E208FC4E8F}" dt="2020-10-21T23:26:01.562" v="959" actId="20577"/>
+          <ac:chgData name="steven Traboulay" userId="962ebeb59d1ac312" providerId="LiveId" clId="{DD9045EB-A58C-41D3-8E8B-23E208FC4E8F}" dt="2020-10-22T18:26:42.891" v="1228" actId="20577"/>
           <ac:spMkLst>
             <pc:docMk/>
             <pc:sldMk cId="0" sldId="257"/>
@@ -146,8 +169,8 @@
           </ac:spMkLst>
         </pc:spChg>
       </pc:sldChg>
-      <pc:sldChg chg="modSp mod">
-        <pc:chgData name="steven Traboulay" userId="962ebeb59d1ac312" providerId="LiveId" clId="{DD9045EB-A58C-41D3-8E8B-23E208FC4E8F}" dt="2020-10-21T05:01:18.586" v="739" actId="1076"/>
+      <pc:sldChg chg="modSp mod modAnim">
+        <pc:chgData name="steven Traboulay" userId="962ebeb59d1ac312" providerId="LiveId" clId="{DD9045EB-A58C-41D3-8E8B-23E208FC4E8F}" dt="2020-10-22T18:29:03.783" v="1253" actId="20577"/>
         <pc:sldMkLst>
           <pc:docMk/>
           <pc:sldMk cId="0" sldId="258"/>
@@ -161,7 +184,7 @@
           </ac:spMkLst>
         </pc:spChg>
         <pc:spChg chg="mod">
-          <ac:chgData name="steven Traboulay" userId="962ebeb59d1ac312" providerId="LiveId" clId="{DD9045EB-A58C-41D3-8E8B-23E208FC4E8F}" dt="2020-10-21T05:01:14.581" v="738" actId="1076"/>
+          <ac:chgData name="steven Traboulay" userId="962ebeb59d1ac312" providerId="LiveId" clId="{DD9045EB-A58C-41D3-8E8B-23E208FC4E8F}" dt="2020-10-22T18:29:03.783" v="1253" actId="20577"/>
           <ac:spMkLst>
             <pc:docMk/>
             <pc:sldMk cId="0" sldId="258"/>
@@ -169,8 +192,22 @@
           </ac:spMkLst>
         </pc:spChg>
       </pc:sldChg>
-      <pc:sldChg chg="modSp mod">
-        <pc:chgData name="steven Traboulay" userId="962ebeb59d1ac312" providerId="LiveId" clId="{DD9045EB-A58C-41D3-8E8B-23E208FC4E8F}" dt="2020-10-21T23:29:10.201" v="1154" actId="20577"/>
+      <pc:sldChg chg="modAnim">
+        <pc:chgData name="steven Traboulay" userId="962ebeb59d1ac312" providerId="LiveId" clId="{DD9045EB-A58C-41D3-8E8B-23E208FC4E8F}" dt="2020-10-22T18:48:27.011" v="1322"/>
+        <pc:sldMkLst>
+          <pc:docMk/>
+          <pc:sldMk cId="0" sldId="259"/>
+        </pc:sldMkLst>
+      </pc:sldChg>
+      <pc:sldChg chg="modAnim">
+        <pc:chgData name="steven Traboulay" userId="962ebeb59d1ac312" providerId="LiveId" clId="{DD9045EB-A58C-41D3-8E8B-23E208FC4E8F}" dt="2020-10-22T18:48:55.712" v="1328"/>
+        <pc:sldMkLst>
+          <pc:docMk/>
+          <pc:sldMk cId="0" sldId="260"/>
+        </pc:sldMkLst>
+      </pc:sldChg>
+      <pc:sldChg chg="modSp mod modAnim">
+        <pc:chgData name="steven Traboulay" userId="962ebeb59d1ac312" providerId="LiveId" clId="{DD9045EB-A58C-41D3-8E8B-23E208FC4E8F}" dt="2020-10-22T18:49:03.192" v="1329"/>
         <pc:sldMkLst>
           <pc:docMk/>
           <pc:sldMk cId="0" sldId="261"/>
@@ -192,8 +229,8 @@
           </ac:spMkLst>
         </pc:spChg>
       </pc:sldChg>
-      <pc:sldChg chg="modSp mod">
-        <pc:chgData name="steven Traboulay" userId="962ebeb59d1ac312" providerId="LiveId" clId="{DD9045EB-A58C-41D3-8E8B-23E208FC4E8F}" dt="2020-10-21T05:07:45.562" v="790" actId="1076"/>
+      <pc:sldChg chg="modSp mod modAnim">
+        <pc:chgData name="steven Traboulay" userId="962ebeb59d1ac312" providerId="LiveId" clId="{DD9045EB-A58C-41D3-8E8B-23E208FC4E8F}" dt="2020-10-22T18:49:09.788" v="1330"/>
         <pc:sldMkLst>
           <pc:docMk/>
           <pc:sldMk cId="0" sldId="262"/>
@@ -207,8 +244,8 @@
           </ac:spMkLst>
         </pc:spChg>
       </pc:sldChg>
-      <pc:sldChg chg="modSp mod">
-        <pc:chgData name="steven Traboulay" userId="962ebeb59d1ac312" providerId="LiveId" clId="{DD9045EB-A58C-41D3-8E8B-23E208FC4E8F}" dt="2020-10-21T05:12:56.712" v="793" actId="1076"/>
+      <pc:sldChg chg="modSp mod modAnim">
+        <pc:chgData name="steven Traboulay" userId="962ebeb59d1ac312" providerId="LiveId" clId="{DD9045EB-A58C-41D3-8E8B-23E208FC4E8F}" dt="2020-10-22T18:48:50.695" v="1327"/>
         <pc:sldMkLst>
           <pc:docMk/>
           <pc:sldMk cId="1394374325" sldId="263"/>
@@ -219,6 +256,14 @@
             <pc:docMk/>
             <pc:sldMk cId="1394374325" sldId="263"/>
             <ac:spMk id="2" creationId="{03556144-1022-4AF7-BD53-85AC9D77326C}"/>
+          </ac:spMkLst>
+        </pc:spChg>
+        <pc:spChg chg="mod">
+          <ac:chgData name="steven Traboulay" userId="962ebeb59d1ac312" providerId="LiveId" clId="{DD9045EB-A58C-41D3-8E8B-23E208FC4E8F}" dt="2020-10-22T18:47:32.375" v="1315" actId="20577"/>
+          <ac:spMkLst>
+            <pc:docMk/>
+            <pc:sldMk cId="1394374325" sldId="263"/>
+            <ac:spMk id="3" creationId="{7DDAC4E4-AC90-4C79-A9C3-52BACBD2C6D8}"/>
           </ac:spMkLst>
         </pc:spChg>
       </pc:sldChg>
@@ -1728,7 +1773,7 @@
             <a:fld id="{B61BEF0D-F0BB-DE4B-95CE-6DB70DBA9567}" type="datetimeFigureOut">
               <a:rPr lang="en-US" dirty="0"/>
               <a:pPr/>
-              <a:t>10/21/2020</a:t>
+              <a:t>10/22/2020</a:t>
             </a:fld>
             <a:endParaRPr lang="en-US" dirty="0"/>
           </a:p>
@@ -2063,7 +2108,7 @@
             <a:fld id="{B61BEF0D-F0BB-DE4B-95CE-6DB70DBA9567}" type="datetimeFigureOut">
               <a:rPr lang="en-US" dirty="0"/>
               <a:pPr/>
-              <a:t>10/21/2020</a:t>
+              <a:t>10/22/2020</a:t>
             </a:fld>
             <a:endParaRPr lang="en-US" dirty="0"/>
           </a:p>
@@ -2322,7 +2367,7 @@
             <a:fld id="{B61BEF0D-F0BB-DE4B-95CE-6DB70DBA9567}" type="datetimeFigureOut">
               <a:rPr lang="en-US" dirty="0"/>
               <a:pPr/>
-              <a:t>10/21/2020</a:t>
+              <a:t>10/22/2020</a:t>
             </a:fld>
             <a:endParaRPr lang="en-US" dirty="0"/>
           </a:p>
@@ -2672,7 +2717,7 @@
             <a:fld id="{B61BEF0D-F0BB-DE4B-95CE-6DB70DBA9567}" type="datetimeFigureOut">
               <a:rPr lang="en-US" dirty="0"/>
               <a:pPr/>
-              <a:t>10/21/2020</a:t>
+              <a:t>10/22/2020</a:t>
             </a:fld>
             <a:endParaRPr lang="en-US" dirty="0"/>
           </a:p>
@@ -3030,7 +3075,7 @@
             <a:fld id="{B61BEF0D-F0BB-DE4B-95CE-6DB70DBA9567}" type="datetimeFigureOut">
               <a:rPr lang="en-US" dirty="0"/>
               <a:pPr/>
-              <a:t>10/21/2020</a:t>
+              <a:t>10/22/2020</a:t>
             </a:fld>
             <a:endParaRPr lang="en-US" dirty="0"/>
           </a:p>
@@ -3415,7 +3460,7 @@
             <a:fld id="{B61BEF0D-F0BB-DE4B-95CE-6DB70DBA9567}" type="datetimeFigureOut">
               <a:rPr lang="en-US" dirty="0"/>
               <a:pPr/>
-              <a:t>10/21/2020</a:t>
+              <a:t>10/22/2020</a:t>
             </a:fld>
             <a:endParaRPr lang="en-US" dirty="0"/>
           </a:p>
@@ -3896,7 +3941,7 @@
             <a:fld id="{B61BEF0D-F0BB-DE4B-95CE-6DB70DBA9567}" type="datetimeFigureOut">
               <a:rPr lang="en-US" dirty="0"/>
               <a:pPr/>
-              <a:t>10/21/2020</a:t>
+              <a:t>10/22/2020</a:t>
             </a:fld>
             <a:endParaRPr lang="en-US" dirty="0"/>
           </a:p>
@@ -4112,7 +4157,7 @@
             <a:fld id="{B61BEF0D-F0BB-DE4B-95CE-6DB70DBA9567}" type="datetimeFigureOut">
               <a:rPr lang="en-US" dirty="0"/>
               <a:pPr/>
-              <a:t>10/21/2020</a:t>
+              <a:t>10/22/2020</a:t>
             </a:fld>
             <a:endParaRPr lang="en-US" dirty="0"/>
           </a:p>
@@ -4334,7 +4379,7 @@
             <a:fld id="{B61BEF0D-F0BB-DE4B-95CE-6DB70DBA9567}" type="datetimeFigureOut">
               <a:rPr lang="en-US" dirty="0"/>
               <a:pPr/>
-              <a:t>10/21/2020</a:t>
+              <a:t>10/22/2020</a:t>
             </a:fld>
             <a:endParaRPr lang="en-US" dirty="0"/>
           </a:p>
@@ -5181,7 +5226,7 @@
           <a:p>
             <a:fld id="{52647F38-B617-4D2F-AE0A-013F0C4D2C57}" type="datetimeFigureOut">
               <a:rPr lang="en-US" dirty="0"/>
-              <a:t>10/21/2020</a:t>
+              <a:t>10/22/2020</a:t>
             </a:fld>
             <a:endParaRPr lang="en-US" dirty="0"/>
           </a:p>
@@ -5440,7 +5485,7 @@
             <a:fld id="{B61BEF0D-F0BB-DE4B-95CE-6DB70DBA9567}" type="datetimeFigureOut">
               <a:rPr lang="en-US" dirty="0"/>
               <a:pPr/>
-              <a:t>10/21/2020</a:t>
+              <a:t>10/22/2020</a:t>
             </a:fld>
             <a:endParaRPr lang="en-US" dirty="0"/>
           </a:p>
@@ -5748,7 +5793,7 @@
           <a:p>
             <a:fld id="{05BFA754-D5C3-4E66-96A6-867B257F58DC}" type="datetimeFigureOut">
               <a:rPr lang="en-US" dirty="0"/>
-              <a:t>10/21/2020</a:t>
+              <a:t>10/22/2020</a:t>
             </a:fld>
             <a:endParaRPr lang="en-US" dirty="0"/>
           </a:p>
@@ -6153,7 +6198,7 @@
             <a:fld id="{B61BEF0D-F0BB-DE4B-95CE-6DB70DBA9567}" type="datetimeFigureOut">
               <a:rPr lang="en-US" dirty="0"/>
               <a:pPr/>
-              <a:t>10/21/2020</a:t>
+              <a:t>10/22/2020</a:t>
             </a:fld>
             <a:endParaRPr lang="en-US" dirty="0"/>
           </a:p>
@@ -6313,7 +6358,7 @@
             <a:fld id="{B61BEF0D-F0BB-DE4B-95CE-6DB70DBA9567}" type="datetimeFigureOut">
               <a:rPr lang="en-US" dirty="0"/>
               <a:pPr/>
-              <a:t>10/21/2020</a:t>
+              <a:t>10/22/2020</a:t>
             </a:fld>
             <a:endParaRPr lang="en-US" dirty="0"/>
           </a:p>
@@ -6450,7 +6495,7 @@
             <a:fld id="{B61BEF0D-F0BB-DE4B-95CE-6DB70DBA9567}" type="datetimeFigureOut">
               <a:rPr lang="en-US" dirty="0"/>
               <a:pPr/>
-              <a:t>10/21/2020</a:t>
+              <a:t>10/22/2020</a:t>
             </a:fld>
             <a:endParaRPr lang="en-US" dirty="0"/>
           </a:p>
@@ -6715,7 +6760,7 @@
             <a:fld id="{B61BEF0D-F0BB-DE4B-95CE-6DB70DBA9567}" type="datetimeFigureOut">
               <a:rPr lang="en-US" dirty="0"/>
               <a:pPr/>
-              <a:t>10/21/2020</a:t>
+              <a:t>10/22/2020</a:t>
             </a:fld>
             <a:endParaRPr lang="en-US" dirty="0"/>
           </a:p>
@@ -7041,7 +7086,7 @@
             <a:fld id="{B61BEF0D-F0BB-DE4B-95CE-6DB70DBA9567}" type="datetimeFigureOut">
               <a:rPr lang="en-US" dirty="0"/>
               <a:pPr/>
-              <a:t>10/21/2020</a:t>
+              <a:t>10/22/2020</a:t>
             </a:fld>
             <a:endParaRPr lang="en-US" dirty="0"/>
           </a:p>
@@ -7403,7 +7448,7 @@
             <a:fld id="{B61BEF0D-F0BB-DE4B-95CE-6DB70DBA9567}" type="datetimeFigureOut">
               <a:rPr lang="en-US" dirty="0"/>
               <a:pPr/>
-              <a:t>10/21/2020</a:t>
+              <a:t>10/22/2020</a:t>
             </a:fld>
             <a:endParaRPr lang="en-US" dirty="0"/>
           </a:p>
@@ -8027,18 +8072,14 @@
               <a:buNone/>
             </a:pPr>
             <a:r>
-              <a:rPr lang="en" dirty="0">
-                <a:highlight>
-                  <a:srgbClr val="FFFF00"/>
-                </a:highlight>
-              </a:rPr>
-              <a:t>This is strictly for us to follow along – we don’t need powerpoint as a crutch – we can talk</a:t>
-            </a:r>
-            <a:endParaRPr dirty="0">
-              <a:highlight>
-                <a:srgbClr val="FFFF00"/>
-              </a:highlight>
-            </a:endParaRPr>
+              <a:rPr lang="en-CA" u="sng" dirty="0"/>
+              <a:t>B</a:t>
+            </a:r>
+            <a:r>
+              <a:rPr lang="en" u="sng" dirty="0"/>
+              <a:t>y: Asghar, Kumash and Steven</a:t>
+            </a:r>
+            <a:endParaRPr u="sng" dirty="0"/>
           </a:p>
         </p:txBody>
       </p:sp>
@@ -8047,6 +8088,153 @@
   <p:clrMapOvr>
     <a:masterClrMapping/>
   </p:clrMapOvr>
+  <p:timing>
+    <p:tnLst>
+      <p:par>
+        <p:cTn id="1" dur="indefinite" restart="never" nodeType="tmRoot">
+          <p:childTnLst>
+            <p:seq concurrent="1" nextAc="seek">
+              <p:cTn id="2" dur="indefinite" nodeType="mainSeq">
+                <p:childTnLst>
+                  <p:par>
+                    <p:cTn id="3" fill="hold">
+                      <p:stCondLst>
+                        <p:cond delay="indefinite"/>
+                      </p:stCondLst>
+                      <p:childTnLst>
+                        <p:par>
+                          <p:cTn id="4" fill="hold">
+                            <p:stCondLst>
+                              <p:cond delay="0"/>
+                            </p:stCondLst>
+                            <p:childTnLst>
+                              <p:par>
+                                <p:cTn id="5" presetID="10" presetClass="entr" presetSubtype="0" fill="hold" grpId="0" nodeType="clickEffect">
+                                  <p:stCondLst>
+                                    <p:cond delay="0"/>
+                                  </p:stCondLst>
+                                  <p:childTnLst>
+                                    <p:set>
+                                      <p:cBhvr>
+                                        <p:cTn id="6" dur="1" fill="hold">
+                                          <p:stCondLst>
+                                            <p:cond delay="0"/>
+                                          </p:stCondLst>
+                                        </p:cTn>
+                                        <p:tgtEl>
+                                          <p:spTgt spid="54"/>
+                                        </p:tgtEl>
+                                        <p:attrNameLst>
+                                          <p:attrName>style.visibility</p:attrName>
+                                        </p:attrNameLst>
+                                      </p:cBhvr>
+                                      <p:to>
+                                        <p:strVal val="visible"/>
+                                      </p:to>
+                                    </p:set>
+                                    <p:animEffect transition="in" filter="fade">
+                                      <p:cBhvr>
+                                        <p:cTn id="7" dur="500"/>
+                                        <p:tgtEl>
+                                          <p:spTgt spid="54"/>
+                                        </p:tgtEl>
+                                      </p:cBhvr>
+                                    </p:animEffect>
+                                  </p:childTnLst>
+                                </p:cTn>
+                              </p:par>
+                            </p:childTnLst>
+                          </p:cTn>
+                        </p:par>
+                      </p:childTnLst>
+                    </p:cTn>
+                  </p:par>
+                  <p:par>
+                    <p:cTn id="8" fill="hold">
+                      <p:stCondLst>
+                        <p:cond delay="indefinite"/>
+                      </p:stCondLst>
+                      <p:childTnLst>
+                        <p:par>
+                          <p:cTn id="9" fill="hold">
+                            <p:stCondLst>
+                              <p:cond delay="0"/>
+                            </p:stCondLst>
+                            <p:childTnLst>
+                              <p:par>
+                                <p:cTn id="10" presetID="10" presetClass="entr" presetSubtype="0" fill="hold" nodeType="clickEffect">
+                                  <p:stCondLst>
+                                    <p:cond delay="0"/>
+                                  </p:stCondLst>
+                                  <p:childTnLst>
+                                    <p:set>
+                                      <p:cBhvr>
+                                        <p:cTn id="11" dur="1" fill="hold">
+                                          <p:stCondLst>
+                                            <p:cond delay="0"/>
+                                          </p:stCondLst>
+                                        </p:cTn>
+                                        <p:tgtEl>
+                                          <p:spTgt spid="55">
+                                            <p:txEl>
+                                              <p:pRg st="0" end="0"/>
+                                            </p:txEl>
+                                          </p:spTgt>
+                                        </p:tgtEl>
+                                        <p:attrNameLst>
+                                          <p:attrName>style.visibility</p:attrName>
+                                        </p:attrNameLst>
+                                      </p:cBhvr>
+                                      <p:to>
+                                        <p:strVal val="visible"/>
+                                      </p:to>
+                                    </p:set>
+                                    <p:animEffect transition="in" filter="fade">
+                                      <p:cBhvr>
+                                        <p:cTn id="12" dur="500"/>
+                                        <p:tgtEl>
+                                          <p:spTgt spid="55">
+                                            <p:txEl>
+                                              <p:pRg st="0" end="0"/>
+                                            </p:txEl>
+                                          </p:spTgt>
+                                        </p:tgtEl>
+                                      </p:cBhvr>
+                                    </p:animEffect>
+                                  </p:childTnLst>
+                                </p:cTn>
+                              </p:par>
+                            </p:childTnLst>
+                          </p:cTn>
+                        </p:par>
+                      </p:childTnLst>
+                    </p:cTn>
+                  </p:par>
+                </p:childTnLst>
+              </p:cTn>
+              <p:prevCondLst>
+                <p:cond evt="onPrev" delay="0">
+                  <p:tgtEl>
+                    <p:sldTgt/>
+                  </p:tgtEl>
+                </p:cond>
+              </p:prevCondLst>
+              <p:nextCondLst>
+                <p:cond evt="onNext" delay="0">
+                  <p:tgtEl>
+                    <p:sldTgt/>
+                  </p:tgtEl>
+                </p:cond>
+              </p:nextCondLst>
+            </p:seq>
+          </p:childTnLst>
+        </p:cTn>
+      </p:par>
+    </p:tnLst>
+    <p:bldLst>
+      <p:bldP spid="54" grpId="0"/>
+    </p:bldLst>
+  </p:timing>
 </p:sld>
 </file>
 
@@ -8107,7 +8295,7 @@
             </a:r>
             <a:r>
               <a:rPr lang="en-US" dirty="0"/>
-              <a:t> – can introduce, discuss target audience and our process to get here.</a:t>
+              <a:t> – Intro, target audience and our process to get here.</a:t>
             </a:r>
             <a:br>
               <a:rPr lang="en-US" dirty="0"/>
@@ -8118,7 +8306,7 @@
             </a:r>
             <a:r>
               <a:rPr lang="en-US" dirty="0"/>
-              <a:t> – can discuss general features, calls.</a:t>
+              <a:t> –General features, calls.</a:t>
             </a:r>
             <a:br>
               <a:rPr lang="en-US" dirty="0"/>
@@ -8129,7 +8317,7 @@
             </a:r>
             <a:r>
               <a:rPr lang="en-US" dirty="0"/>
-              <a:t> – Discuss the market cap visualization, general features and integration of app. </a:t>
+              <a:t> –Market cap visualization, general features and integration of app. </a:t>
             </a:r>
             <a:br>
               <a:rPr lang="en-US" dirty="0"/>
@@ -8143,6 +8331,92 @@
   <p:clrMapOvr>
     <a:masterClrMapping/>
   </p:clrMapOvr>
+  <p:timing>
+    <p:tnLst>
+      <p:par>
+        <p:cTn id="1" dur="indefinite" restart="never" nodeType="tmRoot">
+          <p:childTnLst>
+            <p:seq concurrent="1" nextAc="seek">
+              <p:cTn id="2" dur="indefinite" nodeType="mainSeq">
+                <p:childTnLst>
+                  <p:par>
+                    <p:cTn id="3" fill="hold">
+                      <p:stCondLst>
+                        <p:cond delay="indefinite"/>
+                      </p:stCondLst>
+                      <p:childTnLst>
+                        <p:par>
+                          <p:cTn id="4" fill="hold">
+                            <p:stCondLst>
+                              <p:cond delay="0"/>
+                            </p:stCondLst>
+                            <p:childTnLst>
+                              <p:par>
+                                <p:cTn id="5" presetID="16" presetClass="entr" presetSubtype="42" fill="hold" grpId="0" nodeType="clickEffect">
+                                  <p:stCondLst>
+                                    <p:cond delay="0"/>
+                                  </p:stCondLst>
+                                  <p:childTnLst>
+                                    <p:set>
+                                      <p:cBhvr>
+                                        <p:cTn id="6" dur="1" fill="hold">
+                                          <p:stCondLst>
+                                            <p:cond delay="0"/>
+                                          </p:stCondLst>
+                                        </p:cTn>
+                                        <p:tgtEl>
+                                          <p:spTgt spid="60"/>
+                                        </p:tgtEl>
+                                        <p:attrNameLst>
+                                          <p:attrName>style.visibility</p:attrName>
+                                        </p:attrNameLst>
+                                      </p:cBhvr>
+                                      <p:to>
+                                        <p:strVal val="visible"/>
+                                      </p:to>
+                                    </p:set>
+                                    <p:animEffect transition="in" filter="barn(outHorizontal)">
+                                      <p:cBhvr>
+                                        <p:cTn id="7" dur="500"/>
+                                        <p:tgtEl>
+                                          <p:spTgt spid="60"/>
+                                        </p:tgtEl>
+                                      </p:cBhvr>
+                                    </p:animEffect>
+                                  </p:childTnLst>
+                                </p:cTn>
+                              </p:par>
+                            </p:childTnLst>
+                          </p:cTn>
+                        </p:par>
+                      </p:childTnLst>
+                    </p:cTn>
+                  </p:par>
+                </p:childTnLst>
+              </p:cTn>
+              <p:prevCondLst>
+                <p:cond evt="onPrev" delay="0">
+                  <p:tgtEl>
+                    <p:sldTgt/>
+                  </p:tgtEl>
+                </p:cond>
+              </p:prevCondLst>
+              <p:nextCondLst>
+                <p:cond evt="onNext" delay="0">
+                  <p:tgtEl>
+                    <p:sldTgt/>
+                  </p:tgtEl>
+                </p:cond>
+              </p:nextCondLst>
+            </p:seq>
+          </p:childTnLst>
+        </p:cTn>
+      </p:par>
+    </p:tnLst>
+    <p:bldLst>
+      <p:bldP spid="60" grpId="0"/>
+    </p:bldLst>
+  </p:timing>
 </p:sld>
 </file>
 
@@ -8340,7 +8614,50 @@
             </a:pPr>
             <a:r>
               <a:rPr lang="en" dirty="0"/>
-              <a:t>User story</a:t>
+              <a:t>User story:</a:t>
+            </a:r>
+          </a:p>
+          <a:p>
+            <a:pPr lvl="1" indent="-342900">
+              <a:spcBef>
+                <a:spcPts val="0"/>
+              </a:spcBef>
+              <a:buSzPts val="1800"/>
+              <a:buChar char="●"/>
+            </a:pPr>
+            <a:r>
+              <a:rPr lang="en" dirty="0"/>
+              <a:t>Who?</a:t>
+            </a:r>
+          </a:p>
+          <a:p>
+            <a:pPr lvl="1" indent="-342900">
+              <a:spcBef>
+                <a:spcPts val="0"/>
+              </a:spcBef>
+              <a:buSzPts val="1800"/>
+              <a:buChar char="●"/>
+            </a:pPr>
+            <a:r>
+              <a:rPr lang="en-CA" dirty="0"/>
+              <a:t>W</a:t>
+            </a:r>
+            <a:r>
+              <a:rPr lang="en" dirty="0"/>
+              <a:t>hat?</a:t>
+            </a:r>
+          </a:p>
+          <a:p>
+            <a:pPr lvl="1" indent="-342900">
+              <a:spcBef>
+                <a:spcPts val="0"/>
+              </a:spcBef>
+              <a:buSzPts val="1800"/>
+              <a:buChar char="●"/>
+            </a:pPr>
+            <a:r>
+              <a:rPr lang="en" dirty="0"/>
+              <a:t>Why?</a:t>
             </a:r>
             <a:endParaRPr dirty="0"/>
           </a:p>
@@ -8351,6 +8668,1063 @@
   <p:clrMapOvr>
     <a:masterClrMapping/>
   </p:clrMapOvr>
+  <p:timing>
+    <p:tnLst>
+      <p:par>
+        <p:cTn id="1" dur="indefinite" restart="never" nodeType="tmRoot">
+          <p:childTnLst>
+            <p:seq concurrent="1" nextAc="seek">
+              <p:cTn id="2" dur="indefinite" nodeType="mainSeq">
+                <p:childTnLst>
+                  <p:par>
+                    <p:cTn id="3" fill="hold">
+                      <p:stCondLst>
+                        <p:cond delay="indefinite"/>
+                      </p:stCondLst>
+                      <p:childTnLst>
+                        <p:par>
+                          <p:cTn id="4" fill="hold">
+                            <p:stCondLst>
+                              <p:cond delay="0"/>
+                            </p:stCondLst>
+                            <p:childTnLst>
+                              <p:par>
+                                <p:cTn id="5" presetID="42" presetClass="entr" presetSubtype="0" fill="hold" grpId="0" nodeType="clickEffect">
+                                  <p:stCondLst>
+                                    <p:cond delay="0"/>
+                                  </p:stCondLst>
+                                  <p:childTnLst>
+                                    <p:set>
+                                      <p:cBhvr>
+                                        <p:cTn id="6" dur="1" fill="hold">
+                                          <p:stCondLst>
+                                            <p:cond delay="0"/>
+                                          </p:stCondLst>
+                                        </p:cTn>
+                                        <p:tgtEl>
+                                          <p:spTgt spid="66">
+                                            <p:txEl>
+                                              <p:pRg st="0" end="0"/>
+                                            </p:txEl>
+                                          </p:spTgt>
+                                        </p:tgtEl>
+                                        <p:attrNameLst>
+                                          <p:attrName>style.visibility</p:attrName>
+                                        </p:attrNameLst>
+                                      </p:cBhvr>
+                                      <p:to>
+                                        <p:strVal val="visible"/>
+                                      </p:to>
+                                    </p:set>
+                                    <p:animEffect transition="in" filter="fade">
+                                      <p:cBhvr>
+                                        <p:cTn id="7" dur="1000"/>
+                                        <p:tgtEl>
+                                          <p:spTgt spid="66">
+                                            <p:txEl>
+                                              <p:pRg st="0" end="0"/>
+                                            </p:txEl>
+                                          </p:spTgt>
+                                        </p:tgtEl>
+                                      </p:cBhvr>
+                                    </p:animEffect>
+                                    <p:anim calcmode="lin" valueType="num">
+                                      <p:cBhvr>
+                                        <p:cTn id="8" dur="1000" fill="hold"/>
+                                        <p:tgtEl>
+                                          <p:spTgt spid="66">
+                                            <p:txEl>
+                                              <p:pRg st="0" end="0"/>
+                                            </p:txEl>
+                                          </p:spTgt>
+                                        </p:tgtEl>
+                                        <p:attrNameLst>
+                                          <p:attrName>ppt_x</p:attrName>
+                                        </p:attrNameLst>
+                                      </p:cBhvr>
+                                      <p:tavLst>
+                                        <p:tav tm="0">
+                                          <p:val>
+                                            <p:strVal val="#ppt_x"/>
+                                          </p:val>
+                                        </p:tav>
+                                        <p:tav tm="100000">
+                                          <p:val>
+                                            <p:strVal val="#ppt_x"/>
+                                          </p:val>
+                                        </p:tav>
+                                      </p:tavLst>
+                                    </p:anim>
+                                    <p:anim calcmode="lin" valueType="num">
+                                      <p:cBhvr>
+                                        <p:cTn id="9" dur="1000" fill="hold"/>
+                                        <p:tgtEl>
+                                          <p:spTgt spid="66">
+                                            <p:txEl>
+                                              <p:pRg st="0" end="0"/>
+                                            </p:txEl>
+                                          </p:spTgt>
+                                        </p:tgtEl>
+                                        <p:attrNameLst>
+                                          <p:attrName>ppt_y</p:attrName>
+                                        </p:attrNameLst>
+                                      </p:cBhvr>
+                                      <p:tavLst>
+                                        <p:tav tm="0">
+                                          <p:val>
+                                            <p:strVal val="#ppt_y+.1"/>
+                                          </p:val>
+                                        </p:tav>
+                                        <p:tav tm="100000">
+                                          <p:val>
+                                            <p:strVal val="#ppt_y"/>
+                                          </p:val>
+                                        </p:tav>
+                                      </p:tavLst>
+                                    </p:anim>
+                                  </p:childTnLst>
+                                </p:cTn>
+                              </p:par>
+                              <p:par>
+                                <p:cTn id="10" presetID="42" presetClass="entr" presetSubtype="0" fill="hold" grpId="0" nodeType="withEffect">
+                                  <p:stCondLst>
+                                    <p:cond delay="0"/>
+                                  </p:stCondLst>
+                                  <p:childTnLst>
+                                    <p:set>
+                                      <p:cBhvr>
+                                        <p:cTn id="11" dur="1" fill="hold">
+                                          <p:stCondLst>
+                                            <p:cond delay="0"/>
+                                          </p:stCondLst>
+                                        </p:cTn>
+                                        <p:tgtEl>
+                                          <p:spTgt spid="66">
+                                            <p:txEl>
+                                              <p:pRg st="1" end="1"/>
+                                            </p:txEl>
+                                          </p:spTgt>
+                                        </p:tgtEl>
+                                        <p:attrNameLst>
+                                          <p:attrName>style.visibility</p:attrName>
+                                        </p:attrNameLst>
+                                      </p:cBhvr>
+                                      <p:to>
+                                        <p:strVal val="visible"/>
+                                      </p:to>
+                                    </p:set>
+                                    <p:animEffect transition="in" filter="fade">
+                                      <p:cBhvr>
+                                        <p:cTn id="12" dur="1000"/>
+                                        <p:tgtEl>
+                                          <p:spTgt spid="66">
+                                            <p:txEl>
+                                              <p:pRg st="1" end="1"/>
+                                            </p:txEl>
+                                          </p:spTgt>
+                                        </p:tgtEl>
+                                      </p:cBhvr>
+                                    </p:animEffect>
+                                    <p:anim calcmode="lin" valueType="num">
+                                      <p:cBhvr>
+                                        <p:cTn id="13" dur="1000" fill="hold"/>
+                                        <p:tgtEl>
+                                          <p:spTgt spid="66">
+                                            <p:txEl>
+                                              <p:pRg st="1" end="1"/>
+                                            </p:txEl>
+                                          </p:spTgt>
+                                        </p:tgtEl>
+                                        <p:attrNameLst>
+                                          <p:attrName>ppt_x</p:attrName>
+                                        </p:attrNameLst>
+                                      </p:cBhvr>
+                                      <p:tavLst>
+                                        <p:tav tm="0">
+                                          <p:val>
+                                            <p:strVal val="#ppt_x"/>
+                                          </p:val>
+                                        </p:tav>
+                                        <p:tav tm="100000">
+                                          <p:val>
+                                            <p:strVal val="#ppt_x"/>
+                                          </p:val>
+                                        </p:tav>
+                                      </p:tavLst>
+                                    </p:anim>
+                                    <p:anim calcmode="lin" valueType="num">
+                                      <p:cBhvr>
+                                        <p:cTn id="14" dur="1000" fill="hold"/>
+                                        <p:tgtEl>
+                                          <p:spTgt spid="66">
+                                            <p:txEl>
+                                              <p:pRg st="1" end="1"/>
+                                            </p:txEl>
+                                          </p:spTgt>
+                                        </p:tgtEl>
+                                        <p:attrNameLst>
+                                          <p:attrName>ppt_y</p:attrName>
+                                        </p:attrNameLst>
+                                      </p:cBhvr>
+                                      <p:tavLst>
+                                        <p:tav tm="0">
+                                          <p:val>
+                                            <p:strVal val="#ppt_y+.1"/>
+                                          </p:val>
+                                        </p:tav>
+                                        <p:tav tm="100000">
+                                          <p:val>
+                                            <p:strVal val="#ppt_y"/>
+                                          </p:val>
+                                        </p:tav>
+                                      </p:tavLst>
+                                    </p:anim>
+                                  </p:childTnLst>
+                                </p:cTn>
+                              </p:par>
+                            </p:childTnLst>
+                          </p:cTn>
+                        </p:par>
+                      </p:childTnLst>
+                    </p:cTn>
+                  </p:par>
+                  <p:par>
+                    <p:cTn id="15" fill="hold">
+                      <p:stCondLst>
+                        <p:cond delay="indefinite"/>
+                      </p:stCondLst>
+                      <p:childTnLst>
+                        <p:par>
+                          <p:cTn id="16" fill="hold">
+                            <p:stCondLst>
+                              <p:cond delay="0"/>
+                            </p:stCondLst>
+                            <p:childTnLst>
+                              <p:par>
+                                <p:cTn id="17" presetID="42" presetClass="entr" presetSubtype="0" fill="hold" grpId="0" nodeType="clickEffect">
+                                  <p:stCondLst>
+                                    <p:cond delay="0"/>
+                                  </p:stCondLst>
+                                  <p:childTnLst>
+                                    <p:set>
+                                      <p:cBhvr>
+                                        <p:cTn id="18" dur="1" fill="hold">
+                                          <p:stCondLst>
+                                            <p:cond delay="0"/>
+                                          </p:stCondLst>
+                                        </p:cTn>
+                                        <p:tgtEl>
+                                          <p:spTgt spid="66">
+                                            <p:txEl>
+                                              <p:pRg st="2" end="2"/>
+                                            </p:txEl>
+                                          </p:spTgt>
+                                        </p:tgtEl>
+                                        <p:attrNameLst>
+                                          <p:attrName>style.visibility</p:attrName>
+                                        </p:attrNameLst>
+                                      </p:cBhvr>
+                                      <p:to>
+                                        <p:strVal val="visible"/>
+                                      </p:to>
+                                    </p:set>
+                                    <p:animEffect transition="in" filter="fade">
+                                      <p:cBhvr>
+                                        <p:cTn id="19" dur="1000"/>
+                                        <p:tgtEl>
+                                          <p:spTgt spid="66">
+                                            <p:txEl>
+                                              <p:pRg st="2" end="2"/>
+                                            </p:txEl>
+                                          </p:spTgt>
+                                        </p:tgtEl>
+                                      </p:cBhvr>
+                                    </p:animEffect>
+                                    <p:anim calcmode="lin" valueType="num">
+                                      <p:cBhvr>
+                                        <p:cTn id="20" dur="1000" fill="hold"/>
+                                        <p:tgtEl>
+                                          <p:spTgt spid="66">
+                                            <p:txEl>
+                                              <p:pRg st="2" end="2"/>
+                                            </p:txEl>
+                                          </p:spTgt>
+                                        </p:tgtEl>
+                                        <p:attrNameLst>
+                                          <p:attrName>ppt_x</p:attrName>
+                                        </p:attrNameLst>
+                                      </p:cBhvr>
+                                      <p:tavLst>
+                                        <p:tav tm="0">
+                                          <p:val>
+                                            <p:strVal val="#ppt_x"/>
+                                          </p:val>
+                                        </p:tav>
+                                        <p:tav tm="100000">
+                                          <p:val>
+                                            <p:strVal val="#ppt_x"/>
+                                          </p:val>
+                                        </p:tav>
+                                      </p:tavLst>
+                                    </p:anim>
+                                    <p:anim calcmode="lin" valueType="num">
+                                      <p:cBhvr>
+                                        <p:cTn id="21" dur="1000" fill="hold"/>
+                                        <p:tgtEl>
+                                          <p:spTgt spid="66">
+                                            <p:txEl>
+                                              <p:pRg st="2" end="2"/>
+                                            </p:txEl>
+                                          </p:spTgt>
+                                        </p:tgtEl>
+                                        <p:attrNameLst>
+                                          <p:attrName>ppt_y</p:attrName>
+                                        </p:attrNameLst>
+                                      </p:cBhvr>
+                                      <p:tavLst>
+                                        <p:tav tm="0">
+                                          <p:val>
+                                            <p:strVal val="#ppt_y+.1"/>
+                                          </p:val>
+                                        </p:tav>
+                                        <p:tav tm="100000">
+                                          <p:val>
+                                            <p:strVal val="#ppt_y"/>
+                                          </p:val>
+                                        </p:tav>
+                                      </p:tavLst>
+                                    </p:anim>
+                                  </p:childTnLst>
+                                </p:cTn>
+                              </p:par>
+                              <p:par>
+                                <p:cTn id="22" presetID="42" presetClass="entr" presetSubtype="0" fill="hold" grpId="0" nodeType="withEffect">
+                                  <p:stCondLst>
+                                    <p:cond delay="0"/>
+                                  </p:stCondLst>
+                                  <p:childTnLst>
+                                    <p:set>
+                                      <p:cBhvr>
+                                        <p:cTn id="23" dur="1" fill="hold">
+                                          <p:stCondLst>
+                                            <p:cond delay="0"/>
+                                          </p:stCondLst>
+                                        </p:cTn>
+                                        <p:tgtEl>
+                                          <p:spTgt spid="66">
+                                            <p:txEl>
+                                              <p:pRg st="3" end="3"/>
+                                            </p:txEl>
+                                          </p:spTgt>
+                                        </p:tgtEl>
+                                        <p:attrNameLst>
+                                          <p:attrName>style.visibility</p:attrName>
+                                        </p:attrNameLst>
+                                      </p:cBhvr>
+                                      <p:to>
+                                        <p:strVal val="visible"/>
+                                      </p:to>
+                                    </p:set>
+                                    <p:animEffect transition="in" filter="fade">
+                                      <p:cBhvr>
+                                        <p:cTn id="24" dur="1000"/>
+                                        <p:tgtEl>
+                                          <p:spTgt spid="66">
+                                            <p:txEl>
+                                              <p:pRg st="3" end="3"/>
+                                            </p:txEl>
+                                          </p:spTgt>
+                                        </p:tgtEl>
+                                      </p:cBhvr>
+                                    </p:animEffect>
+                                    <p:anim calcmode="lin" valueType="num">
+                                      <p:cBhvr>
+                                        <p:cTn id="25" dur="1000" fill="hold"/>
+                                        <p:tgtEl>
+                                          <p:spTgt spid="66">
+                                            <p:txEl>
+                                              <p:pRg st="3" end="3"/>
+                                            </p:txEl>
+                                          </p:spTgt>
+                                        </p:tgtEl>
+                                        <p:attrNameLst>
+                                          <p:attrName>ppt_x</p:attrName>
+                                        </p:attrNameLst>
+                                      </p:cBhvr>
+                                      <p:tavLst>
+                                        <p:tav tm="0">
+                                          <p:val>
+                                            <p:strVal val="#ppt_x"/>
+                                          </p:val>
+                                        </p:tav>
+                                        <p:tav tm="100000">
+                                          <p:val>
+                                            <p:strVal val="#ppt_x"/>
+                                          </p:val>
+                                        </p:tav>
+                                      </p:tavLst>
+                                    </p:anim>
+                                    <p:anim calcmode="lin" valueType="num">
+                                      <p:cBhvr>
+                                        <p:cTn id="26" dur="1000" fill="hold"/>
+                                        <p:tgtEl>
+                                          <p:spTgt spid="66">
+                                            <p:txEl>
+                                              <p:pRg st="3" end="3"/>
+                                            </p:txEl>
+                                          </p:spTgt>
+                                        </p:tgtEl>
+                                        <p:attrNameLst>
+                                          <p:attrName>ppt_y</p:attrName>
+                                        </p:attrNameLst>
+                                      </p:cBhvr>
+                                      <p:tavLst>
+                                        <p:tav tm="0">
+                                          <p:val>
+                                            <p:strVal val="#ppt_y+.1"/>
+                                          </p:val>
+                                        </p:tav>
+                                        <p:tav tm="100000">
+                                          <p:val>
+                                            <p:strVal val="#ppt_y"/>
+                                          </p:val>
+                                        </p:tav>
+                                      </p:tavLst>
+                                    </p:anim>
+                                  </p:childTnLst>
+                                </p:cTn>
+                              </p:par>
+                              <p:par>
+                                <p:cTn id="27" presetID="42" presetClass="entr" presetSubtype="0" fill="hold" grpId="0" nodeType="withEffect">
+                                  <p:stCondLst>
+                                    <p:cond delay="0"/>
+                                  </p:stCondLst>
+                                  <p:childTnLst>
+                                    <p:set>
+                                      <p:cBhvr>
+                                        <p:cTn id="28" dur="1" fill="hold">
+                                          <p:stCondLst>
+                                            <p:cond delay="0"/>
+                                          </p:stCondLst>
+                                        </p:cTn>
+                                        <p:tgtEl>
+                                          <p:spTgt spid="66">
+                                            <p:txEl>
+                                              <p:pRg st="4" end="4"/>
+                                            </p:txEl>
+                                          </p:spTgt>
+                                        </p:tgtEl>
+                                        <p:attrNameLst>
+                                          <p:attrName>style.visibility</p:attrName>
+                                        </p:attrNameLst>
+                                      </p:cBhvr>
+                                      <p:to>
+                                        <p:strVal val="visible"/>
+                                      </p:to>
+                                    </p:set>
+                                    <p:animEffect transition="in" filter="fade">
+                                      <p:cBhvr>
+                                        <p:cTn id="29" dur="1000"/>
+                                        <p:tgtEl>
+                                          <p:spTgt spid="66">
+                                            <p:txEl>
+                                              <p:pRg st="4" end="4"/>
+                                            </p:txEl>
+                                          </p:spTgt>
+                                        </p:tgtEl>
+                                      </p:cBhvr>
+                                    </p:animEffect>
+                                    <p:anim calcmode="lin" valueType="num">
+                                      <p:cBhvr>
+                                        <p:cTn id="30" dur="1000" fill="hold"/>
+                                        <p:tgtEl>
+                                          <p:spTgt spid="66">
+                                            <p:txEl>
+                                              <p:pRg st="4" end="4"/>
+                                            </p:txEl>
+                                          </p:spTgt>
+                                        </p:tgtEl>
+                                        <p:attrNameLst>
+                                          <p:attrName>ppt_x</p:attrName>
+                                        </p:attrNameLst>
+                                      </p:cBhvr>
+                                      <p:tavLst>
+                                        <p:tav tm="0">
+                                          <p:val>
+                                            <p:strVal val="#ppt_x"/>
+                                          </p:val>
+                                        </p:tav>
+                                        <p:tav tm="100000">
+                                          <p:val>
+                                            <p:strVal val="#ppt_x"/>
+                                          </p:val>
+                                        </p:tav>
+                                      </p:tavLst>
+                                    </p:anim>
+                                    <p:anim calcmode="lin" valueType="num">
+                                      <p:cBhvr>
+                                        <p:cTn id="31" dur="1000" fill="hold"/>
+                                        <p:tgtEl>
+                                          <p:spTgt spid="66">
+                                            <p:txEl>
+                                              <p:pRg st="4" end="4"/>
+                                            </p:txEl>
+                                          </p:spTgt>
+                                        </p:tgtEl>
+                                        <p:attrNameLst>
+                                          <p:attrName>ppt_y</p:attrName>
+                                        </p:attrNameLst>
+                                      </p:cBhvr>
+                                      <p:tavLst>
+                                        <p:tav tm="0">
+                                          <p:val>
+                                            <p:strVal val="#ppt_y+.1"/>
+                                          </p:val>
+                                        </p:tav>
+                                        <p:tav tm="100000">
+                                          <p:val>
+                                            <p:strVal val="#ppt_y"/>
+                                          </p:val>
+                                        </p:tav>
+                                      </p:tavLst>
+                                    </p:anim>
+                                  </p:childTnLst>
+                                </p:cTn>
+                              </p:par>
+                              <p:par>
+                                <p:cTn id="32" presetID="42" presetClass="entr" presetSubtype="0" fill="hold" grpId="0" nodeType="withEffect">
+                                  <p:stCondLst>
+                                    <p:cond delay="0"/>
+                                  </p:stCondLst>
+                                  <p:childTnLst>
+                                    <p:set>
+                                      <p:cBhvr>
+                                        <p:cTn id="33" dur="1" fill="hold">
+                                          <p:stCondLst>
+                                            <p:cond delay="0"/>
+                                          </p:stCondLst>
+                                        </p:cTn>
+                                        <p:tgtEl>
+                                          <p:spTgt spid="66">
+                                            <p:txEl>
+                                              <p:pRg st="5" end="5"/>
+                                            </p:txEl>
+                                          </p:spTgt>
+                                        </p:tgtEl>
+                                        <p:attrNameLst>
+                                          <p:attrName>style.visibility</p:attrName>
+                                        </p:attrNameLst>
+                                      </p:cBhvr>
+                                      <p:to>
+                                        <p:strVal val="visible"/>
+                                      </p:to>
+                                    </p:set>
+                                    <p:animEffect transition="in" filter="fade">
+                                      <p:cBhvr>
+                                        <p:cTn id="34" dur="1000"/>
+                                        <p:tgtEl>
+                                          <p:spTgt spid="66">
+                                            <p:txEl>
+                                              <p:pRg st="5" end="5"/>
+                                            </p:txEl>
+                                          </p:spTgt>
+                                        </p:tgtEl>
+                                      </p:cBhvr>
+                                    </p:animEffect>
+                                    <p:anim calcmode="lin" valueType="num">
+                                      <p:cBhvr>
+                                        <p:cTn id="35" dur="1000" fill="hold"/>
+                                        <p:tgtEl>
+                                          <p:spTgt spid="66">
+                                            <p:txEl>
+                                              <p:pRg st="5" end="5"/>
+                                            </p:txEl>
+                                          </p:spTgt>
+                                        </p:tgtEl>
+                                        <p:attrNameLst>
+                                          <p:attrName>ppt_x</p:attrName>
+                                        </p:attrNameLst>
+                                      </p:cBhvr>
+                                      <p:tavLst>
+                                        <p:tav tm="0">
+                                          <p:val>
+                                            <p:strVal val="#ppt_x"/>
+                                          </p:val>
+                                        </p:tav>
+                                        <p:tav tm="100000">
+                                          <p:val>
+                                            <p:strVal val="#ppt_x"/>
+                                          </p:val>
+                                        </p:tav>
+                                      </p:tavLst>
+                                    </p:anim>
+                                    <p:anim calcmode="lin" valueType="num">
+                                      <p:cBhvr>
+                                        <p:cTn id="36" dur="1000" fill="hold"/>
+                                        <p:tgtEl>
+                                          <p:spTgt spid="66">
+                                            <p:txEl>
+                                              <p:pRg st="5" end="5"/>
+                                            </p:txEl>
+                                          </p:spTgt>
+                                        </p:tgtEl>
+                                        <p:attrNameLst>
+                                          <p:attrName>ppt_y</p:attrName>
+                                        </p:attrNameLst>
+                                      </p:cBhvr>
+                                      <p:tavLst>
+                                        <p:tav tm="0">
+                                          <p:val>
+                                            <p:strVal val="#ppt_y+.1"/>
+                                          </p:val>
+                                        </p:tav>
+                                        <p:tav tm="100000">
+                                          <p:val>
+                                            <p:strVal val="#ppt_y"/>
+                                          </p:val>
+                                        </p:tav>
+                                      </p:tavLst>
+                                    </p:anim>
+                                  </p:childTnLst>
+                                </p:cTn>
+                              </p:par>
+                            </p:childTnLst>
+                          </p:cTn>
+                        </p:par>
+                      </p:childTnLst>
+                    </p:cTn>
+                  </p:par>
+                  <p:par>
+                    <p:cTn id="37" fill="hold">
+                      <p:stCondLst>
+                        <p:cond delay="indefinite"/>
+                      </p:stCondLst>
+                      <p:childTnLst>
+                        <p:par>
+                          <p:cTn id="38" fill="hold">
+                            <p:stCondLst>
+                              <p:cond delay="0"/>
+                            </p:stCondLst>
+                            <p:childTnLst>
+                              <p:par>
+                                <p:cTn id="39" presetID="42" presetClass="entr" presetSubtype="0" fill="hold" grpId="0" nodeType="clickEffect">
+                                  <p:stCondLst>
+                                    <p:cond delay="0"/>
+                                  </p:stCondLst>
+                                  <p:childTnLst>
+                                    <p:set>
+                                      <p:cBhvr>
+                                        <p:cTn id="40" dur="1" fill="hold">
+                                          <p:stCondLst>
+                                            <p:cond delay="0"/>
+                                          </p:stCondLst>
+                                        </p:cTn>
+                                        <p:tgtEl>
+                                          <p:spTgt spid="66">
+                                            <p:txEl>
+                                              <p:pRg st="6" end="6"/>
+                                            </p:txEl>
+                                          </p:spTgt>
+                                        </p:tgtEl>
+                                        <p:attrNameLst>
+                                          <p:attrName>style.visibility</p:attrName>
+                                        </p:attrNameLst>
+                                      </p:cBhvr>
+                                      <p:to>
+                                        <p:strVal val="visible"/>
+                                      </p:to>
+                                    </p:set>
+                                    <p:animEffect transition="in" filter="fade">
+                                      <p:cBhvr>
+                                        <p:cTn id="41" dur="1000"/>
+                                        <p:tgtEl>
+                                          <p:spTgt spid="66">
+                                            <p:txEl>
+                                              <p:pRg st="6" end="6"/>
+                                            </p:txEl>
+                                          </p:spTgt>
+                                        </p:tgtEl>
+                                      </p:cBhvr>
+                                    </p:animEffect>
+                                    <p:anim calcmode="lin" valueType="num">
+                                      <p:cBhvr>
+                                        <p:cTn id="42" dur="1000" fill="hold"/>
+                                        <p:tgtEl>
+                                          <p:spTgt spid="66">
+                                            <p:txEl>
+                                              <p:pRg st="6" end="6"/>
+                                            </p:txEl>
+                                          </p:spTgt>
+                                        </p:tgtEl>
+                                        <p:attrNameLst>
+                                          <p:attrName>ppt_x</p:attrName>
+                                        </p:attrNameLst>
+                                      </p:cBhvr>
+                                      <p:tavLst>
+                                        <p:tav tm="0">
+                                          <p:val>
+                                            <p:strVal val="#ppt_x"/>
+                                          </p:val>
+                                        </p:tav>
+                                        <p:tav tm="100000">
+                                          <p:val>
+                                            <p:strVal val="#ppt_x"/>
+                                          </p:val>
+                                        </p:tav>
+                                      </p:tavLst>
+                                    </p:anim>
+                                    <p:anim calcmode="lin" valueType="num">
+                                      <p:cBhvr>
+                                        <p:cTn id="43" dur="1000" fill="hold"/>
+                                        <p:tgtEl>
+                                          <p:spTgt spid="66">
+                                            <p:txEl>
+                                              <p:pRg st="6" end="6"/>
+                                            </p:txEl>
+                                          </p:spTgt>
+                                        </p:tgtEl>
+                                        <p:attrNameLst>
+                                          <p:attrName>ppt_y</p:attrName>
+                                        </p:attrNameLst>
+                                      </p:cBhvr>
+                                      <p:tavLst>
+                                        <p:tav tm="0">
+                                          <p:val>
+                                            <p:strVal val="#ppt_y+.1"/>
+                                          </p:val>
+                                        </p:tav>
+                                        <p:tav tm="100000">
+                                          <p:val>
+                                            <p:strVal val="#ppt_y"/>
+                                          </p:val>
+                                        </p:tav>
+                                      </p:tavLst>
+                                    </p:anim>
+                                  </p:childTnLst>
+                                </p:cTn>
+                              </p:par>
+                              <p:par>
+                                <p:cTn id="44" presetID="42" presetClass="entr" presetSubtype="0" fill="hold" grpId="0" nodeType="withEffect">
+                                  <p:stCondLst>
+                                    <p:cond delay="0"/>
+                                  </p:stCondLst>
+                                  <p:childTnLst>
+                                    <p:set>
+                                      <p:cBhvr>
+                                        <p:cTn id="45" dur="1" fill="hold">
+                                          <p:stCondLst>
+                                            <p:cond delay="0"/>
+                                          </p:stCondLst>
+                                        </p:cTn>
+                                        <p:tgtEl>
+                                          <p:spTgt spid="66">
+                                            <p:txEl>
+                                              <p:pRg st="7" end="7"/>
+                                            </p:txEl>
+                                          </p:spTgt>
+                                        </p:tgtEl>
+                                        <p:attrNameLst>
+                                          <p:attrName>style.visibility</p:attrName>
+                                        </p:attrNameLst>
+                                      </p:cBhvr>
+                                      <p:to>
+                                        <p:strVal val="visible"/>
+                                      </p:to>
+                                    </p:set>
+                                    <p:animEffect transition="in" filter="fade">
+                                      <p:cBhvr>
+                                        <p:cTn id="46" dur="1000"/>
+                                        <p:tgtEl>
+                                          <p:spTgt spid="66">
+                                            <p:txEl>
+                                              <p:pRg st="7" end="7"/>
+                                            </p:txEl>
+                                          </p:spTgt>
+                                        </p:tgtEl>
+                                      </p:cBhvr>
+                                    </p:animEffect>
+                                    <p:anim calcmode="lin" valueType="num">
+                                      <p:cBhvr>
+                                        <p:cTn id="47" dur="1000" fill="hold"/>
+                                        <p:tgtEl>
+                                          <p:spTgt spid="66">
+                                            <p:txEl>
+                                              <p:pRg st="7" end="7"/>
+                                            </p:txEl>
+                                          </p:spTgt>
+                                        </p:tgtEl>
+                                        <p:attrNameLst>
+                                          <p:attrName>ppt_x</p:attrName>
+                                        </p:attrNameLst>
+                                      </p:cBhvr>
+                                      <p:tavLst>
+                                        <p:tav tm="0">
+                                          <p:val>
+                                            <p:strVal val="#ppt_x"/>
+                                          </p:val>
+                                        </p:tav>
+                                        <p:tav tm="100000">
+                                          <p:val>
+                                            <p:strVal val="#ppt_x"/>
+                                          </p:val>
+                                        </p:tav>
+                                      </p:tavLst>
+                                    </p:anim>
+                                    <p:anim calcmode="lin" valueType="num">
+                                      <p:cBhvr>
+                                        <p:cTn id="48" dur="1000" fill="hold"/>
+                                        <p:tgtEl>
+                                          <p:spTgt spid="66">
+                                            <p:txEl>
+                                              <p:pRg st="7" end="7"/>
+                                            </p:txEl>
+                                          </p:spTgt>
+                                        </p:tgtEl>
+                                        <p:attrNameLst>
+                                          <p:attrName>ppt_y</p:attrName>
+                                        </p:attrNameLst>
+                                      </p:cBhvr>
+                                      <p:tavLst>
+                                        <p:tav tm="0">
+                                          <p:val>
+                                            <p:strVal val="#ppt_y+.1"/>
+                                          </p:val>
+                                        </p:tav>
+                                        <p:tav tm="100000">
+                                          <p:val>
+                                            <p:strVal val="#ppt_y"/>
+                                          </p:val>
+                                        </p:tav>
+                                      </p:tavLst>
+                                    </p:anim>
+                                  </p:childTnLst>
+                                </p:cTn>
+                              </p:par>
+                              <p:par>
+                                <p:cTn id="49" presetID="42" presetClass="entr" presetSubtype="0" fill="hold" grpId="0" nodeType="withEffect">
+                                  <p:stCondLst>
+                                    <p:cond delay="0"/>
+                                  </p:stCondLst>
+                                  <p:childTnLst>
+                                    <p:set>
+                                      <p:cBhvr>
+                                        <p:cTn id="50" dur="1" fill="hold">
+                                          <p:stCondLst>
+                                            <p:cond delay="0"/>
+                                          </p:stCondLst>
+                                        </p:cTn>
+                                        <p:tgtEl>
+                                          <p:spTgt spid="66">
+                                            <p:txEl>
+                                              <p:pRg st="8" end="8"/>
+                                            </p:txEl>
+                                          </p:spTgt>
+                                        </p:tgtEl>
+                                        <p:attrNameLst>
+                                          <p:attrName>style.visibility</p:attrName>
+                                        </p:attrNameLst>
+                                      </p:cBhvr>
+                                      <p:to>
+                                        <p:strVal val="visible"/>
+                                      </p:to>
+                                    </p:set>
+                                    <p:animEffect transition="in" filter="fade">
+                                      <p:cBhvr>
+                                        <p:cTn id="51" dur="1000"/>
+                                        <p:tgtEl>
+                                          <p:spTgt spid="66">
+                                            <p:txEl>
+                                              <p:pRg st="8" end="8"/>
+                                            </p:txEl>
+                                          </p:spTgt>
+                                        </p:tgtEl>
+                                      </p:cBhvr>
+                                    </p:animEffect>
+                                    <p:anim calcmode="lin" valueType="num">
+                                      <p:cBhvr>
+                                        <p:cTn id="52" dur="1000" fill="hold"/>
+                                        <p:tgtEl>
+                                          <p:spTgt spid="66">
+                                            <p:txEl>
+                                              <p:pRg st="8" end="8"/>
+                                            </p:txEl>
+                                          </p:spTgt>
+                                        </p:tgtEl>
+                                        <p:attrNameLst>
+                                          <p:attrName>ppt_x</p:attrName>
+                                        </p:attrNameLst>
+                                      </p:cBhvr>
+                                      <p:tavLst>
+                                        <p:tav tm="0">
+                                          <p:val>
+                                            <p:strVal val="#ppt_x"/>
+                                          </p:val>
+                                        </p:tav>
+                                        <p:tav tm="100000">
+                                          <p:val>
+                                            <p:strVal val="#ppt_x"/>
+                                          </p:val>
+                                        </p:tav>
+                                      </p:tavLst>
+                                    </p:anim>
+                                    <p:anim calcmode="lin" valueType="num">
+                                      <p:cBhvr>
+                                        <p:cTn id="53" dur="1000" fill="hold"/>
+                                        <p:tgtEl>
+                                          <p:spTgt spid="66">
+                                            <p:txEl>
+                                              <p:pRg st="8" end="8"/>
+                                            </p:txEl>
+                                          </p:spTgt>
+                                        </p:tgtEl>
+                                        <p:attrNameLst>
+                                          <p:attrName>ppt_y</p:attrName>
+                                        </p:attrNameLst>
+                                      </p:cBhvr>
+                                      <p:tavLst>
+                                        <p:tav tm="0">
+                                          <p:val>
+                                            <p:strVal val="#ppt_y+.1"/>
+                                          </p:val>
+                                        </p:tav>
+                                        <p:tav tm="100000">
+                                          <p:val>
+                                            <p:strVal val="#ppt_y"/>
+                                          </p:val>
+                                        </p:tav>
+                                      </p:tavLst>
+                                    </p:anim>
+                                  </p:childTnLst>
+                                </p:cTn>
+                              </p:par>
+                              <p:par>
+                                <p:cTn id="54" presetID="42" presetClass="entr" presetSubtype="0" fill="hold" grpId="0" nodeType="withEffect">
+                                  <p:stCondLst>
+                                    <p:cond delay="0"/>
+                                  </p:stCondLst>
+                                  <p:childTnLst>
+                                    <p:set>
+                                      <p:cBhvr>
+                                        <p:cTn id="55" dur="1" fill="hold">
+                                          <p:stCondLst>
+                                            <p:cond delay="0"/>
+                                          </p:stCondLst>
+                                        </p:cTn>
+                                        <p:tgtEl>
+                                          <p:spTgt spid="66">
+                                            <p:txEl>
+                                              <p:pRg st="9" end="9"/>
+                                            </p:txEl>
+                                          </p:spTgt>
+                                        </p:tgtEl>
+                                        <p:attrNameLst>
+                                          <p:attrName>style.visibility</p:attrName>
+                                        </p:attrNameLst>
+                                      </p:cBhvr>
+                                      <p:to>
+                                        <p:strVal val="visible"/>
+                                      </p:to>
+                                    </p:set>
+                                    <p:animEffect transition="in" filter="fade">
+                                      <p:cBhvr>
+                                        <p:cTn id="56" dur="1000"/>
+                                        <p:tgtEl>
+                                          <p:spTgt spid="66">
+                                            <p:txEl>
+                                              <p:pRg st="9" end="9"/>
+                                            </p:txEl>
+                                          </p:spTgt>
+                                        </p:tgtEl>
+                                      </p:cBhvr>
+                                    </p:animEffect>
+                                    <p:anim calcmode="lin" valueType="num">
+                                      <p:cBhvr>
+                                        <p:cTn id="57" dur="1000" fill="hold"/>
+                                        <p:tgtEl>
+                                          <p:spTgt spid="66">
+                                            <p:txEl>
+                                              <p:pRg st="9" end="9"/>
+                                            </p:txEl>
+                                          </p:spTgt>
+                                        </p:tgtEl>
+                                        <p:attrNameLst>
+                                          <p:attrName>ppt_x</p:attrName>
+                                        </p:attrNameLst>
+                                      </p:cBhvr>
+                                      <p:tavLst>
+                                        <p:tav tm="0">
+                                          <p:val>
+                                            <p:strVal val="#ppt_x"/>
+                                          </p:val>
+                                        </p:tav>
+                                        <p:tav tm="100000">
+                                          <p:val>
+                                            <p:strVal val="#ppt_x"/>
+                                          </p:val>
+                                        </p:tav>
+                                      </p:tavLst>
+                                    </p:anim>
+                                    <p:anim calcmode="lin" valueType="num">
+                                      <p:cBhvr>
+                                        <p:cTn id="58" dur="1000" fill="hold"/>
+                                        <p:tgtEl>
+                                          <p:spTgt spid="66">
+                                            <p:txEl>
+                                              <p:pRg st="9" end="9"/>
+                                            </p:txEl>
+                                          </p:spTgt>
+                                        </p:tgtEl>
+                                        <p:attrNameLst>
+                                          <p:attrName>ppt_y</p:attrName>
+                                        </p:attrNameLst>
+                                      </p:cBhvr>
+                                      <p:tavLst>
+                                        <p:tav tm="0">
+                                          <p:val>
+                                            <p:strVal val="#ppt_y+.1"/>
+                                          </p:val>
+                                        </p:tav>
+                                        <p:tav tm="100000">
+                                          <p:val>
+                                            <p:strVal val="#ppt_y"/>
+                                          </p:val>
+                                        </p:tav>
+                                      </p:tavLst>
+                                    </p:anim>
+                                  </p:childTnLst>
+                                </p:cTn>
+                              </p:par>
+                            </p:childTnLst>
+                          </p:cTn>
+                        </p:par>
+                      </p:childTnLst>
+                    </p:cTn>
+                  </p:par>
+                </p:childTnLst>
+              </p:cTn>
+              <p:prevCondLst>
+                <p:cond evt="onPrev" delay="0">
+                  <p:tgtEl>
+                    <p:sldTgt/>
+                  </p:tgtEl>
+                </p:cond>
+              </p:prevCondLst>
+              <p:nextCondLst>
+                <p:cond evt="onNext" delay="0">
+                  <p:tgtEl>
+                    <p:sldTgt/>
+                  </p:tgtEl>
+                </p:cond>
+              </p:nextCondLst>
+            </p:seq>
+          </p:childTnLst>
+        </p:cTn>
+      </p:par>
+    </p:tnLst>
+    <p:bldLst>
+      <p:bldP spid="66" grpId="0" build="p"/>
+    </p:bldLst>
+  </p:timing>
 </p:sld>
 </file>
 
@@ -8677,6 +10051,1368 @@
   <p:clrMapOvr>
     <a:masterClrMapping/>
   </p:clrMapOvr>
+  <p:timing>
+    <p:tnLst>
+      <p:par>
+        <p:cTn id="1" dur="indefinite" restart="never" nodeType="tmRoot">
+          <p:childTnLst>
+            <p:seq concurrent="1" nextAc="seek">
+              <p:cTn id="2" dur="indefinite" nodeType="mainSeq">
+                <p:childTnLst>
+                  <p:par>
+                    <p:cTn id="3" fill="hold">
+                      <p:stCondLst>
+                        <p:cond delay="indefinite"/>
+                      </p:stCondLst>
+                      <p:childTnLst>
+                        <p:par>
+                          <p:cTn id="4" fill="hold">
+                            <p:stCondLst>
+                              <p:cond delay="0"/>
+                            </p:stCondLst>
+                            <p:childTnLst>
+                              <p:par>
+                                <p:cTn id="5" presetID="2" presetClass="entr" presetSubtype="4" fill="hold" grpId="0" nodeType="clickEffect">
+                                  <p:stCondLst>
+                                    <p:cond delay="0"/>
+                                  </p:stCondLst>
+                                  <p:childTnLst>
+                                    <p:set>
+                                      <p:cBhvr>
+                                        <p:cTn id="6" dur="1" fill="hold">
+                                          <p:stCondLst>
+                                            <p:cond delay="0"/>
+                                          </p:stCondLst>
+                                        </p:cTn>
+                                        <p:tgtEl>
+                                          <p:spTgt spid="72">
+                                            <p:txEl>
+                                              <p:pRg st="0" end="0"/>
+                                            </p:txEl>
+                                          </p:spTgt>
+                                        </p:tgtEl>
+                                        <p:attrNameLst>
+                                          <p:attrName>style.visibility</p:attrName>
+                                        </p:attrNameLst>
+                                      </p:cBhvr>
+                                      <p:to>
+                                        <p:strVal val="visible"/>
+                                      </p:to>
+                                    </p:set>
+                                    <p:anim calcmode="lin" valueType="num">
+                                      <p:cBhvr additive="base">
+                                        <p:cTn id="7" dur="500" fill="hold"/>
+                                        <p:tgtEl>
+                                          <p:spTgt spid="72">
+                                            <p:txEl>
+                                              <p:pRg st="0" end="0"/>
+                                            </p:txEl>
+                                          </p:spTgt>
+                                        </p:tgtEl>
+                                        <p:attrNameLst>
+                                          <p:attrName>ppt_x</p:attrName>
+                                        </p:attrNameLst>
+                                      </p:cBhvr>
+                                      <p:tavLst>
+                                        <p:tav tm="0">
+                                          <p:val>
+                                            <p:strVal val="#ppt_x"/>
+                                          </p:val>
+                                        </p:tav>
+                                        <p:tav tm="100000">
+                                          <p:val>
+                                            <p:strVal val="#ppt_x"/>
+                                          </p:val>
+                                        </p:tav>
+                                      </p:tavLst>
+                                    </p:anim>
+                                    <p:anim calcmode="lin" valueType="num">
+                                      <p:cBhvr additive="base">
+                                        <p:cTn id="8" dur="500" fill="hold"/>
+                                        <p:tgtEl>
+                                          <p:spTgt spid="72">
+                                            <p:txEl>
+                                              <p:pRg st="0" end="0"/>
+                                            </p:txEl>
+                                          </p:spTgt>
+                                        </p:tgtEl>
+                                        <p:attrNameLst>
+                                          <p:attrName>ppt_y</p:attrName>
+                                        </p:attrNameLst>
+                                      </p:cBhvr>
+                                      <p:tavLst>
+                                        <p:tav tm="0">
+                                          <p:val>
+                                            <p:strVal val="1+#ppt_h/2"/>
+                                          </p:val>
+                                        </p:tav>
+                                        <p:tav tm="100000">
+                                          <p:val>
+                                            <p:strVal val="#ppt_y"/>
+                                          </p:val>
+                                        </p:tav>
+                                      </p:tavLst>
+                                    </p:anim>
+                                  </p:childTnLst>
+                                </p:cTn>
+                              </p:par>
+                              <p:par>
+                                <p:cTn id="9" presetID="2" presetClass="entr" presetSubtype="4" fill="hold" grpId="0" nodeType="withEffect">
+                                  <p:stCondLst>
+                                    <p:cond delay="0"/>
+                                  </p:stCondLst>
+                                  <p:childTnLst>
+                                    <p:set>
+                                      <p:cBhvr>
+                                        <p:cTn id="10" dur="1" fill="hold">
+                                          <p:stCondLst>
+                                            <p:cond delay="0"/>
+                                          </p:stCondLst>
+                                        </p:cTn>
+                                        <p:tgtEl>
+                                          <p:spTgt spid="72">
+                                            <p:txEl>
+                                              <p:pRg st="1" end="1"/>
+                                            </p:txEl>
+                                          </p:spTgt>
+                                        </p:tgtEl>
+                                        <p:attrNameLst>
+                                          <p:attrName>style.visibility</p:attrName>
+                                        </p:attrNameLst>
+                                      </p:cBhvr>
+                                      <p:to>
+                                        <p:strVal val="visible"/>
+                                      </p:to>
+                                    </p:set>
+                                    <p:anim calcmode="lin" valueType="num">
+                                      <p:cBhvr additive="base">
+                                        <p:cTn id="11" dur="500" fill="hold"/>
+                                        <p:tgtEl>
+                                          <p:spTgt spid="72">
+                                            <p:txEl>
+                                              <p:pRg st="1" end="1"/>
+                                            </p:txEl>
+                                          </p:spTgt>
+                                        </p:tgtEl>
+                                        <p:attrNameLst>
+                                          <p:attrName>ppt_x</p:attrName>
+                                        </p:attrNameLst>
+                                      </p:cBhvr>
+                                      <p:tavLst>
+                                        <p:tav tm="0">
+                                          <p:val>
+                                            <p:strVal val="#ppt_x"/>
+                                          </p:val>
+                                        </p:tav>
+                                        <p:tav tm="100000">
+                                          <p:val>
+                                            <p:strVal val="#ppt_x"/>
+                                          </p:val>
+                                        </p:tav>
+                                      </p:tavLst>
+                                    </p:anim>
+                                    <p:anim calcmode="lin" valueType="num">
+                                      <p:cBhvr additive="base">
+                                        <p:cTn id="12" dur="500" fill="hold"/>
+                                        <p:tgtEl>
+                                          <p:spTgt spid="72">
+                                            <p:txEl>
+                                              <p:pRg st="1" end="1"/>
+                                            </p:txEl>
+                                          </p:spTgt>
+                                        </p:tgtEl>
+                                        <p:attrNameLst>
+                                          <p:attrName>ppt_y</p:attrName>
+                                        </p:attrNameLst>
+                                      </p:cBhvr>
+                                      <p:tavLst>
+                                        <p:tav tm="0">
+                                          <p:val>
+                                            <p:strVal val="1+#ppt_h/2"/>
+                                          </p:val>
+                                        </p:tav>
+                                        <p:tav tm="100000">
+                                          <p:val>
+                                            <p:strVal val="#ppt_y"/>
+                                          </p:val>
+                                        </p:tav>
+                                      </p:tavLst>
+                                    </p:anim>
+                                  </p:childTnLst>
+                                </p:cTn>
+                              </p:par>
+                              <p:par>
+                                <p:cTn id="13" presetID="2" presetClass="entr" presetSubtype="4" fill="hold" grpId="0" nodeType="withEffect">
+                                  <p:stCondLst>
+                                    <p:cond delay="0"/>
+                                  </p:stCondLst>
+                                  <p:childTnLst>
+                                    <p:set>
+                                      <p:cBhvr>
+                                        <p:cTn id="14" dur="1" fill="hold">
+                                          <p:stCondLst>
+                                            <p:cond delay="0"/>
+                                          </p:stCondLst>
+                                        </p:cTn>
+                                        <p:tgtEl>
+                                          <p:spTgt spid="72">
+                                            <p:txEl>
+                                              <p:pRg st="2" end="2"/>
+                                            </p:txEl>
+                                          </p:spTgt>
+                                        </p:tgtEl>
+                                        <p:attrNameLst>
+                                          <p:attrName>style.visibility</p:attrName>
+                                        </p:attrNameLst>
+                                      </p:cBhvr>
+                                      <p:to>
+                                        <p:strVal val="visible"/>
+                                      </p:to>
+                                    </p:set>
+                                    <p:anim calcmode="lin" valueType="num">
+                                      <p:cBhvr additive="base">
+                                        <p:cTn id="15" dur="500" fill="hold"/>
+                                        <p:tgtEl>
+                                          <p:spTgt spid="72">
+                                            <p:txEl>
+                                              <p:pRg st="2" end="2"/>
+                                            </p:txEl>
+                                          </p:spTgt>
+                                        </p:tgtEl>
+                                        <p:attrNameLst>
+                                          <p:attrName>ppt_x</p:attrName>
+                                        </p:attrNameLst>
+                                      </p:cBhvr>
+                                      <p:tavLst>
+                                        <p:tav tm="0">
+                                          <p:val>
+                                            <p:strVal val="#ppt_x"/>
+                                          </p:val>
+                                        </p:tav>
+                                        <p:tav tm="100000">
+                                          <p:val>
+                                            <p:strVal val="#ppt_x"/>
+                                          </p:val>
+                                        </p:tav>
+                                      </p:tavLst>
+                                    </p:anim>
+                                    <p:anim calcmode="lin" valueType="num">
+                                      <p:cBhvr additive="base">
+                                        <p:cTn id="16" dur="500" fill="hold"/>
+                                        <p:tgtEl>
+                                          <p:spTgt spid="72">
+                                            <p:txEl>
+                                              <p:pRg st="2" end="2"/>
+                                            </p:txEl>
+                                          </p:spTgt>
+                                        </p:tgtEl>
+                                        <p:attrNameLst>
+                                          <p:attrName>ppt_y</p:attrName>
+                                        </p:attrNameLst>
+                                      </p:cBhvr>
+                                      <p:tavLst>
+                                        <p:tav tm="0">
+                                          <p:val>
+                                            <p:strVal val="1+#ppt_h/2"/>
+                                          </p:val>
+                                        </p:tav>
+                                        <p:tav tm="100000">
+                                          <p:val>
+                                            <p:strVal val="#ppt_y"/>
+                                          </p:val>
+                                        </p:tav>
+                                      </p:tavLst>
+                                    </p:anim>
+                                  </p:childTnLst>
+                                </p:cTn>
+                              </p:par>
+                              <p:par>
+                                <p:cTn id="17" presetID="2" presetClass="entr" presetSubtype="4" fill="hold" grpId="0" nodeType="withEffect">
+                                  <p:stCondLst>
+                                    <p:cond delay="0"/>
+                                  </p:stCondLst>
+                                  <p:childTnLst>
+                                    <p:set>
+                                      <p:cBhvr>
+                                        <p:cTn id="18" dur="1" fill="hold">
+                                          <p:stCondLst>
+                                            <p:cond delay="0"/>
+                                          </p:stCondLst>
+                                        </p:cTn>
+                                        <p:tgtEl>
+                                          <p:spTgt spid="72">
+                                            <p:txEl>
+                                              <p:pRg st="3" end="3"/>
+                                            </p:txEl>
+                                          </p:spTgt>
+                                        </p:tgtEl>
+                                        <p:attrNameLst>
+                                          <p:attrName>style.visibility</p:attrName>
+                                        </p:attrNameLst>
+                                      </p:cBhvr>
+                                      <p:to>
+                                        <p:strVal val="visible"/>
+                                      </p:to>
+                                    </p:set>
+                                    <p:anim calcmode="lin" valueType="num">
+                                      <p:cBhvr additive="base">
+                                        <p:cTn id="19" dur="500" fill="hold"/>
+                                        <p:tgtEl>
+                                          <p:spTgt spid="72">
+                                            <p:txEl>
+                                              <p:pRg st="3" end="3"/>
+                                            </p:txEl>
+                                          </p:spTgt>
+                                        </p:tgtEl>
+                                        <p:attrNameLst>
+                                          <p:attrName>ppt_x</p:attrName>
+                                        </p:attrNameLst>
+                                      </p:cBhvr>
+                                      <p:tavLst>
+                                        <p:tav tm="0">
+                                          <p:val>
+                                            <p:strVal val="#ppt_x"/>
+                                          </p:val>
+                                        </p:tav>
+                                        <p:tav tm="100000">
+                                          <p:val>
+                                            <p:strVal val="#ppt_x"/>
+                                          </p:val>
+                                        </p:tav>
+                                      </p:tavLst>
+                                    </p:anim>
+                                    <p:anim calcmode="lin" valueType="num">
+                                      <p:cBhvr additive="base">
+                                        <p:cTn id="20" dur="500" fill="hold"/>
+                                        <p:tgtEl>
+                                          <p:spTgt spid="72">
+                                            <p:txEl>
+                                              <p:pRg st="3" end="3"/>
+                                            </p:txEl>
+                                          </p:spTgt>
+                                        </p:tgtEl>
+                                        <p:attrNameLst>
+                                          <p:attrName>ppt_y</p:attrName>
+                                        </p:attrNameLst>
+                                      </p:cBhvr>
+                                      <p:tavLst>
+                                        <p:tav tm="0">
+                                          <p:val>
+                                            <p:strVal val="1+#ppt_h/2"/>
+                                          </p:val>
+                                        </p:tav>
+                                        <p:tav tm="100000">
+                                          <p:val>
+                                            <p:strVal val="#ppt_y"/>
+                                          </p:val>
+                                        </p:tav>
+                                      </p:tavLst>
+                                    </p:anim>
+                                  </p:childTnLst>
+                                </p:cTn>
+                              </p:par>
+                              <p:par>
+                                <p:cTn id="21" presetID="2" presetClass="entr" presetSubtype="4" fill="hold" grpId="0" nodeType="withEffect">
+                                  <p:stCondLst>
+                                    <p:cond delay="0"/>
+                                  </p:stCondLst>
+                                  <p:childTnLst>
+                                    <p:set>
+                                      <p:cBhvr>
+                                        <p:cTn id="22" dur="1" fill="hold">
+                                          <p:stCondLst>
+                                            <p:cond delay="0"/>
+                                          </p:stCondLst>
+                                        </p:cTn>
+                                        <p:tgtEl>
+                                          <p:spTgt spid="72">
+                                            <p:txEl>
+                                              <p:pRg st="4" end="4"/>
+                                            </p:txEl>
+                                          </p:spTgt>
+                                        </p:tgtEl>
+                                        <p:attrNameLst>
+                                          <p:attrName>style.visibility</p:attrName>
+                                        </p:attrNameLst>
+                                      </p:cBhvr>
+                                      <p:to>
+                                        <p:strVal val="visible"/>
+                                      </p:to>
+                                    </p:set>
+                                    <p:anim calcmode="lin" valueType="num">
+                                      <p:cBhvr additive="base">
+                                        <p:cTn id="23" dur="500" fill="hold"/>
+                                        <p:tgtEl>
+                                          <p:spTgt spid="72">
+                                            <p:txEl>
+                                              <p:pRg st="4" end="4"/>
+                                            </p:txEl>
+                                          </p:spTgt>
+                                        </p:tgtEl>
+                                        <p:attrNameLst>
+                                          <p:attrName>ppt_x</p:attrName>
+                                        </p:attrNameLst>
+                                      </p:cBhvr>
+                                      <p:tavLst>
+                                        <p:tav tm="0">
+                                          <p:val>
+                                            <p:strVal val="#ppt_x"/>
+                                          </p:val>
+                                        </p:tav>
+                                        <p:tav tm="100000">
+                                          <p:val>
+                                            <p:strVal val="#ppt_x"/>
+                                          </p:val>
+                                        </p:tav>
+                                      </p:tavLst>
+                                    </p:anim>
+                                    <p:anim calcmode="lin" valueType="num">
+                                      <p:cBhvr additive="base">
+                                        <p:cTn id="24" dur="500" fill="hold"/>
+                                        <p:tgtEl>
+                                          <p:spTgt spid="72">
+                                            <p:txEl>
+                                              <p:pRg st="4" end="4"/>
+                                            </p:txEl>
+                                          </p:spTgt>
+                                        </p:tgtEl>
+                                        <p:attrNameLst>
+                                          <p:attrName>ppt_y</p:attrName>
+                                        </p:attrNameLst>
+                                      </p:cBhvr>
+                                      <p:tavLst>
+                                        <p:tav tm="0">
+                                          <p:val>
+                                            <p:strVal val="1+#ppt_h/2"/>
+                                          </p:val>
+                                        </p:tav>
+                                        <p:tav tm="100000">
+                                          <p:val>
+                                            <p:strVal val="#ppt_y"/>
+                                          </p:val>
+                                        </p:tav>
+                                      </p:tavLst>
+                                    </p:anim>
+                                  </p:childTnLst>
+                                </p:cTn>
+                              </p:par>
+                              <p:par>
+                                <p:cTn id="25" presetID="2" presetClass="entr" presetSubtype="4" fill="hold" grpId="0" nodeType="withEffect">
+                                  <p:stCondLst>
+                                    <p:cond delay="0"/>
+                                  </p:stCondLst>
+                                  <p:childTnLst>
+                                    <p:set>
+                                      <p:cBhvr>
+                                        <p:cTn id="26" dur="1" fill="hold">
+                                          <p:stCondLst>
+                                            <p:cond delay="0"/>
+                                          </p:stCondLst>
+                                        </p:cTn>
+                                        <p:tgtEl>
+                                          <p:spTgt spid="72">
+                                            <p:txEl>
+                                              <p:pRg st="5" end="5"/>
+                                            </p:txEl>
+                                          </p:spTgt>
+                                        </p:tgtEl>
+                                        <p:attrNameLst>
+                                          <p:attrName>style.visibility</p:attrName>
+                                        </p:attrNameLst>
+                                      </p:cBhvr>
+                                      <p:to>
+                                        <p:strVal val="visible"/>
+                                      </p:to>
+                                    </p:set>
+                                    <p:anim calcmode="lin" valueType="num">
+                                      <p:cBhvr additive="base">
+                                        <p:cTn id="27" dur="500" fill="hold"/>
+                                        <p:tgtEl>
+                                          <p:spTgt spid="72">
+                                            <p:txEl>
+                                              <p:pRg st="5" end="5"/>
+                                            </p:txEl>
+                                          </p:spTgt>
+                                        </p:tgtEl>
+                                        <p:attrNameLst>
+                                          <p:attrName>ppt_x</p:attrName>
+                                        </p:attrNameLst>
+                                      </p:cBhvr>
+                                      <p:tavLst>
+                                        <p:tav tm="0">
+                                          <p:val>
+                                            <p:strVal val="#ppt_x"/>
+                                          </p:val>
+                                        </p:tav>
+                                        <p:tav tm="100000">
+                                          <p:val>
+                                            <p:strVal val="#ppt_x"/>
+                                          </p:val>
+                                        </p:tav>
+                                      </p:tavLst>
+                                    </p:anim>
+                                    <p:anim calcmode="lin" valueType="num">
+                                      <p:cBhvr additive="base">
+                                        <p:cTn id="28" dur="500" fill="hold"/>
+                                        <p:tgtEl>
+                                          <p:spTgt spid="72">
+                                            <p:txEl>
+                                              <p:pRg st="5" end="5"/>
+                                            </p:txEl>
+                                          </p:spTgt>
+                                        </p:tgtEl>
+                                        <p:attrNameLst>
+                                          <p:attrName>ppt_y</p:attrName>
+                                        </p:attrNameLst>
+                                      </p:cBhvr>
+                                      <p:tavLst>
+                                        <p:tav tm="0">
+                                          <p:val>
+                                            <p:strVal val="1+#ppt_h/2"/>
+                                          </p:val>
+                                        </p:tav>
+                                        <p:tav tm="100000">
+                                          <p:val>
+                                            <p:strVal val="#ppt_y"/>
+                                          </p:val>
+                                        </p:tav>
+                                      </p:tavLst>
+                                    </p:anim>
+                                  </p:childTnLst>
+                                </p:cTn>
+                              </p:par>
+                            </p:childTnLst>
+                          </p:cTn>
+                        </p:par>
+                      </p:childTnLst>
+                    </p:cTn>
+                  </p:par>
+                  <p:par>
+                    <p:cTn id="29" fill="hold">
+                      <p:stCondLst>
+                        <p:cond delay="indefinite"/>
+                      </p:stCondLst>
+                      <p:childTnLst>
+                        <p:par>
+                          <p:cTn id="30" fill="hold">
+                            <p:stCondLst>
+                              <p:cond delay="0"/>
+                            </p:stCondLst>
+                            <p:childTnLst>
+                              <p:par>
+                                <p:cTn id="31" presetID="2" presetClass="entr" presetSubtype="4" fill="hold" grpId="0" nodeType="clickEffect">
+                                  <p:stCondLst>
+                                    <p:cond delay="0"/>
+                                  </p:stCondLst>
+                                  <p:childTnLst>
+                                    <p:set>
+                                      <p:cBhvr>
+                                        <p:cTn id="32" dur="1" fill="hold">
+                                          <p:stCondLst>
+                                            <p:cond delay="0"/>
+                                          </p:stCondLst>
+                                        </p:cTn>
+                                        <p:tgtEl>
+                                          <p:spTgt spid="72">
+                                            <p:txEl>
+                                              <p:pRg st="6" end="6"/>
+                                            </p:txEl>
+                                          </p:spTgt>
+                                        </p:tgtEl>
+                                        <p:attrNameLst>
+                                          <p:attrName>style.visibility</p:attrName>
+                                        </p:attrNameLst>
+                                      </p:cBhvr>
+                                      <p:to>
+                                        <p:strVal val="visible"/>
+                                      </p:to>
+                                    </p:set>
+                                    <p:anim calcmode="lin" valueType="num">
+                                      <p:cBhvr additive="base">
+                                        <p:cTn id="33" dur="500" fill="hold"/>
+                                        <p:tgtEl>
+                                          <p:spTgt spid="72">
+                                            <p:txEl>
+                                              <p:pRg st="6" end="6"/>
+                                            </p:txEl>
+                                          </p:spTgt>
+                                        </p:tgtEl>
+                                        <p:attrNameLst>
+                                          <p:attrName>ppt_x</p:attrName>
+                                        </p:attrNameLst>
+                                      </p:cBhvr>
+                                      <p:tavLst>
+                                        <p:tav tm="0">
+                                          <p:val>
+                                            <p:strVal val="#ppt_x"/>
+                                          </p:val>
+                                        </p:tav>
+                                        <p:tav tm="100000">
+                                          <p:val>
+                                            <p:strVal val="#ppt_x"/>
+                                          </p:val>
+                                        </p:tav>
+                                      </p:tavLst>
+                                    </p:anim>
+                                    <p:anim calcmode="lin" valueType="num">
+                                      <p:cBhvr additive="base">
+                                        <p:cTn id="34" dur="500" fill="hold"/>
+                                        <p:tgtEl>
+                                          <p:spTgt spid="72">
+                                            <p:txEl>
+                                              <p:pRg st="6" end="6"/>
+                                            </p:txEl>
+                                          </p:spTgt>
+                                        </p:tgtEl>
+                                        <p:attrNameLst>
+                                          <p:attrName>ppt_y</p:attrName>
+                                        </p:attrNameLst>
+                                      </p:cBhvr>
+                                      <p:tavLst>
+                                        <p:tav tm="0">
+                                          <p:val>
+                                            <p:strVal val="1+#ppt_h/2"/>
+                                          </p:val>
+                                        </p:tav>
+                                        <p:tav tm="100000">
+                                          <p:val>
+                                            <p:strVal val="#ppt_y"/>
+                                          </p:val>
+                                        </p:tav>
+                                      </p:tavLst>
+                                    </p:anim>
+                                  </p:childTnLst>
+                                </p:cTn>
+                              </p:par>
+                              <p:par>
+                                <p:cTn id="35" presetID="2" presetClass="entr" presetSubtype="4" fill="hold" grpId="0" nodeType="withEffect">
+                                  <p:stCondLst>
+                                    <p:cond delay="0"/>
+                                  </p:stCondLst>
+                                  <p:childTnLst>
+                                    <p:set>
+                                      <p:cBhvr>
+                                        <p:cTn id="36" dur="1" fill="hold">
+                                          <p:stCondLst>
+                                            <p:cond delay="0"/>
+                                          </p:stCondLst>
+                                        </p:cTn>
+                                        <p:tgtEl>
+                                          <p:spTgt spid="72">
+                                            <p:txEl>
+                                              <p:pRg st="7" end="7"/>
+                                            </p:txEl>
+                                          </p:spTgt>
+                                        </p:tgtEl>
+                                        <p:attrNameLst>
+                                          <p:attrName>style.visibility</p:attrName>
+                                        </p:attrNameLst>
+                                      </p:cBhvr>
+                                      <p:to>
+                                        <p:strVal val="visible"/>
+                                      </p:to>
+                                    </p:set>
+                                    <p:anim calcmode="lin" valueType="num">
+                                      <p:cBhvr additive="base">
+                                        <p:cTn id="37" dur="500" fill="hold"/>
+                                        <p:tgtEl>
+                                          <p:spTgt spid="72">
+                                            <p:txEl>
+                                              <p:pRg st="7" end="7"/>
+                                            </p:txEl>
+                                          </p:spTgt>
+                                        </p:tgtEl>
+                                        <p:attrNameLst>
+                                          <p:attrName>ppt_x</p:attrName>
+                                        </p:attrNameLst>
+                                      </p:cBhvr>
+                                      <p:tavLst>
+                                        <p:tav tm="0">
+                                          <p:val>
+                                            <p:strVal val="#ppt_x"/>
+                                          </p:val>
+                                        </p:tav>
+                                        <p:tav tm="100000">
+                                          <p:val>
+                                            <p:strVal val="#ppt_x"/>
+                                          </p:val>
+                                        </p:tav>
+                                      </p:tavLst>
+                                    </p:anim>
+                                    <p:anim calcmode="lin" valueType="num">
+                                      <p:cBhvr additive="base">
+                                        <p:cTn id="38" dur="500" fill="hold"/>
+                                        <p:tgtEl>
+                                          <p:spTgt spid="72">
+                                            <p:txEl>
+                                              <p:pRg st="7" end="7"/>
+                                            </p:txEl>
+                                          </p:spTgt>
+                                        </p:tgtEl>
+                                        <p:attrNameLst>
+                                          <p:attrName>ppt_y</p:attrName>
+                                        </p:attrNameLst>
+                                      </p:cBhvr>
+                                      <p:tavLst>
+                                        <p:tav tm="0">
+                                          <p:val>
+                                            <p:strVal val="1+#ppt_h/2"/>
+                                          </p:val>
+                                        </p:tav>
+                                        <p:tav tm="100000">
+                                          <p:val>
+                                            <p:strVal val="#ppt_y"/>
+                                          </p:val>
+                                        </p:tav>
+                                      </p:tavLst>
+                                    </p:anim>
+                                  </p:childTnLst>
+                                </p:cTn>
+                              </p:par>
+                              <p:par>
+                                <p:cTn id="39" presetID="2" presetClass="entr" presetSubtype="4" fill="hold" grpId="0" nodeType="withEffect">
+                                  <p:stCondLst>
+                                    <p:cond delay="0"/>
+                                  </p:stCondLst>
+                                  <p:childTnLst>
+                                    <p:set>
+                                      <p:cBhvr>
+                                        <p:cTn id="40" dur="1" fill="hold">
+                                          <p:stCondLst>
+                                            <p:cond delay="0"/>
+                                          </p:stCondLst>
+                                        </p:cTn>
+                                        <p:tgtEl>
+                                          <p:spTgt spid="72">
+                                            <p:txEl>
+                                              <p:pRg st="8" end="8"/>
+                                            </p:txEl>
+                                          </p:spTgt>
+                                        </p:tgtEl>
+                                        <p:attrNameLst>
+                                          <p:attrName>style.visibility</p:attrName>
+                                        </p:attrNameLst>
+                                      </p:cBhvr>
+                                      <p:to>
+                                        <p:strVal val="visible"/>
+                                      </p:to>
+                                    </p:set>
+                                    <p:anim calcmode="lin" valueType="num">
+                                      <p:cBhvr additive="base">
+                                        <p:cTn id="41" dur="500" fill="hold"/>
+                                        <p:tgtEl>
+                                          <p:spTgt spid="72">
+                                            <p:txEl>
+                                              <p:pRg st="8" end="8"/>
+                                            </p:txEl>
+                                          </p:spTgt>
+                                        </p:tgtEl>
+                                        <p:attrNameLst>
+                                          <p:attrName>ppt_x</p:attrName>
+                                        </p:attrNameLst>
+                                      </p:cBhvr>
+                                      <p:tavLst>
+                                        <p:tav tm="0">
+                                          <p:val>
+                                            <p:strVal val="#ppt_x"/>
+                                          </p:val>
+                                        </p:tav>
+                                        <p:tav tm="100000">
+                                          <p:val>
+                                            <p:strVal val="#ppt_x"/>
+                                          </p:val>
+                                        </p:tav>
+                                      </p:tavLst>
+                                    </p:anim>
+                                    <p:anim calcmode="lin" valueType="num">
+                                      <p:cBhvr additive="base">
+                                        <p:cTn id="42" dur="500" fill="hold"/>
+                                        <p:tgtEl>
+                                          <p:spTgt spid="72">
+                                            <p:txEl>
+                                              <p:pRg st="8" end="8"/>
+                                            </p:txEl>
+                                          </p:spTgt>
+                                        </p:tgtEl>
+                                        <p:attrNameLst>
+                                          <p:attrName>ppt_y</p:attrName>
+                                        </p:attrNameLst>
+                                      </p:cBhvr>
+                                      <p:tavLst>
+                                        <p:tav tm="0">
+                                          <p:val>
+                                            <p:strVal val="1+#ppt_h/2"/>
+                                          </p:val>
+                                        </p:tav>
+                                        <p:tav tm="100000">
+                                          <p:val>
+                                            <p:strVal val="#ppt_y"/>
+                                          </p:val>
+                                        </p:tav>
+                                      </p:tavLst>
+                                    </p:anim>
+                                  </p:childTnLst>
+                                </p:cTn>
+                              </p:par>
+                              <p:par>
+                                <p:cTn id="43" presetID="2" presetClass="entr" presetSubtype="4" fill="hold" grpId="0" nodeType="withEffect">
+                                  <p:stCondLst>
+                                    <p:cond delay="0"/>
+                                  </p:stCondLst>
+                                  <p:childTnLst>
+                                    <p:set>
+                                      <p:cBhvr>
+                                        <p:cTn id="44" dur="1" fill="hold">
+                                          <p:stCondLst>
+                                            <p:cond delay="0"/>
+                                          </p:stCondLst>
+                                        </p:cTn>
+                                        <p:tgtEl>
+                                          <p:spTgt spid="72">
+                                            <p:txEl>
+                                              <p:pRg st="9" end="9"/>
+                                            </p:txEl>
+                                          </p:spTgt>
+                                        </p:tgtEl>
+                                        <p:attrNameLst>
+                                          <p:attrName>style.visibility</p:attrName>
+                                        </p:attrNameLst>
+                                      </p:cBhvr>
+                                      <p:to>
+                                        <p:strVal val="visible"/>
+                                      </p:to>
+                                    </p:set>
+                                    <p:anim calcmode="lin" valueType="num">
+                                      <p:cBhvr additive="base">
+                                        <p:cTn id="45" dur="500" fill="hold"/>
+                                        <p:tgtEl>
+                                          <p:spTgt spid="72">
+                                            <p:txEl>
+                                              <p:pRg st="9" end="9"/>
+                                            </p:txEl>
+                                          </p:spTgt>
+                                        </p:tgtEl>
+                                        <p:attrNameLst>
+                                          <p:attrName>ppt_x</p:attrName>
+                                        </p:attrNameLst>
+                                      </p:cBhvr>
+                                      <p:tavLst>
+                                        <p:tav tm="0">
+                                          <p:val>
+                                            <p:strVal val="#ppt_x"/>
+                                          </p:val>
+                                        </p:tav>
+                                        <p:tav tm="100000">
+                                          <p:val>
+                                            <p:strVal val="#ppt_x"/>
+                                          </p:val>
+                                        </p:tav>
+                                      </p:tavLst>
+                                    </p:anim>
+                                    <p:anim calcmode="lin" valueType="num">
+                                      <p:cBhvr additive="base">
+                                        <p:cTn id="46" dur="500" fill="hold"/>
+                                        <p:tgtEl>
+                                          <p:spTgt spid="72">
+                                            <p:txEl>
+                                              <p:pRg st="9" end="9"/>
+                                            </p:txEl>
+                                          </p:spTgt>
+                                        </p:tgtEl>
+                                        <p:attrNameLst>
+                                          <p:attrName>ppt_y</p:attrName>
+                                        </p:attrNameLst>
+                                      </p:cBhvr>
+                                      <p:tavLst>
+                                        <p:tav tm="0">
+                                          <p:val>
+                                            <p:strVal val="1+#ppt_h/2"/>
+                                          </p:val>
+                                        </p:tav>
+                                        <p:tav tm="100000">
+                                          <p:val>
+                                            <p:strVal val="#ppt_y"/>
+                                          </p:val>
+                                        </p:tav>
+                                      </p:tavLst>
+                                    </p:anim>
+                                  </p:childTnLst>
+                                </p:cTn>
+                              </p:par>
+                            </p:childTnLst>
+                          </p:cTn>
+                        </p:par>
+                      </p:childTnLst>
+                    </p:cTn>
+                  </p:par>
+                  <p:par>
+                    <p:cTn id="47" fill="hold">
+                      <p:stCondLst>
+                        <p:cond delay="indefinite"/>
+                      </p:stCondLst>
+                      <p:childTnLst>
+                        <p:par>
+                          <p:cTn id="48" fill="hold">
+                            <p:stCondLst>
+                              <p:cond delay="0"/>
+                            </p:stCondLst>
+                            <p:childTnLst>
+                              <p:par>
+                                <p:cTn id="49" presetID="2" presetClass="entr" presetSubtype="4" fill="hold" grpId="0" nodeType="clickEffect">
+                                  <p:stCondLst>
+                                    <p:cond delay="0"/>
+                                  </p:stCondLst>
+                                  <p:childTnLst>
+                                    <p:set>
+                                      <p:cBhvr>
+                                        <p:cTn id="50" dur="1" fill="hold">
+                                          <p:stCondLst>
+                                            <p:cond delay="0"/>
+                                          </p:stCondLst>
+                                        </p:cTn>
+                                        <p:tgtEl>
+                                          <p:spTgt spid="72">
+                                            <p:txEl>
+                                              <p:pRg st="10" end="10"/>
+                                            </p:txEl>
+                                          </p:spTgt>
+                                        </p:tgtEl>
+                                        <p:attrNameLst>
+                                          <p:attrName>style.visibility</p:attrName>
+                                        </p:attrNameLst>
+                                      </p:cBhvr>
+                                      <p:to>
+                                        <p:strVal val="visible"/>
+                                      </p:to>
+                                    </p:set>
+                                    <p:anim calcmode="lin" valueType="num">
+                                      <p:cBhvr additive="base">
+                                        <p:cTn id="51" dur="500" fill="hold"/>
+                                        <p:tgtEl>
+                                          <p:spTgt spid="72">
+                                            <p:txEl>
+                                              <p:pRg st="10" end="10"/>
+                                            </p:txEl>
+                                          </p:spTgt>
+                                        </p:tgtEl>
+                                        <p:attrNameLst>
+                                          <p:attrName>ppt_x</p:attrName>
+                                        </p:attrNameLst>
+                                      </p:cBhvr>
+                                      <p:tavLst>
+                                        <p:tav tm="0">
+                                          <p:val>
+                                            <p:strVal val="#ppt_x"/>
+                                          </p:val>
+                                        </p:tav>
+                                        <p:tav tm="100000">
+                                          <p:val>
+                                            <p:strVal val="#ppt_x"/>
+                                          </p:val>
+                                        </p:tav>
+                                      </p:tavLst>
+                                    </p:anim>
+                                    <p:anim calcmode="lin" valueType="num">
+                                      <p:cBhvr additive="base">
+                                        <p:cTn id="52" dur="500" fill="hold"/>
+                                        <p:tgtEl>
+                                          <p:spTgt spid="72">
+                                            <p:txEl>
+                                              <p:pRg st="10" end="10"/>
+                                            </p:txEl>
+                                          </p:spTgt>
+                                        </p:tgtEl>
+                                        <p:attrNameLst>
+                                          <p:attrName>ppt_y</p:attrName>
+                                        </p:attrNameLst>
+                                      </p:cBhvr>
+                                      <p:tavLst>
+                                        <p:tav tm="0">
+                                          <p:val>
+                                            <p:strVal val="1+#ppt_h/2"/>
+                                          </p:val>
+                                        </p:tav>
+                                        <p:tav tm="100000">
+                                          <p:val>
+                                            <p:strVal val="#ppt_y"/>
+                                          </p:val>
+                                        </p:tav>
+                                      </p:tavLst>
+                                    </p:anim>
+                                  </p:childTnLst>
+                                </p:cTn>
+                              </p:par>
+                              <p:par>
+                                <p:cTn id="53" presetID="2" presetClass="entr" presetSubtype="4" fill="hold" grpId="0" nodeType="withEffect">
+                                  <p:stCondLst>
+                                    <p:cond delay="0"/>
+                                  </p:stCondLst>
+                                  <p:childTnLst>
+                                    <p:set>
+                                      <p:cBhvr>
+                                        <p:cTn id="54" dur="1" fill="hold">
+                                          <p:stCondLst>
+                                            <p:cond delay="0"/>
+                                          </p:stCondLst>
+                                        </p:cTn>
+                                        <p:tgtEl>
+                                          <p:spTgt spid="72">
+                                            <p:txEl>
+                                              <p:pRg st="11" end="11"/>
+                                            </p:txEl>
+                                          </p:spTgt>
+                                        </p:tgtEl>
+                                        <p:attrNameLst>
+                                          <p:attrName>style.visibility</p:attrName>
+                                        </p:attrNameLst>
+                                      </p:cBhvr>
+                                      <p:to>
+                                        <p:strVal val="visible"/>
+                                      </p:to>
+                                    </p:set>
+                                    <p:anim calcmode="lin" valueType="num">
+                                      <p:cBhvr additive="base">
+                                        <p:cTn id="55" dur="500" fill="hold"/>
+                                        <p:tgtEl>
+                                          <p:spTgt spid="72">
+                                            <p:txEl>
+                                              <p:pRg st="11" end="11"/>
+                                            </p:txEl>
+                                          </p:spTgt>
+                                        </p:tgtEl>
+                                        <p:attrNameLst>
+                                          <p:attrName>ppt_x</p:attrName>
+                                        </p:attrNameLst>
+                                      </p:cBhvr>
+                                      <p:tavLst>
+                                        <p:tav tm="0">
+                                          <p:val>
+                                            <p:strVal val="#ppt_x"/>
+                                          </p:val>
+                                        </p:tav>
+                                        <p:tav tm="100000">
+                                          <p:val>
+                                            <p:strVal val="#ppt_x"/>
+                                          </p:val>
+                                        </p:tav>
+                                      </p:tavLst>
+                                    </p:anim>
+                                    <p:anim calcmode="lin" valueType="num">
+                                      <p:cBhvr additive="base">
+                                        <p:cTn id="56" dur="500" fill="hold"/>
+                                        <p:tgtEl>
+                                          <p:spTgt spid="72">
+                                            <p:txEl>
+                                              <p:pRg st="11" end="11"/>
+                                            </p:txEl>
+                                          </p:spTgt>
+                                        </p:tgtEl>
+                                        <p:attrNameLst>
+                                          <p:attrName>ppt_y</p:attrName>
+                                        </p:attrNameLst>
+                                      </p:cBhvr>
+                                      <p:tavLst>
+                                        <p:tav tm="0">
+                                          <p:val>
+                                            <p:strVal val="1+#ppt_h/2"/>
+                                          </p:val>
+                                        </p:tav>
+                                        <p:tav tm="100000">
+                                          <p:val>
+                                            <p:strVal val="#ppt_y"/>
+                                          </p:val>
+                                        </p:tav>
+                                      </p:tavLst>
+                                    </p:anim>
+                                  </p:childTnLst>
+                                </p:cTn>
+                              </p:par>
+                              <p:par>
+                                <p:cTn id="57" presetID="2" presetClass="entr" presetSubtype="4" fill="hold" grpId="0" nodeType="withEffect">
+                                  <p:stCondLst>
+                                    <p:cond delay="0"/>
+                                  </p:stCondLst>
+                                  <p:childTnLst>
+                                    <p:set>
+                                      <p:cBhvr>
+                                        <p:cTn id="58" dur="1" fill="hold">
+                                          <p:stCondLst>
+                                            <p:cond delay="0"/>
+                                          </p:stCondLst>
+                                        </p:cTn>
+                                        <p:tgtEl>
+                                          <p:spTgt spid="72">
+                                            <p:txEl>
+                                              <p:pRg st="12" end="12"/>
+                                            </p:txEl>
+                                          </p:spTgt>
+                                        </p:tgtEl>
+                                        <p:attrNameLst>
+                                          <p:attrName>style.visibility</p:attrName>
+                                        </p:attrNameLst>
+                                      </p:cBhvr>
+                                      <p:to>
+                                        <p:strVal val="visible"/>
+                                      </p:to>
+                                    </p:set>
+                                    <p:anim calcmode="lin" valueType="num">
+                                      <p:cBhvr additive="base">
+                                        <p:cTn id="59" dur="500" fill="hold"/>
+                                        <p:tgtEl>
+                                          <p:spTgt spid="72">
+                                            <p:txEl>
+                                              <p:pRg st="12" end="12"/>
+                                            </p:txEl>
+                                          </p:spTgt>
+                                        </p:tgtEl>
+                                        <p:attrNameLst>
+                                          <p:attrName>ppt_x</p:attrName>
+                                        </p:attrNameLst>
+                                      </p:cBhvr>
+                                      <p:tavLst>
+                                        <p:tav tm="0">
+                                          <p:val>
+                                            <p:strVal val="#ppt_x"/>
+                                          </p:val>
+                                        </p:tav>
+                                        <p:tav tm="100000">
+                                          <p:val>
+                                            <p:strVal val="#ppt_x"/>
+                                          </p:val>
+                                        </p:tav>
+                                      </p:tavLst>
+                                    </p:anim>
+                                    <p:anim calcmode="lin" valueType="num">
+                                      <p:cBhvr additive="base">
+                                        <p:cTn id="60" dur="500" fill="hold"/>
+                                        <p:tgtEl>
+                                          <p:spTgt spid="72">
+                                            <p:txEl>
+                                              <p:pRg st="12" end="12"/>
+                                            </p:txEl>
+                                          </p:spTgt>
+                                        </p:tgtEl>
+                                        <p:attrNameLst>
+                                          <p:attrName>ppt_y</p:attrName>
+                                        </p:attrNameLst>
+                                      </p:cBhvr>
+                                      <p:tavLst>
+                                        <p:tav tm="0">
+                                          <p:val>
+                                            <p:strVal val="1+#ppt_h/2"/>
+                                          </p:val>
+                                        </p:tav>
+                                        <p:tav tm="100000">
+                                          <p:val>
+                                            <p:strVal val="#ppt_y"/>
+                                          </p:val>
+                                        </p:tav>
+                                      </p:tavLst>
+                                    </p:anim>
+                                  </p:childTnLst>
+                                </p:cTn>
+                              </p:par>
+                              <p:par>
+                                <p:cTn id="61" presetID="2" presetClass="entr" presetSubtype="4" fill="hold" grpId="0" nodeType="withEffect">
+                                  <p:stCondLst>
+                                    <p:cond delay="0"/>
+                                  </p:stCondLst>
+                                  <p:childTnLst>
+                                    <p:set>
+                                      <p:cBhvr>
+                                        <p:cTn id="62" dur="1" fill="hold">
+                                          <p:stCondLst>
+                                            <p:cond delay="0"/>
+                                          </p:stCondLst>
+                                        </p:cTn>
+                                        <p:tgtEl>
+                                          <p:spTgt spid="72">
+                                            <p:txEl>
+                                              <p:pRg st="13" end="13"/>
+                                            </p:txEl>
+                                          </p:spTgt>
+                                        </p:tgtEl>
+                                        <p:attrNameLst>
+                                          <p:attrName>style.visibility</p:attrName>
+                                        </p:attrNameLst>
+                                      </p:cBhvr>
+                                      <p:to>
+                                        <p:strVal val="visible"/>
+                                      </p:to>
+                                    </p:set>
+                                    <p:anim calcmode="lin" valueType="num">
+                                      <p:cBhvr additive="base">
+                                        <p:cTn id="63" dur="500" fill="hold"/>
+                                        <p:tgtEl>
+                                          <p:spTgt spid="72">
+                                            <p:txEl>
+                                              <p:pRg st="13" end="13"/>
+                                            </p:txEl>
+                                          </p:spTgt>
+                                        </p:tgtEl>
+                                        <p:attrNameLst>
+                                          <p:attrName>ppt_x</p:attrName>
+                                        </p:attrNameLst>
+                                      </p:cBhvr>
+                                      <p:tavLst>
+                                        <p:tav tm="0">
+                                          <p:val>
+                                            <p:strVal val="#ppt_x"/>
+                                          </p:val>
+                                        </p:tav>
+                                        <p:tav tm="100000">
+                                          <p:val>
+                                            <p:strVal val="#ppt_x"/>
+                                          </p:val>
+                                        </p:tav>
+                                      </p:tavLst>
+                                    </p:anim>
+                                    <p:anim calcmode="lin" valueType="num">
+                                      <p:cBhvr additive="base">
+                                        <p:cTn id="64" dur="500" fill="hold"/>
+                                        <p:tgtEl>
+                                          <p:spTgt spid="72">
+                                            <p:txEl>
+                                              <p:pRg st="13" end="13"/>
+                                            </p:txEl>
+                                          </p:spTgt>
+                                        </p:tgtEl>
+                                        <p:attrNameLst>
+                                          <p:attrName>ppt_y</p:attrName>
+                                        </p:attrNameLst>
+                                      </p:cBhvr>
+                                      <p:tavLst>
+                                        <p:tav tm="0">
+                                          <p:val>
+                                            <p:strVal val="1+#ppt_h/2"/>
+                                          </p:val>
+                                        </p:tav>
+                                        <p:tav tm="100000">
+                                          <p:val>
+                                            <p:strVal val="#ppt_y"/>
+                                          </p:val>
+                                        </p:tav>
+                                      </p:tavLst>
+                                    </p:anim>
+                                  </p:childTnLst>
+                                </p:cTn>
+                              </p:par>
+                              <p:par>
+                                <p:cTn id="65" presetID="2" presetClass="entr" presetSubtype="4" fill="hold" grpId="0" nodeType="withEffect">
+                                  <p:stCondLst>
+                                    <p:cond delay="0"/>
+                                  </p:stCondLst>
+                                  <p:childTnLst>
+                                    <p:set>
+                                      <p:cBhvr>
+                                        <p:cTn id="66" dur="1" fill="hold">
+                                          <p:stCondLst>
+                                            <p:cond delay="0"/>
+                                          </p:stCondLst>
+                                        </p:cTn>
+                                        <p:tgtEl>
+                                          <p:spTgt spid="72">
+                                            <p:txEl>
+                                              <p:pRg st="14" end="14"/>
+                                            </p:txEl>
+                                          </p:spTgt>
+                                        </p:tgtEl>
+                                        <p:attrNameLst>
+                                          <p:attrName>style.visibility</p:attrName>
+                                        </p:attrNameLst>
+                                      </p:cBhvr>
+                                      <p:to>
+                                        <p:strVal val="visible"/>
+                                      </p:to>
+                                    </p:set>
+                                    <p:anim calcmode="lin" valueType="num">
+                                      <p:cBhvr additive="base">
+                                        <p:cTn id="67" dur="500" fill="hold"/>
+                                        <p:tgtEl>
+                                          <p:spTgt spid="72">
+                                            <p:txEl>
+                                              <p:pRg st="14" end="14"/>
+                                            </p:txEl>
+                                          </p:spTgt>
+                                        </p:tgtEl>
+                                        <p:attrNameLst>
+                                          <p:attrName>ppt_x</p:attrName>
+                                        </p:attrNameLst>
+                                      </p:cBhvr>
+                                      <p:tavLst>
+                                        <p:tav tm="0">
+                                          <p:val>
+                                            <p:strVal val="#ppt_x"/>
+                                          </p:val>
+                                        </p:tav>
+                                        <p:tav tm="100000">
+                                          <p:val>
+                                            <p:strVal val="#ppt_x"/>
+                                          </p:val>
+                                        </p:tav>
+                                      </p:tavLst>
+                                    </p:anim>
+                                    <p:anim calcmode="lin" valueType="num">
+                                      <p:cBhvr additive="base">
+                                        <p:cTn id="68" dur="500" fill="hold"/>
+                                        <p:tgtEl>
+                                          <p:spTgt spid="72">
+                                            <p:txEl>
+                                              <p:pRg st="14" end="14"/>
+                                            </p:txEl>
+                                          </p:spTgt>
+                                        </p:tgtEl>
+                                        <p:attrNameLst>
+                                          <p:attrName>ppt_y</p:attrName>
+                                        </p:attrNameLst>
+                                      </p:cBhvr>
+                                      <p:tavLst>
+                                        <p:tav tm="0">
+                                          <p:val>
+                                            <p:strVal val="1+#ppt_h/2"/>
+                                          </p:val>
+                                        </p:tav>
+                                        <p:tav tm="100000">
+                                          <p:val>
+                                            <p:strVal val="#ppt_y"/>
+                                          </p:val>
+                                        </p:tav>
+                                      </p:tavLst>
+                                    </p:anim>
+                                  </p:childTnLst>
+                                </p:cTn>
+                              </p:par>
+                            </p:childTnLst>
+                          </p:cTn>
+                        </p:par>
+                      </p:childTnLst>
+                    </p:cTn>
+                  </p:par>
+                </p:childTnLst>
+              </p:cTn>
+              <p:prevCondLst>
+                <p:cond evt="onPrev" delay="0">
+                  <p:tgtEl>
+                    <p:sldTgt/>
+                  </p:tgtEl>
+                </p:cond>
+              </p:prevCondLst>
+              <p:nextCondLst>
+                <p:cond evt="onNext" delay="0">
+                  <p:tgtEl>
+                    <p:sldTgt/>
+                  </p:tgtEl>
+                </p:cond>
+              </p:nextCondLst>
+            </p:seq>
+          </p:childTnLst>
+        </p:cTn>
+      </p:par>
+    </p:tnLst>
+    <p:bldLst>
+      <p:bldP spid="72" grpId="0" build="p"/>
+    </p:bldLst>
+  </p:timing>
 </p:sld>
 </file>
 
@@ -8740,7 +11476,7 @@
             </a:pPr>
             <a:r>
               <a:rPr lang="en-US" dirty="0"/>
-              <a:t>Refer to readme issues section</a:t>
+              <a:t>Creating an array within an array – a coding story. </a:t>
             </a:r>
           </a:p>
           <a:p>
@@ -8878,6 +11614,833 @@
   <p:clrMapOvr>
     <a:masterClrMapping/>
   </p:clrMapOvr>
+  <p:timing>
+    <p:tnLst>
+      <p:par>
+        <p:cTn id="1" dur="indefinite" restart="never" nodeType="tmRoot">
+          <p:childTnLst>
+            <p:seq concurrent="1" nextAc="seek">
+              <p:cTn id="2" dur="indefinite" nodeType="mainSeq">
+                <p:childTnLst>
+                  <p:par>
+                    <p:cTn id="3" fill="hold">
+                      <p:stCondLst>
+                        <p:cond delay="indefinite"/>
+                      </p:stCondLst>
+                      <p:childTnLst>
+                        <p:par>
+                          <p:cTn id="4" fill="hold">
+                            <p:stCondLst>
+                              <p:cond delay="0"/>
+                            </p:stCondLst>
+                            <p:childTnLst>
+                              <p:par>
+                                <p:cTn id="5" presetID="42" presetClass="entr" presetSubtype="0" fill="hold" grpId="0" nodeType="clickEffect">
+                                  <p:stCondLst>
+                                    <p:cond delay="0"/>
+                                  </p:stCondLst>
+                                  <p:childTnLst>
+                                    <p:set>
+                                      <p:cBhvr>
+                                        <p:cTn id="6" dur="1" fill="hold">
+                                          <p:stCondLst>
+                                            <p:cond delay="0"/>
+                                          </p:stCondLst>
+                                        </p:cTn>
+                                        <p:tgtEl>
+                                          <p:spTgt spid="3">
+                                            <p:txEl>
+                                              <p:pRg st="0" end="0"/>
+                                            </p:txEl>
+                                          </p:spTgt>
+                                        </p:tgtEl>
+                                        <p:attrNameLst>
+                                          <p:attrName>style.visibility</p:attrName>
+                                        </p:attrNameLst>
+                                      </p:cBhvr>
+                                      <p:to>
+                                        <p:strVal val="visible"/>
+                                      </p:to>
+                                    </p:set>
+                                    <p:animEffect transition="in" filter="fade">
+                                      <p:cBhvr>
+                                        <p:cTn id="7" dur="1000"/>
+                                        <p:tgtEl>
+                                          <p:spTgt spid="3">
+                                            <p:txEl>
+                                              <p:pRg st="0" end="0"/>
+                                            </p:txEl>
+                                          </p:spTgt>
+                                        </p:tgtEl>
+                                      </p:cBhvr>
+                                    </p:animEffect>
+                                    <p:anim calcmode="lin" valueType="num">
+                                      <p:cBhvr>
+                                        <p:cTn id="8" dur="1000" fill="hold"/>
+                                        <p:tgtEl>
+                                          <p:spTgt spid="3">
+                                            <p:txEl>
+                                              <p:pRg st="0" end="0"/>
+                                            </p:txEl>
+                                          </p:spTgt>
+                                        </p:tgtEl>
+                                        <p:attrNameLst>
+                                          <p:attrName>ppt_x</p:attrName>
+                                        </p:attrNameLst>
+                                      </p:cBhvr>
+                                      <p:tavLst>
+                                        <p:tav tm="0">
+                                          <p:val>
+                                            <p:strVal val="#ppt_x"/>
+                                          </p:val>
+                                        </p:tav>
+                                        <p:tav tm="100000">
+                                          <p:val>
+                                            <p:strVal val="#ppt_x"/>
+                                          </p:val>
+                                        </p:tav>
+                                      </p:tavLst>
+                                    </p:anim>
+                                    <p:anim calcmode="lin" valueType="num">
+                                      <p:cBhvr>
+                                        <p:cTn id="9" dur="1000" fill="hold"/>
+                                        <p:tgtEl>
+                                          <p:spTgt spid="3">
+                                            <p:txEl>
+                                              <p:pRg st="0" end="0"/>
+                                            </p:txEl>
+                                          </p:spTgt>
+                                        </p:tgtEl>
+                                        <p:attrNameLst>
+                                          <p:attrName>ppt_y</p:attrName>
+                                        </p:attrNameLst>
+                                      </p:cBhvr>
+                                      <p:tavLst>
+                                        <p:tav tm="0">
+                                          <p:val>
+                                            <p:strVal val="#ppt_y+.1"/>
+                                          </p:val>
+                                        </p:tav>
+                                        <p:tav tm="100000">
+                                          <p:val>
+                                            <p:strVal val="#ppt_y"/>
+                                          </p:val>
+                                        </p:tav>
+                                      </p:tavLst>
+                                    </p:anim>
+                                  </p:childTnLst>
+                                </p:cTn>
+                              </p:par>
+                              <p:par>
+                                <p:cTn id="10" presetID="42" presetClass="entr" presetSubtype="0" fill="hold" grpId="0" nodeType="withEffect">
+                                  <p:stCondLst>
+                                    <p:cond delay="0"/>
+                                  </p:stCondLst>
+                                  <p:childTnLst>
+                                    <p:set>
+                                      <p:cBhvr>
+                                        <p:cTn id="11" dur="1" fill="hold">
+                                          <p:stCondLst>
+                                            <p:cond delay="0"/>
+                                          </p:stCondLst>
+                                        </p:cTn>
+                                        <p:tgtEl>
+                                          <p:spTgt spid="3">
+                                            <p:txEl>
+                                              <p:pRg st="1" end="1"/>
+                                            </p:txEl>
+                                          </p:spTgt>
+                                        </p:tgtEl>
+                                        <p:attrNameLst>
+                                          <p:attrName>style.visibility</p:attrName>
+                                        </p:attrNameLst>
+                                      </p:cBhvr>
+                                      <p:to>
+                                        <p:strVal val="visible"/>
+                                      </p:to>
+                                    </p:set>
+                                    <p:animEffect transition="in" filter="fade">
+                                      <p:cBhvr>
+                                        <p:cTn id="12" dur="1000"/>
+                                        <p:tgtEl>
+                                          <p:spTgt spid="3">
+                                            <p:txEl>
+                                              <p:pRg st="1" end="1"/>
+                                            </p:txEl>
+                                          </p:spTgt>
+                                        </p:tgtEl>
+                                      </p:cBhvr>
+                                    </p:animEffect>
+                                    <p:anim calcmode="lin" valueType="num">
+                                      <p:cBhvr>
+                                        <p:cTn id="13" dur="1000" fill="hold"/>
+                                        <p:tgtEl>
+                                          <p:spTgt spid="3">
+                                            <p:txEl>
+                                              <p:pRg st="1" end="1"/>
+                                            </p:txEl>
+                                          </p:spTgt>
+                                        </p:tgtEl>
+                                        <p:attrNameLst>
+                                          <p:attrName>ppt_x</p:attrName>
+                                        </p:attrNameLst>
+                                      </p:cBhvr>
+                                      <p:tavLst>
+                                        <p:tav tm="0">
+                                          <p:val>
+                                            <p:strVal val="#ppt_x"/>
+                                          </p:val>
+                                        </p:tav>
+                                        <p:tav tm="100000">
+                                          <p:val>
+                                            <p:strVal val="#ppt_x"/>
+                                          </p:val>
+                                        </p:tav>
+                                      </p:tavLst>
+                                    </p:anim>
+                                    <p:anim calcmode="lin" valueType="num">
+                                      <p:cBhvr>
+                                        <p:cTn id="14" dur="1000" fill="hold"/>
+                                        <p:tgtEl>
+                                          <p:spTgt spid="3">
+                                            <p:txEl>
+                                              <p:pRg st="1" end="1"/>
+                                            </p:txEl>
+                                          </p:spTgt>
+                                        </p:tgtEl>
+                                        <p:attrNameLst>
+                                          <p:attrName>ppt_y</p:attrName>
+                                        </p:attrNameLst>
+                                      </p:cBhvr>
+                                      <p:tavLst>
+                                        <p:tav tm="0">
+                                          <p:val>
+                                            <p:strVal val="#ppt_y+.1"/>
+                                          </p:val>
+                                        </p:tav>
+                                        <p:tav tm="100000">
+                                          <p:val>
+                                            <p:strVal val="#ppt_y"/>
+                                          </p:val>
+                                        </p:tav>
+                                      </p:tavLst>
+                                    </p:anim>
+                                  </p:childTnLst>
+                                </p:cTn>
+                              </p:par>
+                              <p:par>
+                                <p:cTn id="15" presetID="42" presetClass="entr" presetSubtype="0" fill="hold" grpId="0" nodeType="withEffect">
+                                  <p:stCondLst>
+                                    <p:cond delay="0"/>
+                                  </p:stCondLst>
+                                  <p:childTnLst>
+                                    <p:set>
+                                      <p:cBhvr>
+                                        <p:cTn id="16" dur="1" fill="hold">
+                                          <p:stCondLst>
+                                            <p:cond delay="0"/>
+                                          </p:stCondLst>
+                                        </p:cTn>
+                                        <p:tgtEl>
+                                          <p:spTgt spid="3">
+                                            <p:txEl>
+                                              <p:pRg st="2" end="2"/>
+                                            </p:txEl>
+                                          </p:spTgt>
+                                        </p:tgtEl>
+                                        <p:attrNameLst>
+                                          <p:attrName>style.visibility</p:attrName>
+                                        </p:attrNameLst>
+                                      </p:cBhvr>
+                                      <p:to>
+                                        <p:strVal val="visible"/>
+                                      </p:to>
+                                    </p:set>
+                                    <p:animEffect transition="in" filter="fade">
+                                      <p:cBhvr>
+                                        <p:cTn id="17" dur="1000"/>
+                                        <p:tgtEl>
+                                          <p:spTgt spid="3">
+                                            <p:txEl>
+                                              <p:pRg st="2" end="2"/>
+                                            </p:txEl>
+                                          </p:spTgt>
+                                        </p:tgtEl>
+                                      </p:cBhvr>
+                                    </p:animEffect>
+                                    <p:anim calcmode="lin" valueType="num">
+                                      <p:cBhvr>
+                                        <p:cTn id="18" dur="1000" fill="hold"/>
+                                        <p:tgtEl>
+                                          <p:spTgt spid="3">
+                                            <p:txEl>
+                                              <p:pRg st="2" end="2"/>
+                                            </p:txEl>
+                                          </p:spTgt>
+                                        </p:tgtEl>
+                                        <p:attrNameLst>
+                                          <p:attrName>ppt_x</p:attrName>
+                                        </p:attrNameLst>
+                                      </p:cBhvr>
+                                      <p:tavLst>
+                                        <p:tav tm="0">
+                                          <p:val>
+                                            <p:strVal val="#ppt_x"/>
+                                          </p:val>
+                                        </p:tav>
+                                        <p:tav tm="100000">
+                                          <p:val>
+                                            <p:strVal val="#ppt_x"/>
+                                          </p:val>
+                                        </p:tav>
+                                      </p:tavLst>
+                                    </p:anim>
+                                    <p:anim calcmode="lin" valueType="num">
+                                      <p:cBhvr>
+                                        <p:cTn id="19" dur="1000" fill="hold"/>
+                                        <p:tgtEl>
+                                          <p:spTgt spid="3">
+                                            <p:txEl>
+                                              <p:pRg st="2" end="2"/>
+                                            </p:txEl>
+                                          </p:spTgt>
+                                        </p:tgtEl>
+                                        <p:attrNameLst>
+                                          <p:attrName>ppt_y</p:attrName>
+                                        </p:attrNameLst>
+                                      </p:cBhvr>
+                                      <p:tavLst>
+                                        <p:tav tm="0">
+                                          <p:val>
+                                            <p:strVal val="#ppt_y+.1"/>
+                                          </p:val>
+                                        </p:tav>
+                                        <p:tav tm="100000">
+                                          <p:val>
+                                            <p:strVal val="#ppt_y"/>
+                                          </p:val>
+                                        </p:tav>
+                                      </p:tavLst>
+                                    </p:anim>
+                                  </p:childTnLst>
+                                </p:cTn>
+                              </p:par>
+                              <p:par>
+                                <p:cTn id="20" presetID="42" presetClass="entr" presetSubtype="0" fill="hold" grpId="0" nodeType="withEffect">
+                                  <p:stCondLst>
+                                    <p:cond delay="0"/>
+                                  </p:stCondLst>
+                                  <p:childTnLst>
+                                    <p:set>
+                                      <p:cBhvr>
+                                        <p:cTn id="21" dur="1" fill="hold">
+                                          <p:stCondLst>
+                                            <p:cond delay="0"/>
+                                          </p:stCondLst>
+                                        </p:cTn>
+                                        <p:tgtEl>
+                                          <p:spTgt spid="3">
+                                            <p:txEl>
+                                              <p:pRg st="3" end="3"/>
+                                            </p:txEl>
+                                          </p:spTgt>
+                                        </p:tgtEl>
+                                        <p:attrNameLst>
+                                          <p:attrName>style.visibility</p:attrName>
+                                        </p:attrNameLst>
+                                      </p:cBhvr>
+                                      <p:to>
+                                        <p:strVal val="visible"/>
+                                      </p:to>
+                                    </p:set>
+                                    <p:animEffect transition="in" filter="fade">
+                                      <p:cBhvr>
+                                        <p:cTn id="22" dur="1000"/>
+                                        <p:tgtEl>
+                                          <p:spTgt spid="3">
+                                            <p:txEl>
+                                              <p:pRg st="3" end="3"/>
+                                            </p:txEl>
+                                          </p:spTgt>
+                                        </p:tgtEl>
+                                      </p:cBhvr>
+                                    </p:animEffect>
+                                    <p:anim calcmode="lin" valueType="num">
+                                      <p:cBhvr>
+                                        <p:cTn id="23" dur="1000" fill="hold"/>
+                                        <p:tgtEl>
+                                          <p:spTgt spid="3">
+                                            <p:txEl>
+                                              <p:pRg st="3" end="3"/>
+                                            </p:txEl>
+                                          </p:spTgt>
+                                        </p:tgtEl>
+                                        <p:attrNameLst>
+                                          <p:attrName>ppt_x</p:attrName>
+                                        </p:attrNameLst>
+                                      </p:cBhvr>
+                                      <p:tavLst>
+                                        <p:tav tm="0">
+                                          <p:val>
+                                            <p:strVal val="#ppt_x"/>
+                                          </p:val>
+                                        </p:tav>
+                                        <p:tav tm="100000">
+                                          <p:val>
+                                            <p:strVal val="#ppt_x"/>
+                                          </p:val>
+                                        </p:tav>
+                                      </p:tavLst>
+                                    </p:anim>
+                                    <p:anim calcmode="lin" valueType="num">
+                                      <p:cBhvr>
+                                        <p:cTn id="24" dur="1000" fill="hold"/>
+                                        <p:tgtEl>
+                                          <p:spTgt spid="3">
+                                            <p:txEl>
+                                              <p:pRg st="3" end="3"/>
+                                            </p:txEl>
+                                          </p:spTgt>
+                                        </p:tgtEl>
+                                        <p:attrNameLst>
+                                          <p:attrName>ppt_y</p:attrName>
+                                        </p:attrNameLst>
+                                      </p:cBhvr>
+                                      <p:tavLst>
+                                        <p:tav tm="0">
+                                          <p:val>
+                                            <p:strVal val="#ppt_y+.1"/>
+                                          </p:val>
+                                        </p:tav>
+                                        <p:tav tm="100000">
+                                          <p:val>
+                                            <p:strVal val="#ppt_y"/>
+                                          </p:val>
+                                        </p:tav>
+                                      </p:tavLst>
+                                    </p:anim>
+                                  </p:childTnLst>
+                                </p:cTn>
+                              </p:par>
+                              <p:par>
+                                <p:cTn id="25" presetID="42" presetClass="entr" presetSubtype="0" fill="hold" grpId="0" nodeType="withEffect">
+                                  <p:stCondLst>
+                                    <p:cond delay="0"/>
+                                  </p:stCondLst>
+                                  <p:childTnLst>
+                                    <p:set>
+                                      <p:cBhvr>
+                                        <p:cTn id="26" dur="1" fill="hold">
+                                          <p:stCondLst>
+                                            <p:cond delay="0"/>
+                                          </p:stCondLst>
+                                        </p:cTn>
+                                        <p:tgtEl>
+                                          <p:spTgt spid="3">
+                                            <p:txEl>
+                                              <p:pRg st="4" end="4"/>
+                                            </p:txEl>
+                                          </p:spTgt>
+                                        </p:tgtEl>
+                                        <p:attrNameLst>
+                                          <p:attrName>style.visibility</p:attrName>
+                                        </p:attrNameLst>
+                                      </p:cBhvr>
+                                      <p:to>
+                                        <p:strVal val="visible"/>
+                                      </p:to>
+                                    </p:set>
+                                    <p:animEffect transition="in" filter="fade">
+                                      <p:cBhvr>
+                                        <p:cTn id="27" dur="1000"/>
+                                        <p:tgtEl>
+                                          <p:spTgt spid="3">
+                                            <p:txEl>
+                                              <p:pRg st="4" end="4"/>
+                                            </p:txEl>
+                                          </p:spTgt>
+                                        </p:tgtEl>
+                                      </p:cBhvr>
+                                    </p:animEffect>
+                                    <p:anim calcmode="lin" valueType="num">
+                                      <p:cBhvr>
+                                        <p:cTn id="28" dur="1000" fill="hold"/>
+                                        <p:tgtEl>
+                                          <p:spTgt spid="3">
+                                            <p:txEl>
+                                              <p:pRg st="4" end="4"/>
+                                            </p:txEl>
+                                          </p:spTgt>
+                                        </p:tgtEl>
+                                        <p:attrNameLst>
+                                          <p:attrName>ppt_x</p:attrName>
+                                        </p:attrNameLst>
+                                      </p:cBhvr>
+                                      <p:tavLst>
+                                        <p:tav tm="0">
+                                          <p:val>
+                                            <p:strVal val="#ppt_x"/>
+                                          </p:val>
+                                        </p:tav>
+                                        <p:tav tm="100000">
+                                          <p:val>
+                                            <p:strVal val="#ppt_x"/>
+                                          </p:val>
+                                        </p:tav>
+                                      </p:tavLst>
+                                    </p:anim>
+                                    <p:anim calcmode="lin" valueType="num">
+                                      <p:cBhvr>
+                                        <p:cTn id="29" dur="1000" fill="hold"/>
+                                        <p:tgtEl>
+                                          <p:spTgt spid="3">
+                                            <p:txEl>
+                                              <p:pRg st="4" end="4"/>
+                                            </p:txEl>
+                                          </p:spTgt>
+                                        </p:tgtEl>
+                                        <p:attrNameLst>
+                                          <p:attrName>ppt_y</p:attrName>
+                                        </p:attrNameLst>
+                                      </p:cBhvr>
+                                      <p:tavLst>
+                                        <p:tav tm="0">
+                                          <p:val>
+                                            <p:strVal val="#ppt_y+.1"/>
+                                          </p:val>
+                                        </p:tav>
+                                        <p:tav tm="100000">
+                                          <p:val>
+                                            <p:strVal val="#ppt_y"/>
+                                          </p:val>
+                                        </p:tav>
+                                      </p:tavLst>
+                                    </p:anim>
+                                  </p:childTnLst>
+                                </p:cTn>
+                              </p:par>
+                              <p:par>
+                                <p:cTn id="30" presetID="42" presetClass="entr" presetSubtype="0" fill="hold" grpId="0" nodeType="withEffect">
+                                  <p:stCondLst>
+                                    <p:cond delay="0"/>
+                                  </p:stCondLst>
+                                  <p:childTnLst>
+                                    <p:set>
+                                      <p:cBhvr>
+                                        <p:cTn id="31" dur="1" fill="hold">
+                                          <p:stCondLst>
+                                            <p:cond delay="0"/>
+                                          </p:stCondLst>
+                                        </p:cTn>
+                                        <p:tgtEl>
+                                          <p:spTgt spid="3">
+                                            <p:txEl>
+                                              <p:pRg st="5" end="5"/>
+                                            </p:txEl>
+                                          </p:spTgt>
+                                        </p:tgtEl>
+                                        <p:attrNameLst>
+                                          <p:attrName>style.visibility</p:attrName>
+                                        </p:attrNameLst>
+                                      </p:cBhvr>
+                                      <p:to>
+                                        <p:strVal val="visible"/>
+                                      </p:to>
+                                    </p:set>
+                                    <p:animEffect transition="in" filter="fade">
+                                      <p:cBhvr>
+                                        <p:cTn id="32" dur="1000"/>
+                                        <p:tgtEl>
+                                          <p:spTgt spid="3">
+                                            <p:txEl>
+                                              <p:pRg st="5" end="5"/>
+                                            </p:txEl>
+                                          </p:spTgt>
+                                        </p:tgtEl>
+                                      </p:cBhvr>
+                                    </p:animEffect>
+                                    <p:anim calcmode="lin" valueType="num">
+                                      <p:cBhvr>
+                                        <p:cTn id="33" dur="1000" fill="hold"/>
+                                        <p:tgtEl>
+                                          <p:spTgt spid="3">
+                                            <p:txEl>
+                                              <p:pRg st="5" end="5"/>
+                                            </p:txEl>
+                                          </p:spTgt>
+                                        </p:tgtEl>
+                                        <p:attrNameLst>
+                                          <p:attrName>ppt_x</p:attrName>
+                                        </p:attrNameLst>
+                                      </p:cBhvr>
+                                      <p:tavLst>
+                                        <p:tav tm="0">
+                                          <p:val>
+                                            <p:strVal val="#ppt_x"/>
+                                          </p:val>
+                                        </p:tav>
+                                        <p:tav tm="100000">
+                                          <p:val>
+                                            <p:strVal val="#ppt_x"/>
+                                          </p:val>
+                                        </p:tav>
+                                      </p:tavLst>
+                                    </p:anim>
+                                    <p:anim calcmode="lin" valueType="num">
+                                      <p:cBhvr>
+                                        <p:cTn id="34" dur="1000" fill="hold"/>
+                                        <p:tgtEl>
+                                          <p:spTgt spid="3">
+                                            <p:txEl>
+                                              <p:pRg st="5" end="5"/>
+                                            </p:txEl>
+                                          </p:spTgt>
+                                        </p:tgtEl>
+                                        <p:attrNameLst>
+                                          <p:attrName>ppt_y</p:attrName>
+                                        </p:attrNameLst>
+                                      </p:cBhvr>
+                                      <p:tavLst>
+                                        <p:tav tm="0">
+                                          <p:val>
+                                            <p:strVal val="#ppt_y+.1"/>
+                                          </p:val>
+                                        </p:tav>
+                                        <p:tav tm="100000">
+                                          <p:val>
+                                            <p:strVal val="#ppt_y"/>
+                                          </p:val>
+                                        </p:tav>
+                                      </p:tavLst>
+                                    </p:anim>
+                                  </p:childTnLst>
+                                </p:cTn>
+                              </p:par>
+                              <p:par>
+                                <p:cTn id="35" presetID="42" presetClass="entr" presetSubtype="0" fill="hold" grpId="0" nodeType="withEffect">
+                                  <p:stCondLst>
+                                    <p:cond delay="0"/>
+                                  </p:stCondLst>
+                                  <p:childTnLst>
+                                    <p:set>
+                                      <p:cBhvr>
+                                        <p:cTn id="36" dur="1" fill="hold">
+                                          <p:stCondLst>
+                                            <p:cond delay="0"/>
+                                          </p:stCondLst>
+                                        </p:cTn>
+                                        <p:tgtEl>
+                                          <p:spTgt spid="3">
+                                            <p:txEl>
+                                              <p:pRg st="6" end="6"/>
+                                            </p:txEl>
+                                          </p:spTgt>
+                                        </p:tgtEl>
+                                        <p:attrNameLst>
+                                          <p:attrName>style.visibility</p:attrName>
+                                        </p:attrNameLst>
+                                      </p:cBhvr>
+                                      <p:to>
+                                        <p:strVal val="visible"/>
+                                      </p:to>
+                                    </p:set>
+                                    <p:animEffect transition="in" filter="fade">
+                                      <p:cBhvr>
+                                        <p:cTn id="37" dur="1000"/>
+                                        <p:tgtEl>
+                                          <p:spTgt spid="3">
+                                            <p:txEl>
+                                              <p:pRg st="6" end="6"/>
+                                            </p:txEl>
+                                          </p:spTgt>
+                                        </p:tgtEl>
+                                      </p:cBhvr>
+                                    </p:animEffect>
+                                    <p:anim calcmode="lin" valueType="num">
+                                      <p:cBhvr>
+                                        <p:cTn id="38" dur="1000" fill="hold"/>
+                                        <p:tgtEl>
+                                          <p:spTgt spid="3">
+                                            <p:txEl>
+                                              <p:pRg st="6" end="6"/>
+                                            </p:txEl>
+                                          </p:spTgt>
+                                        </p:tgtEl>
+                                        <p:attrNameLst>
+                                          <p:attrName>ppt_x</p:attrName>
+                                        </p:attrNameLst>
+                                      </p:cBhvr>
+                                      <p:tavLst>
+                                        <p:tav tm="0">
+                                          <p:val>
+                                            <p:strVal val="#ppt_x"/>
+                                          </p:val>
+                                        </p:tav>
+                                        <p:tav tm="100000">
+                                          <p:val>
+                                            <p:strVal val="#ppt_x"/>
+                                          </p:val>
+                                        </p:tav>
+                                      </p:tavLst>
+                                    </p:anim>
+                                    <p:anim calcmode="lin" valueType="num">
+                                      <p:cBhvr>
+                                        <p:cTn id="39" dur="1000" fill="hold"/>
+                                        <p:tgtEl>
+                                          <p:spTgt spid="3">
+                                            <p:txEl>
+                                              <p:pRg st="6" end="6"/>
+                                            </p:txEl>
+                                          </p:spTgt>
+                                        </p:tgtEl>
+                                        <p:attrNameLst>
+                                          <p:attrName>ppt_y</p:attrName>
+                                        </p:attrNameLst>
+                                      </p:cBhvr>
+                                      <p:tavLst>
+                                        <p:tav tm="0">
+                                          <p:val>
+                                            <p:strVal val="#ppt_y+.1"/>
+                                          </p:val>
+                                        </p:tav>
+                                        <p:tav tm="100000">
+                                          <p:val>
+                                            <p:strVal val="#ppt_y"/>
+                                          </p:val>
+                                        </p:tav>
+                                      </p:tavLst>
+                                    </p:anim>
+                                  </p:childTnLst>
+                                </p:cTn>
+                              </p:par>
+                              <p:par>
+                                <p:cTn id="40" presetID="42" presetClass="entr" presetSubtype="0" fill="hold" grpId="0" nodeType="withEffect">
+                                  <p:stCondLst>
+                                    <p:cond delay="0"/>
+                                  </p:stCondLst>
+                                  <p:childTnLst>
+                                    <p:set>
+                                      <p:cBhvr>
+                                        <p:cTn id="41" dur="1" fill="hold">
+                                          <p:stCondLst>
+                                            <p:cond delay="0"/>
+                                          </p:stCondLst>
+                                        </p:cTn>
+                                        <p:tgtEl>
+                                          <p:spTgt spid="3">
+                                            <p:txEl>
+                                              <p:pRg st="7" end="7"/>
+                                            </p:txEl>
+                                          </p:spTgt>
+                                        </p:tgtEl>
+                                        <p:attrNameLst>
+                                          <p:attrName>style.visibility</p:attrName>
+                                        </p:attrNameLst>
+                                      </p:cBhvr>
+                                      <p:to>
+                                        <p:strVal val="visible"/>
+                                      </p:to>
+                                    </p:set>
+                                    <p:animEffect transition="in" filter="fade">
+                                      <p:cBhvr>
+                                        <p:cTn id="42" dur="1000"/>
+                                        <p:tgtEl>
+                                          <p:spTgt spid="3">
+                                            <p:txEl>
+                                              <p:pRg st="7" end="7"/>
+                                            </p:txEl>
+                                          </p:spTgt>
+                                        </p:tgtEl>
+                                      </p:cBhvr>
+                                    </p:animEffect>
+                                    <p:anim calcmode="lin" valueType="num">
+                                      <p:cBhvr>
+                                        <p:cTn id="43" dur="1000" fill="hold"/>
+                                        <p:tgtEl>
+                                          <p:spTgt spid="3">
+                                            <p:txEl>
+                                              <p:pRg st="7" end="7"/>
+                                            </p:txEl>
+                                          </p:spTgt>
+                                        </p:tgtEl>
+                                        <p:attrNameLst>
+                                          <p:attrName>ppt_x</p:attrName>
+                                        </p:attrNameLst>
+                                      </p:cBhvr>
+                                      <p:tavLst>
+                                        <p:tav tm="0">
+                                          <p:val>
+                                            <p:strVal val="#ppt_x"/>
+                                          </p:val>
+                                        </p:tav>
+                                        <p:tav tm="100000">
+                                          <p:val>
+                                            <p:strVal val="#ppt_x"/>
+                                          </p:val>
+                                        </p:tav>
+                                      </p:tavLst>
+                                    </p:anim>
+                                    <p:anim calcmode="lin" valueType="num">
+                                      <p:cBhvr>
+                                        <p:cTn id="44" dur="1000" fill="hold"/>
+                                        <p:tgtEl>
+                                          <p:spTgt spid="3">
+                                            <p:txEl>
+                                              <p:pRg st="7" end="7"/>
+                                            </p:txEl>
+                                          </p:spTgt>
+                                        </p:tgtEl>
+                                        <p:attrNameLst>
+                                          <p:attrName>ppt_y</p:attrName>
+                                        </p:attrNameLst>
+                                      </p:cBhvr>
+                                      <p:tavLst>
+                                        <p:tav tm="0">
+                                          <p:val>
+                                            <p:strVal val="#ppt_y+.1"/>
+                                          </p:val>
+                                        </p:tav>
+                                        <p:tav tm="100000">
+                                          <p:val>
+                                            <p:strVal val="#ppt_y"/>
+                                          </p:val>
+                                        </p:tav>
+                                      </p:tavLst>
+                                    </p:anim>
+                                  </p:childTnLst>
+                                </p:cTn>
+                              </p:par>
+                            </p:childTnLst>
+                          </p:cTn>
+                        </p:par>
+                      </p:childTnLst>
+                    </p:cTn>
+                  </p:par>
+                </p:childTnLst>
+              </p:cTn>
+              <p:prevCondLst>
+                <p:cond evt="onPrev" delay="0">
+                  <p:tgtEl>
+                    <p:sldTgt/>
+                  </p:tgtEl>
+                </p:cond>
+              </p:prevCondLst>
+              <p:nextCondLst>
+                <p:cond evt="onNext" delay="0">
+                  <p:tgtEl>
+                    <p:sldTgt/>
+                  </p:tgtEl>
+                </p:cond>
+              </p:nextCondLst>
+            </p:seq>
+          </p:childTnLst>
+        </p:cTn>
+      </p:par>
+    </p:tnLst>
+    <p:bldLst>
+      <p:bldP spid="3" grpId="0" build="p"/>
+    </p:bldLst>
+  </p:timing>
 </p:sld>
 </file>
 
@@ -8941,6 +12504,92 @@
   <p:clrMapOvr>
     <a:masterClrMapping/>
   </p:clrMapOvr>
+  <p:timing>
+    <p:tnLst>
+      <p:par>
+        <p:cTn id="1" dur="indefinite" restart="never" nodeType="tmRoot">
+          <p:childTnLst>
+            <p:seq concurrent="1" nextAc="seek">
+              <p:cTn id="2" dur="indefinite" nodeType="mainSeq">
+                <p:childTnLst>
+                  <p:par>
+                    <p:cTn id="3" fill="hold">
+                      <p:stCondLst>
+                        <p:cond delay="indefinite"/>
+                      </p:stCondLst>
+                      <p:childTnLst>
+                        <p:par>
+                          <p:cTn id="4" fill="hold">
+                            <p:stCondLst>
+                              <p:cond delay="0"/>
+                            </p:stCondLst>
+                            <p:childTnLst>
+                              <p:par>
+                                <p:cTn id="5" presetID="22" presetClass="entr" presetSubtype="4" fill="hold" grpId="0" nodeType="clickEffect">
+                                  <p:stCondLst>
+                                    <p:cond delay="0"/>
+                                  </p:stCondLst>
+                                  <p:childTnLst>
+                                    <p:set>
+                                      <p:cBhvr>
+                                        <p:cTn id="6" dur="1" fill="hold">
+                                          <p:stCondLst>
+                                            <p:cond delay="0"/>
+                                          </p:stCondLst>
+                                        </p:cTn>
+                                        <p:tgtEl>
+                                          <p:spTgt spid="77"/>
+                                        </p:tgtEl>
+                                        <p:attrNameLst>
+                                          <p:attrName>style.visibility</p:attrName>
+                                        </p:attrNameLst>
+                                      </p:cBhvr>
+                                      <p:to>
+                                        <p:strVal val="visible"/>
+                                      </p:to>
+                                    </p:set>
+                                    <p:animEffect transition="in" filter="wipe(down)">
+                                      <p:cBhvr>
+                                        <p:cTn id="7" dur="500"/>
+                                        <p:tgtEl>
+                                          <p:spTgt spid="77"/>
+                                        </p:tgtEl>
+                                      </p:cBhvr>
+                                    </p:animEffect>
+                                  </p:childTnLst>
+                                </p:cTn>
+                              </p:par>
+                            </p:childTnLst>
+                          </p:cTn>
+                        </p:par>
+                      </p:childTnLst>
+                    </p:cTn>
+                  </p:par>
+                </p:childTnLst>
+              </p:cTn>
+              <p:prevCondLst>
+                <p:cond evt="onPrev" delay="0">
+                  <p:tgtEl>
+                    <p:sldTgt/>
+                  </p:tgtEl>
+                </p:cond>
+              </p:prevCondLst>
+              <p:nextCondLst>
+                <p:cond evt="onNext" delay="0">
+                  <p:tgtEl>
+                    <p:sldTgt/>
+                  </p:tgtEl>
+                </p:cond>
+              </p:nextCondLst>
+            </p:seq>
+          </p:childTnLst>
+        </p:cTn>
+      </p:par>
+    </p:tnLst>
+    <p:bldLst>
+      <p:bldP spid="77" grpId="0"/>
+    </p:bldLst>
+  </p:timing>
 </p:sld>
 </file>
 
@@ -9095,6 +12744,283 @@
   <p:clrMapOvr>
     <a:masterClrMapping/>
   </p:clrMapOvr>
+  <p:timing>
+    <p:tnLst>
+      <p:par>
+        <p:cTn id="1" dur="indefinite" restart="never" nodeType="tmRoot">
+          <p:childTnLst>
+            <p:seq concurrent="1" nextAc="seek">
+              <p:cTn id="2" dur="indefinite" nodeType="mainSeq">
+                <p:childTnLst>
+                  <p:par>
+                    <p:cTn id="3" fill="hold">
+                      <p:stCondLst>
+                        <p:cond delay="indefinite"/>
+                      </p:stCondLst>
+                      <p:childTnLst>
+                        <p:par>
+                          <p:cTn id="4" fill="hold">
+                            <p:stCondLst>
+                              <p:cond delay="0"/>
+                            </p:stCondLst>
+                            <p:childTnLst>
+                              <p:par>
+                                <p:cTn id="5" presetID="10" presetClass="entr" presetSubtype="0" fill="hold" grpId="0" nodeType="clickEffect">
+                                  <p:stCondLst>
+                                    <p:cond delay="0"/>
+                                  </p:stCondLst>
+                                  <p:childTnLst>
+                                    <p:set>
+                                      <p:cBhvr>
+                                        <p:cTn id="6" dur="1" fill="hold">
+                                          <p:stCondLst>
+                                            <p:cond delay="0"/>
+                                          </p:stCondLst>
+                                        </p:cTn>
+                                        <p:tgtEl>
+                                          <p:spTgt spid="83">
+                                            <p:txEl>
+                                              <p:pRg st="0" end="0"/>
+                                            </p:txEl>
+                                          </p:spTgt>
+                                        </p:tgtEl>
+                                        <p:attrNameLst>
+                                          <p:attrName>style.visibility</p:attrName>
+                                        </p:attrNameLst>
+                                      </p:cBhvr>
+                                      <p:to>
+                                        <p:strVal val="visible"/>
+                                      </p:to>
+                                    </p:set>
+                                    <p:animEffect transition="in" filter="fade">
+                                      <p:cBhvr>
+                                        <p:cTn id="7" dur="500"/>
+                                        <p:tgtEl>
+                                          <p:spTgt spid="83">
+                                            <p:txEl>
+                                              <p:pRg st="0" end="0"/>
+                                            </p:txEl>
+                                          </p:spTgt>
+                                        </p:tgtEl>
+                                      </p:cBhvr>
+                                    </p:animEffect>
+                                  </p:childTnLst>
+                                </p:cTn>
+                              </p:par>
+                            </p:childTnLst>
+                          </p:cTn>
+                        </p:par>
+                      </p:childTnLst>
+                    </p:cTn>
+                  </p:par>
+                  <p:par>
+                    <p:cTn id="8" fill="hold">
+                      <p:stCondLst>
+                        <p:cond delay="indefinite"/>
+                      </p:stCondLst>
+                      <p:childTnLst>
+                        <p:par>
+                          <p:cTn id="9" fill="hold">
+                            <p:stCondLst>
+                              <p:cond delay="0"/>
+                            </p:stCondLst>
+                            <p:childTnLst>
+                              <p:par>
+                                <p:cTn id="10" presetID="10" presetClass="entr" presetSubtype="0" fill="hold" grpId="0" nodeType="clickEffect">
+                                  <p:stCondLst>
+                                    <p:cond delay="0"/>
+                                  </p:stCondLst>
+                                  <p:childTnLst>
+                                    <p:set>
+                                      <p:cBhvr>
+                                        <p:cTn id="11" dur="1" fill="hold">
+                                          <p:stCondLst>
+                                            <p:cond delay="0"/>
+                                          </p:stCondLst>
+                                        </p:cTn>
+                                        <p:tgtEl>
+                                          <p:spTgt spid="83">
+                                            <p:txEl>
+                                              <p:pRg st="1" end="1"/>
+                                            </p:txEl>
+                                          </p:spTgt>
+                                        </p:tgtEl>
+                                        <p:attrNameLst>
+                                          <p:attrName>style.visibility</p:attrName>
+                                        </p:attrNameLst>
+                                      </p:cBhvr>
+                                      <p:to>
+                                        <p:strVal val="visible"/>
+                                      </p:to>
+                                    </p:set>
+                                    <p:animEffect transition="in" filter="fade">
+                                      <p:cBhvr>
+                                        <p:cTn id="12" dur="500"/>
+                                        <p:tgtEl>
+                                          <p:spTgt spid="83">
+                                            <p:txEl>
+                                              <p:pRg st="1" end="1"/>
+                                            </p:txEl>
+                                          </p:spTgt>
+                                        </p:tgtEl>
+                                      </p:cBhvr>
+                                    </p:animEffect>
+                                  </p:childTnLst>
+                                </p:cTn>
+                              </p:par>
+                            </p:childTnLst>
+                          </p:cTn>
+                        </p:par>
+                      </p:childTnLst>
+                    </p:cTn>
+                  </p:par>
+                  <p:par>
+                    <p:cTn id="13" fill="hold">
+                      <p:stCondLst>
+                        <p:cond delay="indefinite"/>
+                      </p:stCondLst>
+                      <p:childTnLst>
+                        <p:par>
+                          <p:cTn id="14" fill="hold">
+                            <p:stCondLst>
+                              <p:cond delay="0"/>
+                            </p:stCondLst>
+                            <p:childTnLst>
+                              <p:par>
+                                <p:cTn id="15" presetID="10" presetClass="entr" presetSubtype="0" fill="hold" grpId="0" nodeType="clickEffect">
+                                  <p:stCondLst>
+                                    <p:cond delay="0"/>
+                                  </p:stCondLst>
+                                  <p:childTnLst>
+                                    <p:set>
+                                      <p:cBhvr>
+                                        <p:cTn id="16" dur="1" fill="hold">
+                                          <p:stCondLst>
+                                            <p:cond delay="0"/>
+                                          </p:stCondLst>
+                                        </p:cTn>
+                                        <p:tgtEl>
+                                          <p:spTgt spid="83">
+                                            <p:txEl>
+                                              <p:pRg st="2" end="2"/>
+                                            </p:txEl>
+                                          </p:spTgt>
+                                        </p:tgtEl>
+                                        <p:attrNameLst>
+                                          <p:attrName>style.visibility</p:attrName>
+                                        </p:attrNameLst>
+                                      </p:cBhvr>
+                                      <p:to>
+                                        <p:strVal val="visible"/>
+                                      </p:to>
+                                    </p:set>
+                                    <p:animEffect transition="in" filter="fade">
+                                      <p:cBhvr>
+                                        <p:cTn id="17" dur="500"/>
+                                        <p:tgtEl>
+                                          <p:spTgt spid="83">
+                                            <p:txEl>
+                                              <p:pRg st="2" end="2"/>
+                                            </p:txEl>
+                                          </p:spTgt>
+                                        </p:tgtEl>
+                                      </p:cBhvr>
+                                    </p:animEffect>
+                                  </p:childTnLst>
+                                </p:cTn>
+                              </p:par>
+                            </p:childTnLst>
+                          </p:cTn>
+                        </p:par>
+                      </p:childTnLst>
+                    </p:cTn>
+                  </p:par>
+                  <p:par>
+                    <p:cTn id="18" fill="hold">
+                      <p:stCondLst>
+                        <p:cond delay="indefinite"/>
+                      </p:stCondLst>
+                      <p:childTnLst>
+                        <p:par>
+                          <p:cTn id="19" fill="hold">
+                            <p:stCondLst>
+                              <p:cond delay="0"/>
+                            </p:stCondLst>
+                            <p:childTnLst>
+                              <p:par>
+                                <p:cTn id="20" presetID="10" presetClass="entr" presetSubtype="0" fill="hold" grpId="0" nodeType="clickEffect">
+                                  <p:stCondLst>
+                                    <p:cond delay="0"/>
+                                  </p:stCondLst>
+                                  <p:childTnLst>
+                                    <p:set>
+                                      <p:cBhvr>
+                                        <p:cTn id="21" dur="1" fill="hold">
+                                          <p:stCondLst>
+                                            <p:cond delay="0"/>
+                                          </p:stCondLst>
+                                        </p:cTn>
+                                        <p:tgtEl>
+                                          <p:spTgt spid="83">
+                                            <p:txEl>
+                                              <p:pRg st="3" end="3"/>
+                                            </p:txEl>
+                                          </p:spTgt>
+                                        </p:tgtEl>
+                                        <p:attrNameLst>
+                                          <p:attrName>style.visibility</p:attrName>
+                                        </p:attrNameLst>
+                                      </p:cBhvr>
+                                      <p:to>
+                                        <p:strVal val="visible"/>
+                                      </p:to>
+                                    </p:set>
+                                    <p:animEffect transition="in" filter="fade">
+                                      <p:cBhvr>
+                                        <p:cTn id="22" dur="500"/>
+                                        <p:tgtEl>
+                                          <p:spTgt spid="83">
+                                            <p:txEl>
+                                              <p:pRg st="3" end="3"/>
+                                            </p:txEl>
+                                          </p:spTgt>
+                                        </p:tgtEl>
+                                      </p:cBhvr>
+                                    </p:animEffect>
+                                  </p:childTnLst>
+                                </p:cTn>
+                              </p:par>
+                            </p:childTnLst>
+                          </p:cTn>
+                        </p:par>
+                      </p:childTnLst>
+                    </p:cTn>
+                  </p:par>
+                </p:childTnLst>
+              </p:cTn>
+              <p:prevCondLst>
+                <p:cond evt="onPrev" delay="0">
+                  <p:tgtEl>
+                    <p:sldTgt/>
+                  </p:tgtEl>
+                </p:cond>
+              </p:prevCondLst>
+              <p:nextCondLst>
+                <p:cond evt="onNext" delay="0">
+                  <p:tgtEl>
+                    <p:sldTgt/>
+                  </p:tgtEl>
+                </p:cond>
+              </p:nextCondLst>
+            </p:seq>
+          </p:childTnLst>
+        </p:cTn>
+      </p:par>
+    </p:tnLst>
+    <p:bldLst>
+      <p:bldP spid="83" grpId="0" build="p"/>
+    </p:bldLst>
+  </p:timing>
 </p:sld>
 </file>
 
@@ -9226,6 +13152,245 @@
   <p:clrMapOvr>
     <a:masterClrMapping/>
   </p:clrMapOvr>
+  <p:timing>
+    <p:tnLst>
+      <p:par>
+        <p:cTn id="1" dur="indefinite" restart="never" nodeType="tmRoot">
+          <p:childTnLst>
+            <p:seq concurrent="1" nextAc="seek">
+              <p:cTn id="2" dur="indefinite" nodeType="mainSeq">
+                <p:childTnLst>
+                  <p:par>
+                    <p:cTn id="3" fill="hold">
+                      <p:stCondLst>
+                        <p:cond delay="indefinite"/>
+                      </p:stCondLst>
+                      <p:childTnLst>
+                        <p:par>
+                          <p:cTn id="4" fill="hold">
+                            <p:stCondLst>
+                              <p:cond delay="0"/>
+                            </p:stCondLst>
+                            <p:childTnLst>
+                              <p:par>
+                                <p:cTn id="5" presetID="2" presetClass="entr" presetSubtype="4" fill="hold" grpId="0" nodeType="clickEffect">
+                                  <p:stCondLst>
+                                    <p:cond delay="0"/>
+                                  </p:stCondLst>
+                                  <p:childTnLst>
+                                    <p:set>
+                                      <p:cBhvr>
+                                        <p:cTn id="6" dur="1" fill="hold">
+                                          <p:stCondLst>
+                                            <p:cond delay="0"/>
+                                          </p:stCondLst>
+                                        </p:cTn>
+                                        <p:tgtEl>
+                                          <p:spTgt spid="89">
+                                            <p:txEl>
+                                              <p:pRg st="0" end="0"/>
+                                            </p:txEl>
+                                          </p:spTgt>
+                                        </p:tgtEl>
+                                        <p:attrNameLst>
+                                          <p:attrName>style.visibility</p:attrName>
+                                        </p:attrNameLst>
+                                      </p:cBhvr>
+                                      <p:to>
+                                        <p:strVal val="visible"/>
+                                      </p:to>
+                                    </p:set>
+                                    <p:anim calcmode="lin" valueType="num">
+                                      <p:cBhvr additive="base">
+                                        <p:cTn id="7" dur="500" fill="hold"/>
+                                        <p:tgtEl>
+                                          <p:spTgt spid="89">
+                                            <p:txEl>
+                                              <p:pRg st="0" end="0"/>
+                                            </p:txEl>
+                                          </p:spTgt>
+                                        </p:tgtEl>
+                                        <p:attrNameLst>
+                                          <p:attrName>ppt_x</p:attrName>
+                                        </p:attrNameLst>
+                                      </p:cBhvr>
+                                      <p:tavLst>
+                                        <p:tav tm="0">
+                                          <p:val>
+                                            <p:strVal val="#ppt_x"/>
+                                          </p:val>
+                                        </p:tav>
+                                        <p:tav tm="100000">
+                                          <p:val>
+                                            <p:strVal val="#ppt_x"/>
+                                          </p:val>
+                                        </p:tav>
+                                      </p:tavLst>
+                                    </p:anim>
+                                    <p:anim calcmode="lin" valueType="num">
+                                      <p:cBhvr additive="base">
+                                        <p:cTn id="8" dur="500" fill="hold"/>
+                                        <p:tgtEl>
+                                          <p:spTgt spid="89">
+                                            <p:txEl>
+                                              <p:pRg st="0" end="0"/>
+                                            </p:txEl>
+                                          </p:spTgt>
+                                        </p:tgtEl>
+                                        <p:attrNameLst>
+                                          <p:attrName>ppt_y</p:attrName>
+                                        </p:attrNameLst>
+                                      </p:cBhvr>
+                                      <p:tavLst>
+                                        <p:tav tm="0">
+                                          <p:val>
+                                            <p:strVal val="1+#ppt_h/2"/>
+                                          </p:val>
+                                        </p:tav>
+                                        <p:tav tm="100000">
+                                          <p:val>
+                                            <p:strVal val="#ppt_y"/>
+                                          </p:val>
+                                        </p:tav>
+                                      </p:tavLst>
+                                    </p:anim>
+                                  </p:childTnLst>
+                                </p:cTn>
+                              </p:par>
+                            </p:childTnLst>
+                          </p:cTn>
+                        </p:par>
+                      </p:childTnLst>
+                    </p:cTn>
+                  </p:par>
+                  <p:par>
+                    <p:cTn id="9" fill="hold">
+                      <p:stCondLst>
+                        <p:cond delay="indefinite"/>
+                      </p:stCondLst>
+                      <p:childTnLst>
+                        <p:par>
+                          <p:cTn id="10" fill="hold">
+                            <p:stCondLst>
+                              <p:cond delay="0"/>
+                            </p:stCondLst>
+                            <p:childTnLst>
+                              <p:par>
+                                <p:cTn id="11" presetID="2" presetClass="entr" presetSubtype="4" fill="hold" grpId="0" nodeType="clickEffect">
+                                  <p:stCondLst>
+                                    <p:cond delay="0"/>
+                                  </p:stCondLst>
+                                  <p:childTnLst>
+                                    <p:set>
+                                      <p:cBhvr>
+                                        <p:cTn id="12" dur="1" fill="hold">
+                                          <p:stCondLst>
+                                            <p:cond delay="0"/>
+                                          </p:stCondLst>
+                                        </p:cTn>
+                                        <p:tgtEl>
+                                          <p:spTgt spid="89">
+                                            <p:txEl>
+                                              <p:pRg st="1" end="1"/>
+                                            </p:txEl>
+                                          </p:spTgt>
+                                        </p:tgtEl>
+                                        <p:attrNameLst>
+                                          <p:attrName>style.visibility</p:attrName>
+                                        </p:attrNameLst>
+                                      </p:cBhvr>
+                                      <p:to>
+                                        <p:strVal val="visible"/>
+                                      </p:to>
+                                    </p:set>
+                                    <p:anim calcmode="lin" valueType="num">
+                                      <p:cBhvr additive="base">
+                                        <p:cTn id="13" dur="500" fill="hold"/>
+                                        <p:tgtEl>
+                                          <p:spTgt spid="89">
+                                            <p:txEl>
+                                              <p:pRg st="1" end="1"/>
+                                            </p:txEl>
+                                          </p:spTgt>
+                                        </p:tgtEl>
+                                        <p:attrNameLst>
+                                          <p:attrName>ppt_x</p:attrName>
+                                        </p:attrNameLst>
+                                      </p:cBhvr>
+                                      <p:tavLst>
+                                        <p:tav tm="0">
+                                          <p:val>
+                                            <p:strVal val="#ppt_x"/>
+                                          </p:val>
+                                        </p:tav>
+                                        <p:tav tm="100000">
+                                          <p:val>
+                                            <p:strVal val="#ppt_x"/>
+                                          </p:val>
+                                        </p:tav>
+                                      </p:tavLst>
+                                    </p:anim>
+                                    <p:anim calcmode="lin" valueType="num">
+                                      <p:cBhvr additive="base">
+                                        <p:cTn id="14" dur="500" fill="hold"/>
+                                        <p:tgtEl>
+                                          <p:spTgt spid="89">
+                                            <p:txEl>
+                                              <p:pRg st="1" end="1"/>
+                                            </p:txEl>
+                                          </p:spTgt>
+                                        </p:tgtEl>
+                                        <p:attrNameLst>
+                                          <p:attrName>ppt_y</p:attrName>
+                                        </p:attrNameLst>
+                                      </p:cBhvr>
+                                      <p:tavLst>
+                                        <p:tav tm="0">
+                                          <p:val>
+                                            <p:strVal val="1+#ppt_h/2"/>
+                                          </p:val>
+                                        </p:tav>
+                                        <p:tav tm="100000">
+                                          <p:val>
+                                            <p:strVal val="#ppt_y"/>
+                                          </p:val>
+                                        </p:tav>
+                                      </p:tavLst>
+                                    </p:anim>
+                                  </p:childTnLst>
+                                </p:cTn>
+                              </p:par>
+                            </p:childTnLst>
+                          </p:cTn>
+                        </p:par>
+                      </p:childTnLst>
+                    </p:cTn>
+                  </p:par>
+                </p:childTnLst>
+              </p:cTn>
+              <p:prevCondLst>
+                <p:cond evt="onPrev" delay="0">
+                  <p:tgtEl>
+                    <p:sldTgt/>
+                  </p:tgtEl>
+                </p:cond>
+              </p:prevCondLst>
+              <p:nextCondLst>
+                <p:cond evt="onNext" delay="0">
+                  <p:tgtEl>
+                    <p:sldTgt/>
+                  </p:tgtEl>
+                </p:cond>
+              </p:nextCondLst>
+            </p:seq>
+          </p:childTnLst>
+        </p:cTn>
+      </p:par>
+    </p:tnLst>
+    <p:bldLst>
+      <p:bldP spid="89" grpId="0" build="p"/>
+    </p:bldLst>
+  </p:timing>
 </p:sld>
 </file>
 

</xml_diff>

<commit_message>
updated presentation talking points - Kumash
</commit_message>
<xml_diff>
--- a/Rough work/Project Presentation.pptx
+++ b/Rough work/Project Presentation.pptx
@@ -11556,7 +11556,94 @@
               <a:rPr lang="en-US" dirty="0"/>
               <a:t>Kumash also had a fix which the group ended up incorporating in, which was to merge the original two fetch functions into one and then initiated the fix in there</a:t>
             </a:r>
-            <a:endParaRPr lang="en-US" sz="1250" dirty="0"/>
+          </a:p>
+          <a:p>
+            <a:pPr lvl="1" indent="-342900">
+              <a:spcBef>
+                <a:spcPts val="0"/>
+              </a:spcBef>
+              <a:buSzPts val="1800"/>
+              <a:buChar char="●"/>
+            </a:pPr>
+            <a:r>
+              <a:rPr lang="en-US" sz="1350" dirty="0"/>
+              <a:t>Issues with the remove from watchlist button:</a:t>
+            </a:r>
+          </a:p>
+          <a:p>
+            <a:pPr lvl="2" indent="-342900">
+              <a:spcBef>
+                <a:spcPts val="0"/>
+              </a:spcBef>
+              <a:buSzPts val="1800"/>
+              <a:buChar char="●"/>
+            </a:pPr>
+            <a:r>
+              <a:rPr lang="en-US" sz="1200" dirty="0"/>
+              <a:t>Since there are 2 elements, the trash icon and the red background, the </a:t>
+            </a:r>
+            <a:r>
+              <a:rPr lang="en-US" sz="1200" dirty="0" err="1"/>
+              <a:t>event.target</a:t>
+            </a:r>
+            <a:r>
+              <a:rPr lang="en-US" sz="1200" dirty="0"/>
+              <a:t> was only select the trashcan.</a:t>
+            </a:r>
+          </a:p>
+          <a:p>
+            <a:pPr lvl="2" indent="-342900">
+              <a:spcBef>
+                <a:spcPts val="0"/>
+              </a:spcBef>
+              <a:buSzPts val="1800"/>
+              <a:buChar char="●"/>
+            </a:pPr>
+            <a:r>
+              <a:rPr lang="en-US" sz="1200" dirty="0"/>
+              <a:t>A quick fix was to apply the id to both items (red background and the trashcan)</a:t>
+            </a:r>
+          </a:p>
+          <a:p>
+            <a:pPr lvl="2" indent="-342900">
+              <a:spcBef>
+                <a:spcPts val="0"/>
+              </a:spcBef>
+              <a:buSzPts val="1800"/>
+              <a:buChar char="●"/>
+            </a:pPr>
+            <a:r>
+              <a:rPr lang="en-US" sz="1200" dirty="0"/>
+              <a:t>And make the changes to our </a:t>
+            </a:r>
+            <a:r>
+              <a:rPr lang="en-US" sz="1200" dirty="0" err="1"/>
+              <a:t>removeFromWatchlist</a:t>
+            </a:r>
+            <a:r>
+              <a:rPr lang="en-US" sz="1200" dirty="0"/>
+              <a:t> handler code as shown </a:t>
+            </a:r>
+            <a:r>
+              <a:rPr lang="en-US" sz="1200" dirty="0">
+                <a:hlinkClick r:id="rId2" action="ppaction://hlinkfile"/>
+              </a:rPr>
+              <a:t>here</a:t>
+            </a:r>
+            <a:r>
+              <a:rPr lang="en-US" sz="1200" dirty="0"/>
+              <a:t>.</a:t>
+            </a:r>
+          </a:p>
+          <a:p>
+            <a:pPr lvl="2" indent="-342900">
+              <a:spcBef>
+                <a:spcPts val="0"/>
+              </a:spcBef>
+              <a:buSzPts val="1800"/>
+              <a:buChar char="●"/>
+            </a:pPr>
+            <a:endParaRPr lang="en-US" sz="1200" dirty="0"/>
           </a:p>
           <a:p>
             <a:pPr lvl="2" indent="-342900">
@@ -12387,6 +12474,394 @@
                                           <p:spTgt spid="3">
                                             <p:txEl>
                                               <p:pRg st="7" end="7"/>
+                                            </p:txEl>
+                                          </p:spTgt>
+                                        </p:tgtEl>
+                                        <p:attrNameLst>
+                                          <p:attrName>ppt_y</p:attrName>
+                                        </p:attrNameLst>
+                                      </p:cBhvr>
+                                      <p:tavLst>
+                                        <p:tav tm="0">
+                                          <p:val>
+                                            <p:strVal val="#ppt_y+.1"/>
+                                          </p:val>
+                                        </p:tav>
+                                        <p:tav tm="100000">
+                                          <p:val>
+                                            <p:strVal val="#ppt_y"/>
+                                          </p:val>
+                                        </p:tav>
+                                      </p:tavLst>
+                                    </p:anim>
+                                  </p:childTnLst>
+                                </p:cTn>
+                              </p:par>
+                              <p:par>
+                                <p:cTn id="45" presetID="42" presetClass="entr" presetSubtype="0" fill="hold" grpId="0" nodeType="withEffect">
+                                  <p:stCondLst>
+                                    <p:cond delay="0"/>
+                                  </p:stCondLst>
+                                  <p:childTnLst>
+                                    <p:set>
+                                      <p:cBhvr>
+                                        <p:cTn id="46" dur="1" fill="hold">
+                                          <p:stCondLst>
+                                            <p:cond delay="0"/>
+                                          </p:stCondLst>
+                                        </p:cTn>
+                                        <p:tgtEl>
+                                          <p:spTgt spid="3">
+                                            <p:txEl>
+                                              <p:pRg st="8" end="8"/>
+                                            </p:txEl>
+                                          </p:spTgt>
+                                        </p:tgtEl>
+                                        <p:attrNameLst>
+                                          <p:attrName>style.visibility</p:attrName>
+                                        </p:attrNameLst>
+                                      </p:cBhvr>
+                                      <p:to>
+                                        <p:strVal val="visible"/>
+                                      </p:to>
+                                    </p:set>
+                                    <p:animEffect transition="in" filter="fade">
+                                      <p:cBhvr>
+                                        <p:cTn id="47" dur="1000"/>
+                                        <p:tgtEl>
+                                          <p:spTgt spid="3">
+                                            <p:txEl>
+                                              <p:pRg st="8" end="8"/>
+                                            </p:txEl>
+                                          </p:spTgt>
+                                        </p:tgtEl>
+                                      </p:cBhvr>
+                                    </p:animEffect>
+                                    <p:anim calcmode="lin" valueType="num">
+                                      <p:cBhvr>
+                                        <p:cTn id="48" dur="1000" fill="hold"/>
+                                        <p:tgtEl>
+                                          <p:spTgt spid="3">
+                                            <p:txEl>
+                                              <p:pRg st="8" end="8"/>
+                                            </p:txEl>
+                                          </p:spTgt>
+                                        </p:tgtEl>
+                                        <p:attrNameLst>
+                                          <p:attrName>ppt_x</p:attrName>
+                                        </p:attrNameLst>
+                                      </p:cBhvr>
+                                      <p:tavLst>
+                                        <p:tav tm="0">
+                                          <p:val>
+                                            <p:strVal val="#ppt_x"/>
+                                          </p:val>
+                                        </p:tav>
+                                        <p:tav tm="100000">
+                                          <p:val>
+                                            <p:strVal val="#ppt_x"/>
+                                          </p:val>
+                                        </p:tav>
+                                      </p:tavLst>
+                                    </p:anim>
+                                    <p:anim calcmode="lin" valueType="num">
+                                      <p:cBhvr>
+                                        <p:cTn id="49" dur="1000" fill="hold"/>
+                                        <p:tgtEl>
+                                          <p:spTgt spid="3">
+                                            <p:txEl>
+                                              <p:pRg st="8" end="8"/>
+                                            </p:txEl>
+                                          </p:spTgt>
+                                        </p:tgtEl>
+                                        <p:attrNameLst>
+                                          <p:attrName>ppt_y</p:attrName>
+                                        </p:attrNameLst>
+                                      </p:cBhvr>
+                                      <p:tavLst>
+                                        <p:tav tm="0">
+                                          <p:val>
+                                            <p:strVal val="#ppt_y+.1"/>
+                                          </p:val>
+                                        </p:tav>
+                                        <p:tav tm="100000">
+                                          <p:val>
+                                            <p:strVal val="#ppt_y"/>
+                                          </p:val>
+                                        </p:tav>
+                                      </p:tavLst>
+                                    </p:anim>
+                                  </p:childTnLst>
+                                </p:cTn>
+                              </p:par>
+                              <p:par>
+                                <p:cTn id="50" presetID="42" presetClass="entr" presetSubtype="0" fill="hold" grpId="0" nodeType="withEffect">
+                                  <p:stCondLst>
+                                    <p:cond delay="0"/>
+                                  </p:stCondLst>
+                                  <p:childTnLst>
+                                    <p:set>
+                                      <p:cBhvr>
+                                        <p:cTn id="51" dur="1" fill="hold">
+                                          <p:stCondLst>
+                                            <p:cond delay="0"/>
+                                          </p:stCondLst>
+                                        </p:cTn>
+                                        <p:tgtEl>
+                                          <p:spTgt spid="3">
+                                            <p:txEl>
+                                              <p:pRg st="9" end="9"/>
+                                            </p:txEl>
+                                          </p:spTgt>
+                                        </p:tgtEl>
+                                        <p:attrNameLst>
+                                          <p:attrName>style.visibility</p:attrName>
+                                        </p:attrNameLst>
+                                      </p:cBhvr>
+                                      <p:to>
+                                        <p:strVal val="visible"/>
+                                      </p:to>
+                                    </p:set>
+                                    <p:animEffect transition="in" filter="fade">
+                                      <p:cBhvr>
+                                        <p:cTn id="52" dur="1000"/>
+                                        <p:tgtEl>
+                                          <p:spTgt spid="3">
+                                            <p:txEl>
+                                              <p:pRg st="9" end="9"/>
+                                            </p:txEl>
+                                          </p:spTgt>
+                                        </p:tgtEl>
+                                      </p:cBhvr>
+                                    </p:animEffect>
+                                    <p:anim calcmode="lin" valueType="num">
+                                      <p:cBhvr>
+                                        <p:cTn id="53" dur="1000" fill="hold"/>
+                                        <p:tgtEl>
+                                          <p:spTgt spid="3">
+                                            <p:txEl>
+                                              <p:pRg st="9" end="9"/>
+                                            </p:txEl>
+                                          </p:spTgt>
+                                        </p:tgtEl>
+                                        <p:attrNameLst>
+                                          <p:attrName>ppt_x</p:attrName>
+                                        </p:attrNameLst>
+                                      </p:cBhvr>
+                                      <p:tavLst>
+                                        <p:tav tm="0">
+                                          <p:val>
+                                            <p:strVal val="#ppt_x"/>
+                                          </p:val>
+                                        </p:tav>
+                                        <p:tav tm="100000">
+                                          <p:val>
+                                            <p:strVal val="#ppt_x"/>
+                                          </p:val>
+                                        </p:tav>
+                                      </p:tavLst>
+                                    </p:anim>
+                                    <p:anim calcmode="lin" valueType="num">
+                                      <p:cBhvr>
+                                        <p:cTn id="54" dur="1000" fill="hold"/>
+                                        <p:tgtEl>
+                                          <p:spTgt spid="3">
+                                            <p:txEl>
+                                              <p:pRg st="9" end="9"/>
+                                            </p:txEl>
+                                          </p:spTgt>
+                                        </p:tgtEl>
+                                        <p:attrNameLst>
+                                          <p:attrName>ppt_y</p:attrName>
+                                        </p:attrNameLst>
+                                      </p:cBhvr>
+                                      <p:tavLst>
+                                        <p:tav tm="0">
+                                          <p:val>
+                                            <p:strVal val="#ppt_y+.1"/>
+                                          </p:val>
+                                        </p:tav>
+                                        <p:tav tm="100000">
+                                          <p:val>
+                                            <p:strVal val="#ppt_y"/>
+                                          </p:val>
+                                        </p:tav>
+                                      </p:tavLst>
+                                    </p:anim>
+                                  </p:childTnLst>
+                                </p:cTn>
+                              </p:par>
+                              <p:par>
+                                <p:cTn id="55" presetID="42" presetClass="entr" presetSubtype="0" fill="hold" grpId="0" nodeType="withEffect">
+                                  <p:stCondLst>
+                                    <p:cond delay="0"/>
+                                  </p:stCondLst>
+                                  <p:childTnLst>
+                                    <p:set>
+                                      <p:cBhvr>
+                                        <p:cTn id="56" dur="1" fill="hold">
+                                          <p:stCondLst>
+                                            <p:cond delay="0"/>
+                                          </p:stCondLst>
+                                        </p:cTn>
+                                        <p:tgtEl>
+                                          <p:spTgt spid="3">
+                                            <p:txEl>
+                                              <p:pRg st="10" end="10"/>
+                                            </p:txEl>
+                                          </p:spTgt>
+                                        </p:tgtEl>
+                                        <p:attrNameLst>
+                                          <p:attrName>style.visibility</p:attrName>
+                                        </p:attrNameLst>
+                                      </p:cBhvr>
+                                      <p:to>
+                                        <p:strVal val="visible"/>
+                                      </p:to>
+                                    </p:set>
+                                    <p:animEffect transition="in" filter="fade">
+                                      <p:cBhvr>
+                                        <p:cTn id="57" dur="1000"/>
+                                        <p:tgtEl>
+                                          <p:spTgt spid="3">
+                                            <p:txEl>
+                                              <p:pRg st="10" end="10"/>
+                                            </p:txEl>
+                                          </p:spTgt>
+                                        </p:tgtEl>
+                                      </p:cBhvr>
+                                    </p:animEffect>
+                                    <p:anim calcmode="lin" valueType="num">
+                                      <p:cBhvr>
+                                        <p:cTn id="58" dur="1000" fill="hold"/>
+                                        <p:tgtEl>
+                                          <p:spTgt spid="3">
+                                            <p:txEl>
+                                              <p:pRg st="10" end="10"/>
+                                            </p:txEl>
+                                          </p:spTgt>
+                                        </p:tgtEl>
+                                        <p:attrNameLst>
+                                          <p:attrName>ppt_x</p:attrName>
+                                        </p:attrNameLst>
+                                      </p:cBhvr>
+                                      <p:tavLst>
+                                        <p:tav tm="0">
+                                          <p:val>
+                                            <p:strVal val="#ppt_x"/>
+                                          </p:val>
+                                        </p:tav>
+                                        <p:tav tm="100000">
+                                          <p:val>
+                                            <p:strVal val="#ppt_x"/>
+                                          </p:val>
+                                        </p:tav>
+                                      </p:tavLst>
+                                    </p:anim>
+                                    <p:anim calcmode="lin" valueType="num">
+                                      <p:cBhvr>
+                                        <p:cTn id="59" dur="1000" fill="hold"/>
+                                        <p:tgtEl>
+                                          <p:spTgt spid="3">
+                                            <p:txEl>
+                                              <p:pRg st="10" end="10"/>
+                                            </p:txEl>
+                                          </p:spTgt>
+                                        </p:tgtEl>
+                                        <p:attrNameLst>
+                                          <p:attrName>ppt_y</p:attrName>
+                                        </p:attrNameLst>
+                                      </p:cBhvr>
+                                      <p:tavLst>
+                                        <p:tav tm="0">
+                                          <p:val>
+                                            <p:strVal val="#ppt_y+.1"/>
+                                          </p:val>
+                                        </p:tav>
+                                        <p:tav tm="100000">
+                                          <p:val>
+                                            <p:strVal val="#ppt_y"/>
+                                          </p:val>
+                                        </p:tav>
+                                      </p:tavLst>
+                                    </p:anim>
+                                  </p:childTnLst>
+                                </p:cTn>
+                              </p:par>
+                              <p:par>
+                                <p:cTn id="60" presetID="42" presetClass="entr" presetSubtype="0" fill="hold" grpId="0" nodeType="withEffect">
+                                  <p:stCondLst>
+                                    <p:cond delay="0"/>
+                                  </p:stCondLst>
+                                  <p:childTnLst>
+                                    <p:set>
+                                      <p:cBhvr>
+                                        <p:cTn id="61" dur="1" fill="hold">
+                                          <p:stCondLst>
+                                            <p:cond delay="0"/>
+                                          </p:stCondLst>
+                                        </p:cTn>
+                                        <p:tgtEl>
+                                          <p:spTgt spid="3">
+                                            <p:txEl>
+                                              <p:pRg st="11" end="11"/>
+                                            </p:txEl>
+                                          </p:spTgt>
+                                        </p:tgtEl>
+                                        <p:attrNameLst>
+                                          <p:attrName>style.visibility</p:attrName>
+                                        </p:attrNameLst>
+                                      </p:cBhvr>
+                                      <p:to>
+                                        <p:strVal val="visible"/>
+                                      </p:to>
+                                    </p:set>
+                                    <p:animEffect transition="in" filter="fade">
+                                      <p:cBhvr>
+                                        <p:cTn id="62" dur="1000"/>
+                                        <p:tgtEl>
+                                          <p:spTgt spid="3">
+                                            <p:txEl>
+                                              <p:pRg st="11" end="11"/>
+                                            </p:txEl>
+                                          </p:spTgt>
+                                        </p:tgtEl>
+                                      </p:cBhvr>
+                                    </p:animEffect>
+                                    <p:anim calcmode="lin" valueType="num">
+                                      <p:cBhvr>
+                                        <p:cTn id="63" dur="1000" fill="hold"/>
+                                        <p:tgtEl>
+                                          <p:spTgt spid="3">
+                                            <p:txEl>
+                                              <p:pRg st="11" end="11"/>
+                                            </p:txEl>
+                                          </p:spTgt>
+                                        </p:tgtEl>
+                                        <p:attrNameLst>
+                                          <p:attrName>ppt_x</p:attrName>
+                                        </p:attrNameLst>
+                                      </p:cBhvr>
+                                      <p:tavLst>
+                                        <p:tav tm="0">
+                                          <p:val>
+                                            <p:strVal val="#ppt_x"/>
+                                          </p:val>
+                                        </p:tav>
+                                        <p:tav tm="100000">
+                                          <p:val>
+                                            <p:strVal val="#ppt_x"/>
+                                          </p:val>
+                                        </p:tav>
+                                      </p:tavLst>
+                                    </p:anim>
+                                    <p:anim calcmode="lin" valueType="num">
+                                      <p:cBhvr>
+                                        <p:cTn id="64" dur="1000" fill="hold"/>
+                                        <p:tgtEl>
+                                          <p:spTgt spid="3">
+                                            <p:txEl>
+                                              <p:pRg st="11" end="11"/>
                                             </p:txEl>
                                           </p:spTgt>
                                         </p:tgtEl>
@@ -12705,7 +13180,10 @@
               <a:rPr lang="en-US" dirty="0" err="1"/>
               <a:t>treemap</a:t>
             </a:r>
-            <a:endParaRPr lang="en-US" dirty="0"/>
+            <a:r>
+              <a:rPr lang="en-US" dirty="0"/>
+              <a:t> is a great starting point for delving into stock visualizations.</a:t>
+            </a:r>
           </a:p>
           <a:p>
             <a:pPr marL="285750" indent="-285750">

</xml_diff>